<commit_message>
Prototipo del primer sprint_Inicio de proyecto
</commit_message>
<xml_diff>
--- a/docs/Diagrama de arquitectura.pptx
+++ b/docs/Diagrama de arquitectura.pptx
@@ -6,6 +6,9 @@
   </p:sldMasterIdLst>
   <p:sldIdLst>
     <p:sldId id="256" r:id="rId2"/>
+    <p:sldId id="257" r:id="rId3"/>
+    <p:sldId id="258" r:id="rId4"/>
+    <p:sldId id="259" r:id="rId5"/>
   </p:sldIdLst>
   <p:sldSz cx="12192000" cy="6858000"/>
   <p:notesSz cx="6858000" cy="9144000"/>
@@ -104,6 +107,11 @@
       </a:defRPr>
     </a:lvl9pPr>
   </p:defaultTextStyle>
+  <p:extLst>
+    <p:ext uri="{EFAFB233-063F-42B5-8137-9DF3F51BA10A}">
+      <p15:sldGuideLst xmlns:p15="http://schemas.microsoft.com/office/powerpoint/2012/main"/>
+    </p:ext>
+  </p:extLst>
 </p:presentation>
 </file>
 
@@ -254,7 +262,7 @@
           <a:p>
             <a:fld id="{4DAFCE15-DBFD-4C2D-8258-132D751D944C}" type="datetimeFigureOut">
               <a:rPr lang="es-ES" smtClean="0"/>
-              <a:t>26/01/2018</a:t>
+              <a:t>12/02/2018</a:t>
             </a:fld>
             <a:endParaRPr lang="es-ES"/>
           </a:p>
@@ -452,7 +460,7 @@
           <a:p>
             <a:fld id="{4DAFCE15-DBFD-4C2D-8258-132D751D944C}" type="datetimeFigureOut">
               <a:rPr lang="es-ES" smtClean="0"/>
-              <a:t>26/01/2018</a:t>
+              <a:t>12/02/2018</a:t>
             </a:fld>
             <a:endParaRPr lang="es-ES"/>
           </a:p>
@@ -660,7 +668,7 @@
           <a:p>
             <a:fld id="{4DAFCE15-DBFD-4C2D-8258-132D751D944C}" type="datetimeFigureOut">
               <a:rPr lang="es-ES" smtClean="0"/>
-              <a:t>26/01/2018</a:t>
+              <a:t>12/02/2018</a:t>
             </a:fld>
             <a:endParaRPr lang="es-ES"/>
           </a:p>
@@ -858,7 +866,7 @@
           <a:p>
             <a:fld id="{4DAFCE15-DBFD-4C2D-8258-132D751D944C}" type="datetimeFigureOut">
               <a:rPr lang="es-ES" smtClean="0"/>
-              <a:t>26/01/2018</a:t>
+              <a:t>12/02/2018</a:t>
             </a:fld>
             <a:endParaRPr lang="es-ES"/>
           </a:p>
@@ -1133,7 +1141,7 @@
           <a:p>
             <a:fld id="{4DAFCE15-DBFD-4C2D-8258-132D751D944C}" type="datetimeFigureOut">
               <a:rPr lang="es-ES" smtClean="0"/>
-              <a:t>26/01/2018</a:t>
+              <a:t>12/02/2018</a:t>
             </a:fld>
             <a:endParaRPr lang="es-ES"/>
           </a:p>
@@ -1398,7 +1406,7 @@
           <a:p>
             <a:fld id="{4DAFCE15-DBFD-4C2D-8258-132D751D944C}" type="datetimeFigureOut">
               <a:rPr lang="es-ES" smtClean="0"/>
-              <a:t>26/01/2018</a:t>
+              <a:t>12/02/2018</a:t>
             </a:fld>
             <a:endParaRPr lang="es-ES"/>
           </a:p>
@@ -1810,7 +1818,7 @@
           <a:p>
             <a:fld id="{4DAFCE15-DBFD-4C2D-8258-132D751D944C}" type="datetimeFigureOut">
               <a:rPr lang="es-ES" smtClean="0"/>
-              <a:t>26/01/2018</a:t>
+              <a:t>12/02/2018</a:t>
             </a:fld>
             <a:endParaRPr lang="es-ES"/>
           </a:p>
@@ -1951,7 +1959,7 @@
           <a:p>
             <a:fld id="{4DAFCE15-DBFD-4C2D-8258-132D751D944C}" type="datetimeFigureOut">
               <a:rPr lang="es-ES" smtClean="0"/>
-              <a:t>26/01/2018</a:t>
+              <a:t>12/02/2018</a:t>
             </a:fld>
             <a:endParaRPr lang="es-ES"/>
           </a:p>
@@ -2064,7 +2072,7 @@
           <a:p>
             <a:fld id="{4DAFCE15-DBFD-4C2D-8258-132D751D944C}" type="datetimeFigureOut">
               <a:rPr lang="es-ES" smtClean="0"/>
-              <a:t>26/01/2018</a:t>
+              <a:t>12/02/2018</a:t>
             </a:fld>
             <a:endParaRPr lang="es-ES"/>
           </a:p>
@@ -2375,7 +2383,7 @@
           <a:p>
             <a:fld id="{4DAFCE15-DBFD-4C2D-8258-132D751D944C}" type="datetimeFigureOut">
               <a:rPr lang="es-ES" smtClean="0"/>
-              <a:t>26/01/2018</a:t>
+              <a:t>12/02/2018</a:t>
             </a:fld>
             <a:endParaRPr lang="es-ES"/>
           </a:p>
@@ -2663,7 +2671,7 @@
           <a:p>
             <a:fld id="{4DAFCE15-DBFD-4C2D-8258-132D751D944C}" type="datetimeFigureOut">
               <a:rPr lang="es-ES" smtClean="0"/>
-              <a:t>26/01/2018</a:t>
+              <a:t>12/02/2018</a:t>
             </a:fld>
             <a:endParaRPr lang="es-ES"/>
           </a:p>
@@ -2904,7 +2912,7 @@
           <a:p>
             <a:fld id="{4DAFCE15-DBFD-4C2D-8258-132D751D944C}" type="datetimeFigureOut">
               <a:rPr lang="es-ES" smtClean="0"/>
-              <a:t>26/01/2018</a:t>
+              <a:t>12/02/2018</a:t>
             </a:fld>
             <a:endParaRPr lang="es-ES"/>
           </a:p>
@@ -5077,6 +5085,3432 @@
 </p:sld>
 </file>
 
+<file path=ppt/slides/slide2.xml><?xml version="1.0" encoding="utf-8"?>
+<p:sld xmlns:a="http://schemas.openxmlformats.org/drawingml/2006/main" xmlns:r="http://schemas.openxmlformats.org/officeDocument/2006/relationships" xmlns:p="http://schemas.openxmlformats.org/presentationml/2006/main">
+  <p:cSld>
+    <p:spTree>
+      <p:nvGrpSpPr>
+        <p:cNvPr id="1" name=""/>
+        <p:cNvGrpSpPr/>
+        <p:nvPr/>
+      </p:nvGrpSpPr>
+      <p:grpSpPr>
+        <a:xfrm>
+          <a:off x="0" y="0"/>
+          <a:ext cx="0" cy="0"/>
+          <a:chOff x="0" y="0"/>
+          <a:chExt cx="0" cy="0"/>
+        </a:xfrm>
+      </p:grpSpPr>
+      <p:pic>
+        <p:nvPicPr>
+          <p:cNvPr id="8" name="Imagen 7">
+            <a:extLst>
+              <a:ext uri="{FF2B5EF4-FFF2-40B4-BE49-F238E27FC236}">
+                <a16:creationId xmlns:a16="http://schemas.microsoft.com/office/drawing/2014/main" id="{E5CAA04D-CFB9-4491-A7C8-74B6D50D3C51}"/>
+              </a:ext>
+            </a:extLst>
+          </p:cNvPr>
+          <p:cNvPicPr>
+            <a:picLocks noChangeAspect="1"/>
+          </p:cNvPicPr>
+          <p:nvPr/>
+        </p:nvPicPr>
+        <p:blipFill>
+          <a:blip r:embed="rId2"/>
+          <a:stretch>
+            <a:fillRect/>
+          </a:stretch>
+        </p:blipFill>
+        <p:spPr>
+          <a:xfrm>
+            <a:off x="1914084" y="68405"/>
+            <a:ext cx="1674421" cy="2419498"/>
+          </a:xfrm>
+          <a:prstGeom prst="rect">
+            <a:avLst/>
+          </a:prstGeom>
+        </p:spPr>
+      </p:pic>
+      <p:pic>
+        <p:nvPicPr>
+          <p:cNvPr id="1032" name="Picture 8" descr="Imagen relacionada">
+            <a:extLst>
+              <a:ext uri="{FF2B5EF4-FFF2-40B4-BE49-F238E27FC236}">
+                <a16:creationId xmlns:a16="http://schemas.microsoft.com/office/drawing/2014/main" id="{9E668104-5B66-45E9-8E53-FE51DB146D10}"/>
+              </a:ext>
+            </a:extLst>
+          </p:cNvPr>
+          <p:cNvPicPr>
+            <a:picLocks noChangeAspect="1" noChangeArrowheads="1"/>
+          </p:cNvPicPr>
+          <p:nvPr/>
+        </p:nvPicPr>
+        <p:blipFill>
+          <a:blip r:embed="rId3">
+            <a:extLst>
+              <a:ext uri="{28A0092B-C50C-407E-A947-70E740481C1C}">
+                <a14:useLocalDpi xmlns:a14="http://schemas.microsoft.com/office/drawing/2010/main" val="0"/>
+              </a:ext>
+            </a:extLst>
+          </a:blip>
+          <a:srcRect/>
+          <a:stretch>
+            <a:fillRect/>
+          </a:stretch>
+        </p:blipFill>
+        <p:spPr bwMode="auto">
+          <a:xfrm>
+            <a:off x="1597157" y="3429000"/>
+            <a:ext cx="2308274" cy="2308274"/>
+          </a:xfrm>
+          <a:prstGeom prst="rect">
+            <a:avLst/>
+          </a:prstGeom>
+          <a:noFill/>
+          <a:extLst>
+            <a:ext uri="{909E8E84-426E-40DD-AFC4-6F175D3DCCD1}">
+              <a14:hiddenFill xmlns:a14="http://schemas.microsoft.com/office/drawing/2010/main">
+                <a:solidFill>
+                  <a:srgbClr val="FFFFFF"/>
+                </a:solidFill>
+              </a14:hiddenFill>
+            </a:ext>
+          </a:extLst>
+        </p:spPr>
+      </p:pic>
+      <p:cxnSp>
+        <p:nvCxnSpPr>
+          <p:cNvPr id="10" name="Conector recto 9">
+            <a:extLst>
+              <a:ext uri="{FF2B5EF4-FFF2-40B4-BE49-F238E27FC236}">
+                <a16:creationId xmlns:a16="http://schemas.microsoft.com/office/drawing/2014/main" id="{376E55FD-8400-4758-9EE6-A914F53B1786}"/>
+              </a:ext>
+            </a:extLst>
+          </p:cNvPr>
+          <p:cNvCxnSpPr>
+            <a:cxnSpLocks/>
+          </p:cNvCxnSpPr>
+          <p:nvPr/>
+        </p:nvCxnSpPr>
+        <p:spPr>
+          <a:xfrm>
+            <a:off x="0" y="3080825"/>
+            <a:ext cx="12192000" cy="0"/>
+          </a:xfrm>
+          <a:prstGeom prst="line">
+            <a:avLst/>
+          </a:prstGeom>
+          <a:ln w="76200">
+            <a:prstDash val="sysDash"/>
+          </a:ln>
+        </p:spPr>
+        <p:style>
+          <a:lnRef idx="1">
+            <a:schemeClr val="accent1"/>
+          </a:lnRef>
+          <a:fillRef idx="0">
+            <a:schemeClr val="accent1"/>
+          </a:fillRef>
+          <a:effectRef idx="0">
+            <a:schemeClr val="accent1"/>
+          </a:effectRef>
+          <a:fontRef idx="minor">
+            <a:schemeClr val="tx1"/>
+          </a:fontRef>
+        </p:style>
+      </p:cxnSp>
+      <p:sp>
+        <p:nvSpPr>
+          <p:cNvPr id="12" name="CuadroTexto 11">
+            <a:extLst>
+              <a:ext uri="{FF2B5EF4-FFF2-40B4-BE49-F238E27FC236}">
+                <a16:creationId xmlns:a16="http://schemas.microsoft.com/office/drawing/2014/main" id="{C446F7B3-21F0-4800-A9D2-00DC83791B20}"/>
+              </a:ext>
+            </a:extLst>
+          </p:cNvPr>
+          <p:cNvSpPr txBox="1"/>
+          <p:nvPr/>
+        </p:nvSpPr>
+        <p:spPr>
+          <a:xfrm>
+            <a:off x="2008173" y="2517207"/>
+            <a:ext cx="1486241" cy="430887"/>
+          </a:xfrm>
+          <a:prstGeom prst="rect">
+            <a:avLst/>
+          </a:prstGeom>
+          <a:noFill/>
+        </p:spPr>
+        <p:txBody>
+          <a:bodyPr wrap="none" rtlCol="0">
+            <a:spAutoFit/>
+          </a:bodyPr>
+          <a:lstStyle/>
+          <a:p>
+            <a:r>
+              <a:rPr lang="es-ES" sz="2200" b="1" dirty="0"/>
+              <a:t>Ingeboards</a:t>
+            </a:r>
+          </a:p>
+        </p:txBody>
+      </p:sp>
+      <p:sp>
+        <p:nvSpPr>
+          <p:cNvPr id="14" name="CuadroTexto 13">
+            <a:extLst>
+              <a:ext uri="{FF2B5EF4-FFF2-40B4-BE49-F238E27FC236}">
+                <a16:creationId xmlns:a16="http://schemas.microsoft.com/office/drawing/2014/main" id="{8C99631C-4862-4F20-90CE-B43E4466DE22}"/>
+              </a:ext>
+            </a:extLst>
+          </p:cNvPr>
+          <p:cNvSpPr txBox="1"/>
+          <p:nvPr/>
+        </p:nvSpPr>
+        <p:spPr>
+          <a:xfrm>
+            <a:off x="2260711" y="5737274"/>
+            <a:ext cx="981166" cy="430887"/>
+          </a:xfrm>
+          <a:prstGeom prst="rect">
+            <a:avLst/>
+          </a:prstGeom>
+          <a:noFill/>
+        </p:spPr>
+        <p:txBody>
+          <a:bodyPr wrap="none" rtlCol="0">
+            <a:spAutoFit/>
+          </a:bodyPr>
+          <a:lstStyle/>
+          <a:p>
+            <a:r>
+              <a:rPr lang="es-ES" sz="2200" b="1" dirty="0"/>
+              <a:t>SCADA</a:t>
+            </a:r>
+          </a:p>
+        </p:txBody>
+      </p:sp>
+      <p:sp>
+        <p:nvSpPr>
+          <p:cNvPr id="13" name="CuadroTexto 12">
+            <a:extLst>
+              <a:ext uri="{FF2B5EF4-FFF2-40B4-BE49-F238E27FC236}">
+                <a16:creationId xmlns:a16="http://schemas.microsoft.com/office/drawing/2014/main" id="{B1553E4C-FE45-4839-95B2-C49751228D26}"/>
+              </a:ext>
+            </a:extLst>
+          </p:cNvPr>
+          <p:cNvSpPr txBox="1"/>
+          <p:nvPr/>
+        </p:nvSpPr>
+        <p:spPr>
+          <a:xfrm>
+            <a:off x="3905431" y="382062"/>
+            <a:ext cx="2405576" cy="1631216"/>
+          </a:xfrm>
+          <a:prstGeom prst="rect">
+            <a:avLst/>
+          </a:prstGeom>
+          <a:noFill/>
+          <a:ln>
+            <a:solidFill>
+              <a:schemeClr val="tx1"/>
+            </a:solidFill>
+          </a:ln>
+        </p:spPr>
+        <p:txBody>
+          <a:bodyPr wrap="square" rtlCol="0">
+            <a:spAutoFit/>
+          </a:bodyPr>
+          <a:lstStyle/>
+          <a:p>
+            <a:r>
+              <a:rPr lang="es-ES" sz="2000" dirty="0"/>
+              <a:t>Actuación.</a:t>
+            </a:r>
+          </a:p>
+          <a:p>
+            <a:r>
+              <a:rPr lang="es-ES" sz="2000" b="1" dirty="0"/>
+              <a:t>Activos</a:t>
+            </a:r>
+            <a:r>
+              <a:rPr lang="es-ES" sz="2000" dirty="0"/>
+              <a:t>.</a:t>
+            </a:r>
+          </a:p>
+          <a:p>
+            <a:r>
+              <a:rPr lang="es-ES" sz="2000" dirty="0"/>
+              <a:t>Parques.</a:t>
+            </a:r>
+          </a:p>
+          <a:p>
+            <a:r>
+              <a:rPr lang="es-ES" sz="2000" dirty="0"/>
+              <a:t>Informes de trabajo.</a:t>
+            </a:r>
+          </a:p>
+          <a:p>
+            <a:r>
+              <a:rPr lang="es-ES" sz="2000" dirty="0"/>
+              <a:t>Técnicos.</a:t>
+            </a:r>
+          </a:p>
+        </p:txBody>
+      </p:sp>
+      <p:sp>
+        <p:nvSpPr>
+          <p:cNvPr id="16" name="CuadroTexto 15">
+            <a:extLst>
+              <a:ext uri="{FF2B5EF4-FFF2-40B4-BE49-F238E27FC236}">
+                <a16:creationId xmlns:a16="http://schemas.microsoft.com/office/drawing/2014/main" id="{BF849644-78F1-4ECC-9654-2C77C5EA2583}"/>
+              </a:ext>
+            </a:extLst>
+          </p:cNvPr>
+          <p:cNvSpPr txBox="1"/>
+          <p:nvPr/>
+        </p:nvSpPr>
+        <p:spPr>
+          <a:xfrm>
+            <a:off x="3905431" y="3765188"/>
+            <a:ext cx="2889264" cy="2554545"/>
+          </a:xfrm>
+          <a:prstGeom prst="rect">
+            <a:avLst/>
+          </a:prstGeom>
+          <a:noFill/>
+          <a:ln>
+            <a:solidFill>
+              <a:schemeClr val="tx1"/>
+            </a:solidFill>
+          </a:ln>
+        </p:spPr>
+        <p:txBody>
+          <a:bodyPr wrap="square" rtlCol="0">
+            <a:spAutoFit/>
+          </a:bodyPr>
+          <a:lstStyle/>
+          <a:p>
+            <a:r>
+              <a:rPr lang="es-ES" sz="2000" dirty="0"/>
+              <a:t>Datos de cada uno de los </a:t>
+            </a:r>
+            <a:r>
+              <a:rPr lang="es-ES" sz="2000" b="1" dirty="0"/>
+              <a:t>activos</a:t>
+            </a:r>
+            <a:r>
+              <a:rPr lang="es-ES" sz="2000" dirty="0"/>
+              <a:t>:</a:t>
+            </a:r>
+          </a:p>
+          <a:p>
+            <a:pPr marL="285750" indent="-285750">
+              <a:buFont typeface="Arial" panose="020B0604020202020204" pitchFamily="34" charset="0"/>
+              <a:buChar char="•"/>
+            </a:pPr>
+            <a:r>
+              <a:rPr lang="es-ES" sz="2000" dirty="0"/>
+              <a:t>Temperaturas.</a:t>
+            </a:r>
+          </a:p>
+          <a:p>
+            <a:pPr marL="285750" indent="-285750">
+              <a:buFont typeface="Arial" panose="020B0604020202020204" pitchFamily="34" charset="0"/>
+              <a:buChar char="•"/>
+            </a:pPr>
+            <a:r>
+              <a:rPr lang="es-ES" sz="2000" dirty="0"/>
+              <a:t>Velocidad de viento.</a:t>
+            </a:r>
+          </a:p>
+          <a:p>
+            <a:pPr marL="285750" indent="-285750">
+              <a:buFont typeface="Arial" panose="020B0604020202020204" pitchFamily="34" charset="0"/>
+              <a:buChar char="•"/>
+            </a:pPr>
+            <a:r>
+              <a:rPr lang="es-ES" sz="2000" dirty="0"/>
+              <a:t>Nivel de aceite.</a:t>
+            </a:r>
+          </a:p>
+          <a:p>
+            <a:r>
+              <a:rPr lang="es-ES" sz="2000" dirty="0"/>
+              <a:t>Datos de errores:</a:t>
+            </a:r>
+          </a:p>
+          <a:p>
+            <a:pPr marL="285750" indent="-285750">
+              <a:buFont typeface="Arial" panose="020B0604020202020204" pitchFamily="34" charset="0"/>
+              <a:buChar char="•"/>
+            </a:pPr>
+            <a:r>
+              <a:rPr lang="es-ES" sz="2000" dirty="0"/>
+              <a:t>Log de incidentes.</a:t>
+            </a:r>
+          </a:p>
+          <a:p>
+            <a:pPr marL="285750" indent="-285750">
+              <a:buFont typeface="Arial" panose="020B0604020202020204" pitchFamily="34" charset="0"/>
+              <a:buChar char="•"/>
+            </a:pPr>
+            <a:r>
+              <a:rPr lang="es-ES" sz="2000" dirty="0"/>
+              <a:t>Paradas de aeros.</a:t>
+            </a:r>
+          </a:p>
+        </p:txBody>
+      </p:sp>
+      <p:cxnSp>
+        <p:nvCxnSpPr>
+          <p:cNvPr id="17" name="Conector recto de flecha 16">
+            <a:extLst>
+              <a:ext uri="{FF2B5EF4-FFF2-40B4-BE49-F238E27FC236}">
+                <a16:creationId xmlns:a16="http://schemas.microsoft.com/office/drawing/2014/main" id="{C165B505-D23F-48EC-B7A1-4F47E9A2D7B3}"/>
+              </a:ext>
+            </a:extLst>
+          </p:cNvPr>
+          <p:cNvCxnSpPr>
+            <a:cxnSpLocks/>
+          </p:cNvCxnSpPr>
+          <p:nvPr/>
+        </p:nvCxnSpPr>
+        <p:spPr>
+          <a:xfrm flipV="1">
+            <a:off x="4633375" y="2570873"/>
+            <a:ext cx="2344200" cy="1621299"/>
+          </a:xfrm>
+          <a:prstGeom prst="straightConnector1">
+            <a:avLst/>
+          </a:prstGeom>
+          <a:ln w="76200">
+            <a:solidFill>
+              <a:srgbClr val="FF0000"/>
+            </a:solidFill>
+            <a:tailEnd type="triangle"/>
+          </a:ln>
+        </p:spPr>
+        <p:style>
+          <a:lnRef idx="3">
+            <a:schemeClr val="dk1"/>
+          </a:lnRef>
+          <a:fillRef idx="0">
+            <a:schemeClr val="dk1"/>
+          </a:fillRef>
+          <a:effectRef idx="2">
+            <a:schemeClr val="dk1"/>
+          </a:effectRef>
+          <a:fontRef idx="minor">
+            <a:schemeClr val="tx1"/>
+          </a:fontRef>
+        </p:style>
+      </p:cxnSp>
+      <p:cxnSp>
+        <p:nvCxnSpPr>
+          <p:cNvPr id="20" name="Conector recto de flecha 19">
+            <a:extLst>
+              <a:ext uri="{FF2B5EF4-FFF2-40B4-BE49-F238E27FC236}">
+                <a16:creationId xmlns:a16="http://schemas.microsoft.com/office/drawing/2014/main" id="{C8A438DC-E20D-4F4A-B5FA-1505920D5659}"/>
+              </a:ext>
+            </a:extLst>
+          </p:cNvPr>
+          <p:cNvCxnSpPr>
+            <a:cxnSpLocks/>
+          </p:cNvCxnSpPr>
+          <p:nvPr/>
+        </p:nvCxnSpPr>
+        <p:spPr>
+          <a:xfrm>
+            <a:off x="4822165" y="886265"/>
+            <a:ext cx="2155410" cy="610295"/>
+          </a:xfrm>
+          <a:prstGeom prst="straightConnector1">
+            <a:avLst/>
+          </a:prstGeom>
+          <a:ln w="76200">
+            <a:solidFill>
+              <a:srgbClr val="FF0000"/>
+            </a:solidFill>
+            <a:tailEnd type="triangle"/>
+          </a:ln>
+        </p:spPr>
+        <p:style>
+          <a:lnRef idx="3">
+            <a:schemeClr val="dk1"/>
+          </a:lnRef>
+          <a:fillRef idx="0">
+            <a:schemeClr val="dk1"/>
+          </a:fillRef>
+          <a:effectRef idx="2">
+            <a:schemeClr val="dk1"/>
+          </a:effectRef>
+          <a:fontRef idx="minor">
+            <a:schemeClr val="tx1"/>
+          </a:fontRef>
+        </p:style>
+      </p:cxnSp>
+      <p:graphicFrame>
+        <p:nvGraphicFramePr>
+          <p:cNvPr id="22" name="Tabla 21">
+            <a:extLst>
+              <a:ext uri="{FF2B5EF4-FFF2-40B4-BE49-F238E27FC236}">
+                <a16:creationId xmlns:a16="http://schemas.microsoft.com/office/drawing/2014/main" id="{5EB2A204-A959-4D46-BEEA-2D5C86FFF76C}"/>
+              </a:ext>
+            </a:extLst>
+          </p:cNvPr>
+          <p:cNvGraphicFramePr>
+            <a:graphicFrameLocks noGrp="1"/>
+          </p:cNvGraphicFramePr>
+          <p:nvPr>
+            <p:extLst>
+              <p:ext uri="{D42A27DB-BD31-4B8C-83A1-F6EECF244321}">
+                <p14:modId xmlns:p14="http://schemas.microsoft.com/office/powerpoint/2010/main" val="4125820919"/>
+              </p:ext>
+            </p:extLst>
+          </p:nvPr>
+        </p:nvGraphicFramePr>
+        <p:xfrm>
+          <a:off x="7068305" y="254113"/>
+          <a:ext cx="4481268" cy="2698761"/>
+        </p:xfrm>
+        <a:graphic>
+          <a:graphicData uri="http://schemas.openxmlformats.org/drawingml/2006/table">
+            <a:tbl>
+              <a:tblPr firstRow="1" bandRow="1">
+                <a:tableStyleId>{5C22544A-7EE6-4342-B048-85BDC9FD1C3A}</a:tableStyleId>
+              </a:tblPr>
+              <a:tblGrid>
+                <a:gridCol w="1493756">
+                  <a:extLst>
+                    <a:ext uri="{9D8B030D-6E8A-4147-A177-3AD203B41FA5}">
+                      <a16:colId xmlns:a16="http://schemas.microsoft.com/office/drawing/2014/main" val="617596925"/>
+                    </a:ext>
+                  </a:extLst>
+                </a:gridCol>
+                <a:gridCol w="1493756">
+                  <a:extLst>
+                    <a:ext uri="{9D8B030D-6E8A-4147-A177-3AD203B41FA5}">
+                      <a16:colId xmlns:a16="http://schemas.microsoft.com/office/drawing/2014/main" val="1153038374"/>
+                    </a:ext>
+                  </a:extLst>
+                </a:gridCol>
+                <a:gridCol w="1493756">
+                  <a:extLst>
+                    <a:ext uri="{9D8B030D-6E8A-4147-A177-3AD203B41FA5}">
+                      <a16:colId xmlns:a16="http://schemas.microsoft.com/office/drawing/2014/main" val="3378057824"/>
+                    </a:ext>
+                  </a:extLst>
+                </a:gridCol>
+              </a:tblGrid>
+              <a:tr h="725865">
+                <a:tc>
+                  <a:txBody>
+                    <a:bodyPr/>
+                    <a:lstStyle/>
+                    <a:p>
+                      <a:pPr algn="ctr"/>
+                      <a:r>
+                        <a:rPr lang="es-ES" sz="2000" b="1" dirty="0"/>
+                        <a:t>Ingeboards</a:t>
+                      </a:r>
+                    </a:p>
+                  </a:txBody>
+                  <a:tcPr anchor="ctr"/>
+                </a:tc>
+                <a:tc>
+                  <a:txBody>
+                    <a:bodyPr/>
+                    <a:lstStyle/>
+                    <a:p>
+                      <a:pPr algn="ctr"/>
+                      <a:r>
+                        <a:rPr lang="es-ES" sz="2000" b="1" dirty="0"/>
+                        <a:t>Traducción</a:t>
+                      </a:r>
+                    </a:p>
+                  </a:txBody>
+                  <a:tcPr anchor="ctr"/>
+                </a:tc>
+                <a:tc>
+                  <a:txBody>
+                    <a:bodyPr/>
+                    <a:lstStyle/>
+                    <a:p>
+                      <a:pPr algn="ctr"/>
+                      <a:r>
+                        <a:rPr lang="es-ES" sz="2000" b="1" dirty="0"/>
+                        <a:t>IDSCADA</a:t>
+                      </a:r>
+                    </a:p>
+                  </a:txBody>
+                  <a:tcPr anchor="ctr"/>
+                </a:tc>
+                <a:extLst>
+                  <a:ext uri="{0D108BD9-81ED-4DB2-BD59-A6C34878D82A}">
+                    <a16:rowId xmlns:a16="http://schemas.microsoft.com/office/drawing/2014/main" val="4235076418"/>
+                  </a:ext>
+                </a:extLst>
+              </a:tr>
+              <a:tr h="493224">
+                <a:tc>
+                  <a:txBody>
+                    <a:bodyPr/>
+                    <a:lstStyle/>
+                    <a:p>
+                      <a:pPr algn="ctr"/>
+                      <a:r>
+                        <a:rPr lang="es-ES" sz="2000" b="1" dirty="0"/>
+                        <a:t>Lodoso11</a:t>
+                      </a:r>
+                    </a:p>
+                  </a:txBody>
+                  <a:tcPr anchor="ctr"/>
+                </a:tc>
+                <a:tc>
+                  <a:txBody>
+                    <a:bodyPr/>
+                    <a:lstStyle/>
+                    <a:p>
+                      <a:pPr algn="ctr"/>
+                      <a:r>
+                        <a:rPr lang="es-ES" sz="2000" b="1" dirty="0"/>
+                        <a:t>111111</a:t>
+                      </a:r>
+                    </a:p>
+                  </a:txBody>
+                  <a:tcPr anchor="ctr"/>
+                </a:tc>
+                <a:tc>
+                  <a:txBody>
+                    <a:bodyPr/>
+                    <a:lstStyle/>
+                    <a:p>
+                      <a:pPr algn="ctr"/>
+                      <a:r>
+                        <a:rPr lang="es-ES" sz="2000" b="1" dirty="0"/>
+                        <a:t>749874</a:t>
+                      </a:r>
+                    </a:p>
+                  </a:txBody>
+                  <a:tcPr anchor="ctr"/>
+                </a:tc>
+                <a:extLst>
+                  <a:ext uri="{0D108BD9-81ED-4DB2-BD59-A6C34878D82A}">
+                    <a16:rowId xmlns:a16="http://schemas.microsoft.com/office/drawing/2014/main" val="1615065495"/>
+                  </a:ext>
+                </a:extLst>
+              </a:tr>
+              <a:tr h="493224">
+                <a:tc>
+                  <a:txBody>
+                    <a:bodyPr/>
+                    <a:lstStyle/>
+                    <a:p>
+                      <a:pPr algn="ctr"/>
+                      <a:r>
+                        <a:rPr lang="es-ES" sz="2000" b="1" dirty="0"/>
+                        <a:t>Lodoso12</a:t>
+                      </a:r>
+                    </a:p>
+                  </a:txBody>
+                  <a:tcPr anchor="ctr"/>
+                </a:tc>
+                <a:tc>
+                  <a:txBody>
+                    <a:bodyPr/>
+                    <a:lstStyle/>
+                    <a:p>
+                      <a:pPr algn="ctr"/>
+                      <a:r>
+                        <a:rPr lang="es-ES" sz="2000" b="1" dirty="0"/>
+                        <a:t>222222</a:t>
+                      </a:r>
+                    </a:p>
+                  </a:txBody>
+                  <a:tcPr anchor="ctr"/>
+                </a:tc>
+                <a:tc>
+                  <a:txBody>
+                    <a:bodyPr/>
+                    <a:lstStyle/>
+                    <a:p>
+                      <a:pPr algn="ctr"/>
+                      <a:r>
+                        <a:rPr lang="es-ES" sz="2000" b="1" dirty="0"/>
+                        <a:t>401288</a:t>
+                      </a:r>
+                    </a:p>
+                  </a:txBody>
+                  <a:tcPr anchor="ctr"/>
+                </a:tc>
+                <a:extLst>
+                  <a:ext uri="{0D108BD9-81ED-4DB2-BD59-A6C34878D82A}">
+                    <a16:rowId xmlns:a16="http://schemas.microsoft.com/office/drawing/2014/main" val="60799518"/>
+                  </a:ext>
+                </a:extLst>
+              </a:tr>
+              <a:tr h="493224">
+                <a:tc>
+                  <a:txBody>
+                    <a:bodyPr/>
+                    <a:lstStyle/>
+                    <a:p>
+                      <a:pPr algn="ctr"/>
+                      <a:r>
+                        <a:rPr lang="es-ES" sz="2000" b="1" dirty="0"/>
+                        <a:t>…</a:t>
+                      </a:r>
+                    </a:p>
+                  </a:txBody>
+                  <a:tcPr anchor="ctr"/>
+                </a:tc>
+                <a:tc>
+                  <a:txBody>
+                    <a:bodyPr/>
+                    <a:lstStyle/>
+                    <a:p>
+                      <a:pPr algn="ctr"/>
+                      <a:r>
+                        <a:rPr lang="es-ES" sz="2000" b="1" dirty="0"/>
+                        <a:t>…</a:t>
+                      </a:r>
+                    </a:p>
+                  </a:txBody>
+                  <a:tcPr anchor="ctr"/>
+                </a:tc>
+                <a:tc>
+                  <a:txBody>
+                    <a:bodyPr/>
+                    <a:lstStyle/>
+                    <a:p>
+                      <a:pPr algn="ctr"/>
+                      <a:r>
+                        <a:rPr lang="es-ES" sz="2000" b="1" dirty="0"/>
+                        <a:t>…</a:t>
+                      </a:r>
+                    </a:p>
+                  </a:txBody>
+                  <a:tcPr anchor="ctr"/>
+                </a:tc>
+                <a:extLst>
+                  <a:ext uri="{0D108BD9-81ED-4DB2-BD59-A6C34878D82A}">
+                    <a16:rowId xmlns:a16="http://schemas.microsoft.com/office/drawing/2014/main" val="2600520662"/>
+                  </a:ext>
+                </a:extLst>
+              </a:tr>
+              <a:tr h="493224">
+                <a:tc>
+                  <a:txBody>
+                    <a:bodyPr/>
+                    <a:lstStyle/>
+                    <a:p>
+                      <a:pPr algn="ctr"/>
+                      <a:r>
+                        <a:rPr lang="es-ES" sz="2000" b="1" dirty="0"/>
+                        <a:t>LodosoXY</a:t>
+                      </a:r>
+                    </a:p>
+                  </a:txBody>
+                  <a:tcPr anchor="ctr"/>
+                </a:tc>
+                <a:tc>
+                  <a:txBody>
+                    <a:bodyPr/>
+                    <a:lstStyle/>
+                    <a:p>
+                      <a:pPr algn="ctr"/>
+                      <a:r>
+                        <a:rPr lang="es-ES" sz="2000" b="1" dirty="0"/>
+                        <a:t>999999</a:t>
+                      </a:r>
+                    </a:p>
+                  </a:txBody>
+                  <a:tcPr anchor="ctr"/>
+                </a:tc>
+                <a:tc>
+                  <a:txBody>
+                    <a:bodyPr/>
+                    <a:lstStyle/>
+                    <a:p>
+                      <a:pPr algn="ctr"/>
+                      <a:r>
+                        <a:rPr lang="es-ES" sz="2000" b="1" dirty="0"/>
+                        <a:t>123548</a:t>
+                      </a:r>
+                    </a:p>
+                  </a:txBody>
+                  <a:tcPr anchor="ctr"/>
+                </a:tc>
+                <a:extLst>
+                  <a:ext uri="{0D108BD9-81ED-4DB2-BD59-A6C34878D82A}">
+                    <a16:rowId xmlns:a16="http://schemas.microsoft.com/office/drawing/2014/main" val="2640869761"/>
+                  </a:ext>
+                </a:extLst>
+              </a:tr>
+            </a:tbl>
+          </a:graphicData>
+        </a:graphic>
+      </p:graphicFrame>
+      <p:sp>
+        <p:nvSpPr>
+          <p:cNvPr id="24" name="Flecha: hacia abajo 23">
+            <a:extLst>
+              <a:ext uri="{FF2B5EF4-FFF2-40B4-BE49-F238E27FC236}">
+                <a16:creationId xmlns:a16="http://schemas.microsoft.com/office/drawing/2014/main" id="{BD71DD27-6109-44A4-AAAA-7E9E19AC7AA7}"/>
+              </a:ext>
+            </a:extLst>
+          </p:cNvPr>
+          <p:cNvSpPr/>
+          <p:nvPr/>
+        </p:nvSpPr>
+        <p:spPr>
+          <a:xfrm rot="10800000">
+            <a:off x="3627796" y="2055542"/>
+            <a:ext cx="872197" cy="1621301"/>
+          </a:xfrm>
+          <a:prstGeom prst="downArrow">
+            <a:avLst/>
+          </a:prstGeom>
+        </p:spPr>
+        <p:style>
+          <a:lnRef idx="2">
+            <a:schemeClr val="accent1">
+              <a:shade val="50000"/>
+            </a:schemeClr>
+          </a:lnRef>
+          <a:fillRef idx="1">
+            <a:schemeClr val="accent1"/>
+          </a:fillRef>
+          <a:effectRef idx="0">
+            <a:schemeClr val="accent1"/>
+          </a:effectRef>
+          <a:fontRef idx="minor">
+            <a:schemeClr val="lt1"/>
+          </a:fontRef>
+        </p:style>
+        <p:txBody>
+          <a:bodyPr rtlCol="0" anchor="ctr"/>
+          <a:lstStyle/>
+          <a:p>
+            <a:pPr algn="ctr"/>
+            <a:endParaRPr lang="es-ES" dirty="0"/>
+          </a:p>
+        </p:txBody>
+      </p:sp>
+      <p:sp>
+        <p:nvSpPr>
+          <p:cNvPr id="25" name="CuadroTexto 24">
+            <a:extLst>
+              <a:ext uri="{FF2B5EF4-FFF2-40B4-BE49-F238E27FC236}">
+                <a16:creationId xmlns:a16="http://schemas.microsoft.com/office/drawing/2014/main" id="{BAA4CAEC-83E6-49BD-8A63-9018C9A46C89}"/>
+              </a:ext>
+            </a:extLst>
+          </p:cNvPr>
+          <p:cNvSpPr txBox="1"/>
+          <p:nvPr/>
+        </p:nvSpPr>
+        <p:spPr>
+          <a:xfrm>
+            <a:off x="4269511" y="2157495"/>
+            <a:ext cx="2405576" cy="923330"/>
+          </a:xfrm>
+          <a:prstGeom prst="rect">
+            <a:avLst/>
+          </a:prstGeom>
+          <a:noFill/>
+        </p:spPr>
+        <p:txBody>
+          <a:bodyPr wrap="square" rtlCol="0">
+            <a:spAutoFit/>
+          </a:bodyPr>
+          <a:lstStyle/>
+          <a:p>
+            <a:pPr algn="ctr"/>
+            <a:r>
+              <a:rPr lang="es-ES" dirty="0"/>
+              <a:t>En base a SCADA mostramos Ingeboards datos correctivos </a:t>
+            </a:r>
+          </a:p>
+        </p:txBody>
+      </p:sp>
+      <p:sp>
+        <p:nvSpPr>
+          <p:cNvPr id="27" name="CuadroTexto 26">
+            <a:extLst>
+              <a:ext uri="{FF2B5EF4-FFF2-40B4-BE49-F238E27FC236}">
+                <a16:creationId xmlns:a16="http://schemas.microsoft.com/office/drawing/2014/main" id="{0BDD37B1-7EAD-4FC4-938C-0C0DCFA95659}"/>
+              </a:ext>
+            </a:extLst>
+          </p:cNvPr>
+          <p:cNvSpPr txBox="1"/>
+          <p:nvPr/>
+        </p:nvSpPr>
+        <p:spPr>
+          <a:xfrm>
+            <a:off x="8850886" y="5950401"/>
+            <a:ext cx="2698687" cy="369332"/>
+          </a:xfrm>
+          <a:prstGeom prst="rect">
+            <a:avLst/>
+          </a:prstGeom>
+          <a:noFill/>
+          <a:ln>
+            <a:solidFill>
+              <a:schemeClr val="tx1"/>
+            </a:solidFill>
+          </a:ln>
+        </p:spPr>
+        <p:txBody>
+          <a:bodyPr wrap="none" rtlCol="0">
+            <a:spAutoFit/>
+          </a:bodyPr>
+          <a:lstStyle/>
+          <a:p>
+            <a:r>
+              <a:rPr lang="es-ES" dirty="0"/>
+              <a:t>Activos = Aerogeneradores</a:t>
+            </a:r>
+          </a:p>
+        </p:txBody>
+      </p:sp>
+    </p:spTree>
+    <p:extLst>
+      <p:ext uri="{BB962C8B-B14F-4D97-AF65-F5344CB8AC3E}">
+        <p14:creationId xmlns:p14="http://schemas.microsoft.com/office/powerpoint/2010/main" val="1714317586"/>
+      </p:ext>
+    </p:extLst>
+  </p:cSld>
+  <p:clrMapOvr>
+    <a:masterClrMapping/>
+  </p:clrMapOvr>
+</p:sld>
+</file>
+
+<file path=ppt/slides/slide3.xml><?xml version="1.0" encoding="utf-8"?>
+<p:sld xmlns:a="http://schemas.openxmlformats.org/drawingml/2006/main" xmlns:r="http://schemas.openxmlformats.org/officeDocument/2006/relationships" xmlns:p="http://schemas.openxmlformats.org/presentationml/2006/main">
+  <p:cSld>
+    <p:spTree>
+      <p:nvGrpSpPr>
+        <p:cNvPr id="1" name=""/>
+        <p:cNvGrpSpPr/>
+        <p:nvPr/>
+      </p:nvGrpSpPr>
+      <p:grpSpPr>
+        <a:xfrm>
+          <a:off x="0" y="0"/>
+          <a:ext cx="0" cy="0"/>
+          <a:chOff x="0" y="0"/>
+          <a:chExt cx="0" cy="0"/>
+        </a:xfrm>
+      </p:grpSpPr>
+      <p:pic>
+        <p:nvPicPr>
+          <p:cNvPr id="8" name="Imagen 7">
+            <a:extLst>
+              <a:ext uri="{FF2B5EF4-FFF2-40B4-BE49-F238E27FC236}">
+                <a16:creationId xmlns:a16="http://schemas.microsoft.com/office/drawing/2014/main" id="{E5CAA04D-CFB9-4491-A7C8-74B6D50D3C51}"/>
+              </a:ext>
+            </a:extLst>
+          </p:cNvPr>
+          <p:cNvPicPr>
+            <a:picLocks noChangeAspect="1"/>
+          </p:cNvPicPr>
+          <p:nvPr/>
+        </p:nvPicPr>
+        <p:blipFill>
+          <a:blip r:embed="rId2"/>
+          <a:stretch>
+            <a:fillRect/>
+          </a:stretch>
+        </p:blipFill>
+        <p:spPr>
+          <a:xfrm>
+            <a:off x="1914084" y="68405"/>
+            <a:ext cx="1674421" cy="2419498"/>
+          </a:xfrm>
+          <a:prstGeom prst="rect">
+            <a:avLst/>
+          </a:prstGeom>
+        </p:spPr>
+      </p:pic>
+      <p:pic>
+        <p:nvPicPr>
+          <p:cNvPr id="1032" name="Picture 8" descr="Imagen relacionada">
+            <a:extLst>
+              <a:ext uri="{FF2B5EF4-FFF2-40B4-BE49-F238E27FC236}">
+                <a16:creationId xmlns:a16="http://schemas.microsoft.com/office/drawing/2014/main" id="{9E668104-5B66-45E9-8E53-FE51DB146D10}"/>
+              </a:ext>
+            </a:extLst>
+          </p:cNvPr>
+          <p:cNvPicPr>
+            <a:picLocks noChangeAspect="1" noChangeArrowheads="1"/>
+          </p:cNvPicPr>
+          <p:nvPr/>
+        </p:nvPicPr>
+        <p:blipFill>
+          <a:blip r:embed="rId3">
+            <a:extLst>
+              <a:ext uri="{28A0092B-C50C-407E-A947-70E740481C1C}">
+                <a14:useLocalDpi xmlns:a14="http://schemas.microsoft.com/office/drawing/2010/main" val="0"/>
+              </a:ext>
+            </a:extLst>
+          </a:blip>
+          <a:srcRect/>
+          <a:stretch>
+            <a:fillRect/>
+          </a:stretch>
+        </p:blipFill>
+        <p:spPr bwMode="auto">
+          <a:xfrm>
+            <a:off x="1597157" y="3429000"/>
+            <a:ext cx="2308274" cy="2308274"/>
+          </a:xfrm>
+          <a:prstGeom prst="rect">
+            <a:avLst/>
+          </a:prstGeom>
+          <a:noFill/>
+          <a:extLst>
+            <a:ext uri="{909E8E84-426E-40DD-AFC4-6F175D3DCCD1}">
+              <a14:hiddenFill xmlns:a14="http://schemas.microsoft.com/office/drawing/2010/main">
+                <a:solidFill>
+                  <a:srgbClr val="FFFFFF"/>
+                </a:solidFill>
+              </a14:hiddenFill>
+            </a:ext>
+          </a:extLst>
+        </p:spPr>
+      </p:pic>
+      <p:sp>
+        <p:nvSpPr>
+          <p:cNvPr id="12" name="CuadroTexto 11">
+            <a:extLst>
+              <a:ext uri="{FF2B5EF4-FFF2-40B4-BE49-F238E27FC236}">
+                <a16:creationId xmlns:a16="http://schemas.microsoft.com/office/drawing/2014/main" id="{C446F7B3-21F0-4800-A9D2-00DC83791B20}"/>
+              </a:ext>
+            </a:extLst>
+          </p:cNvPr>
+          <p:cNvSpPr txBox="1"/>
+          <p:nvPr/>
+        </p:nvSpPr>
+        <p:spPr>
+          <a:xfrm>
+            <a:off x="2008173" y="2517207"/>
+            <a:ext cx="1486241" cy="430887"/>
+          </a:xfrm>
+          <a:prstGeom prst="rect">
+            <a:avLst/>
+          </a:prstGeom>
+          <a:noFill/>
+        </p:spPr>
+        <p:txBody>
+          <a:bodyPr wrap="none" rtlCol="0">
+            <a:spAutoFit/>
+          </a:bodyPr>
+          <a:lstStyle/>
+          <a:p>
+            <a:r>
+              <a:rPr lang="es-ES" sz="2200" b="1" dirty="0"/>
+              <a:t>Ingeboards</a:t>
+            </a:r>
+          </a:p>
+        </p:txBody>
+      </p:sp>
+      <p:sp>
+        <p:nvSpPr>
+          <p:cNvPr id="14" name="CuadroTexto 13">
+            <a:extLst>
+              <a:ext uri="{FF2B5EF4-FFF2-40B4-BE49-F238E27FC236}">
+                <a16:creationId xmlns:a16="http://schemas.microsoft.com/office/drawing/2014/main" id="{8C99631C-4862-4F20-90CE-B43E4466DE22}"/>
+              </a:ext>
+            </a:extLst>
+          </p:cNvPr>
+          <p:cNvSpPr txBox="1"/>
+          <p:nvPr/>
+        </p:nvSpPr>
+        <p:spPr>
+          <a:xfrm>
+            <a:off x="2260711" y="5737274"/>
+            <a:ext cx="981166" cy="430887"/>
+          </a:xfrm>
+          <a:prstGeom prst="rect">
+            <a:avLst/>
+          </a:prstGeom>
+          <a:noFill/>
+        </p:spPr>
+        <p:txBody>
+          <a:bodyPr wrap="none" rtlCol="0">
+            <a:spAutoFit/>
+          </a:bodyPr>
+          <a:lstStyle/>
+          <a:p>
+            <a:r>
+              <a:rPr lang="es-ES" sz="2200" b="1" dirty="0"/>
+              <a:t>SCADA</a:t>
+            </a:r>
+          </a:p>
+        </p:txBody>
+      </p:sp>
+      <p:sp>
+        <p:nvSpPr>
+          <p:cNvPr id="13" name="CuadroTexto 12">
+            <a:extLst>
+              <a:ext uri="{FF2B5EF4-FFF2-40B4-BE49-F238E27FC236}">
+                <a16:creationId xmlns:a16="http://schemas.microsoft.com/office/drawing/2014/main" id="{B1553E4C-FE45-4839-95B2-C49751228D26}"/>
+              </a:ext>
+            </a:extLst>
+          </p:cNvPr>
+          <p:cNvSpPr txBox="1"/>
+          <p:nvPr/>
+        </p:nvSpPr>
+        <p:spPr>
+          <a:xfrm>
+            <a:off x="3905431" y="82145"/>
+            <a:ext cx="2405576" cy="1631216"/>
+          </a:xfrm>
+          <a:prstGeom prst="rect">
+            <a:avLst/>
+          </a:prstGeom>
+          <a:noFill/>
+          <a:ln>
+            <a:solidFill>
+              <a:schemeClr val="tx1"/>
+            </a:solidFill>
+          </a:ln>
+        </p:spPr>
+        <p:txBody>
+          <a:bodyPr wrap="square" rtlCol="0">
+            <a:spAutoFit/>
+          </a:bodyPr>
+          <a:lstStyle/>
+          <a:p>
+            <a:r>
+              <a:rPr lang="es-ES" sz="2000" dirty="0"/>
+              <a:t>Actuación.</a:t>
+            </a:r>
+          </a:p>
+          <a:p>
+            <a:r>
+              <a:rPr lang="es-ES" sz="2000" b="1" dirty="0"/>
+              <a:t>Activos</a:t>
+            </a:r>
+            <a:r>
+              <a:rPr lang="es-ES" sz="2000" dirty="0"/>
+              <a:t>.</a:t>
+            </a:r>
+          </a:p>
+          <a:p>
+            <a:r>
+              <a:rPr lang="es-ES" sz="2000" dirty="0"/>
+              <a:t>Parques.</a:t>
+            </a:r>
+          </a:p>
+          <a:p>
+            <a:r>
+              <a:rPr lang="es-ES" sz="2000" dirty="0"/>
+              <a:t>Informes de trabajo.</a:t>
+            </a:r>
+          </a:p>
+          <a:p>
+            <a:r>
+              <a:rPr lang="es-ES" sz="2000" dirty="0"/>
+              <a:t>Técnicos.</a:t>
+            </a:r>
+          </a:p>
+        </p:txBody>
+      </p:sp>
+      <p:sp>
+        <p:nvSpPr>
+          <p:cNvPr id="16" name="CuadroTexto 15">
+            <a:extLst>
+              <a:ext uri="{FF2B5EF4-FFF2-40B4-BE49-F238E27FC236}">
+                <a16:creationId xmlns:a16="http://schemas.microsoft.com/office/drawing/2014/main" id="{BF849644-78F1-4ECC-9654-2C77C5EA2583}"/>
+              </a:ext>
+            </a:extLst>
+          </p:cNvPr>
+          <p:cNvSpPr txBox="1"/>
+          <p:nvPr/>
+        </p:nvSpPr>
+        <p:spPr>
+          <a:xfrm>
+            <a:off x="3905431" y="3765188"/>
+            <a:ext cx="2889264" cy="2554545"/>
+          </a:xfrm>
+          <a:prstGeom prst="rect">
+            <a:avLst/>
+          </a:prstGeom>
+          <a:noFill/>
+          <a:ln>
+            <a:solidFill>
+              <a:schemeClr val="tx1"/>
+            </a:solidFill>
+          </a:ln>
+        </p:spPr>
+        <p:txBody>
+          <a:bodyPr wrap="square" rtlCol="0">
+            <a:spAutoFit/>
+          </a:bodyPr>
+          <a:lstStyle/>
+          <a:p>
+            <a:r>
+              <a:rPr lang="es-ES" sz="2000" dirty="0"/>
+              <a:t>Datos de cada uno de los </a:t>
+            </a:r>
+            <a:r>
+              <a:rPr lang="es-ES" sz="2000" b="1" dirty="0"/>
+              <a:t>activos</a:t>
+            </a:r>
+            <a:r>
+              <a:rPr lang="es-ES" sz="2000" dirty="0"/>
+              <a:t>:</a:t>
+            </a:r>
+          </a:p>
+          <a:p>
+            <a:pPr marL="285750" indent="-285750">
+              <a:buFont typeface="Arial" panose="020B0604020202020204" pitchFamily="34" charset="0"/>
+              <a:buChar char="•"/>
+            </a:pPr>
+            <a:r>
+              <a:rPr lang="es-ES" sz="2000" dirty="0"/>
+              <a:t>Temperaturas.</a:t>
+            </a:r>
+          </a:p>
+          <a:p>
+            <a:pPr marL="285750" indent="-285750">
+              <a:buFont typeface="Arial" panose="020B0604020202020204" pitchFamily="34" charset="0"/>
+              <a:buChar char="•"/>
+            </a:pPr>
+            <a:r>
+              <a:rPr lang="es-ES" sz="2000" dirty="0"/>
+              <a:t>Velocidad de viento.</a:t>
+            </a:r>
+          </a:p>
+          <a:p>
+            <a:pPr marL="285750" indent="-285750">
+              <a:buFont typeface="Arial" panose="020B0604020202020204" pitchFamily="34" charset="0"/>
+              <a:buChar char="•"/>
+            </a:pPr>
+            <a:r>
+              <a:rPr lang="es-ES" sz="2000" dirty="0"/>
+              <a:t>Nivel de aceite.</a:t>
+            </a:r>
+          </a:p>
+          <a:p>
+            <a:r>
+              <a:rPr lang="es-ES" sz="2000" dirty="0"/>
+              <a:t>Datos de errores:</a:t>
+            </a:r>
+          </a:p>
+          <a:p>
+            <a:pPr marL="285750" indent="-285750">
+              <a:buFont typeface="Arial" panose="020B0604020202020204" pitchFamily="34" charset="0"/>
+              <a:buChar char="•"/>
+            </a:pPr>
+            <a:r>
+              <a:rPr lang="es-ES" sz="2000" dirty="0"/>
+              <a:t>Log de incidentes.</a:t>
+            </a:r>
+          </a:p>
+          <a:p>
+            <a:pPr marL="285750" indent="-285750">
+              <a:buFont typeface="Arial" panose="020B0604020202020204" pitchFamily="34" charset="0"/>
+              <a:buChar char="•"/>
+            </a:pPr>
+            <a:r>
+              <a:rPr lang="es-ES" sz="2000" dirty="0"/>
+              <a:t>Paradas de aeros.</a:t>
+            </a:r>
+          </a:p>
+        </p:txBody>
+      </p:sp>
+      <p:cxnSp>
+        <p:nvCxnSpPr>
+          <p:cNvPr id="18" name="Conector recto 17">
+            <a:extLst>
+              <a:ext uri="{FF2B5EF4-FFF2-40B4-BE49-F238E27FC236}">
+                <a16:creationId xmlns:a16="http://schemas.microsoft.com/office/drawing/2014/main" id="{5F7875CD-E960-49C2-A243-DE350165712D}"/>
+              </a:ext>
+            </a:extLst>
+          </p:cNvPr>
+          <p:cNvCxnSpPr>
+            <a:cxnSpLocks/>
+          </p:cNvCxnSpPr>
+          <p:nvPr/>
+        </p:nvCxnSpPr>
+        <p:spPr>
+          <a:xfrm>
+            <a:off x="0" y="3080825"/>
+            <a:ext cx="7019778" cy="0"/>
+          </a:xfrm>
+          <a:prstGeom prst="line">
+            <a:avLst/>
+          </a:prstGeom>
+          <a:ln w="76200">
+            <a:prstDash val="sysDash"/>
+          </a:ln>
+        </p:spPr>
+        <p:style>
+          <a:lnRef idx="1">
+            <a:schemeClr val="accent1"/>
+          </a:lnRef>
+          <a:fillRef idx="0">
+            <a:schemeClr val="accent1"/>
+          </a:fillRef>
+          <a:effectRef idx="0">
+            <a:schemeClr val="accent1"/>
+          </a:effectRef>
+          <a:fontRef idx="minor">
+            <a:schemeClr val="tx1"/>
+          </a:fontRef>
+        </p:style>
+      </p:cxnSp>
+      <p:cxnSp>
+        <p:nvCxnSpPr>
+          <p:cNvPr id="21" name="Conector recto 20">
+            <a:extLst>
+              <a:ext uri="{FF2B5EF4-FFF2-40B4-BE49-F238E27FC236}">
+                <a16:creationId xmlns:a16="http://schemas.microsoft.com/office/drawing/2014/main" id="{C0AB252E-C0CD-42DA-A317-9ED2F21953BB}"/>
+              </a:ext>
+            </a:extLst>
+          </p:cNvPr>
+          <p:cNvCxnSpPr>
+            <a:cxnSpLocks/>
+          </p:cNvCxnSpPr>
+          <p:nvPr/>
+        </p:nvCxnSpPr>
+        <p:spPr>
+          <a:xfrm>
+            <a:off x="7001020" y="0"/>
+            <a:ext cx="0" cy="6963508"/>
+          </a:xfrm>
+          <a:prstGeom prst="line">
+            <a:avLst/>
+          </a:prstGeom>
+          <a:ln w="76200">
+            <a:prstDash val="sysDash"/>
+          </a:ln>
+        </p:spPr>
+        <p:style>
+          <a:lnRef idx="1">
+            <a:schemeClr val="accent1"/>
+          </a:lnRef>
+          <a:fillRef idx="0">
+            <a:schemeClr val="accent1"/>
+          </a:fillRef>
+          <a:effectRef idx="0">
+            <a:schemeClr val="accent1"/>
+          </a:effectRef>
+          <a:fontRef idx="minor">
+            <a:schemeClr val="tx1"/>
+          </a:fontRef>
+        </p:style>
+      </p:cxnSp>
+      <p:sp>
+        <p:nvSpPr>
+          <p:cNvPr id="24" name="Flecha: hacia abajo 23">
+            <a:extLst>
+              <a:ext uri="{FF2B5EF4-FFF2-40B4-BE49-F238E27FC236}">
+                <a16:creationId xmlns:a16="http://schemas.microsoft.com/office/drawing/2014/main" id="{BD71DD27-6109-44A4-AAAA-7E9E19AC7AA7}"/>
+              </a:ext>
+            </a:extLst>
+          </p:cNvPr>
+          <p:cNvSpPr/>
+          <p:nvPr/>
+        </p:nvSpPr>
+        <p:spPr>
+          <a:xfrm rot="10800000">
+            <a:off x="3627793" y="2293033"/>
+            <a:ext cx="872197" cy="1383807"/>
+          </a:xfrm>
+          <a:prstGeom prst="downArrow">
+            <a:avLst/>
+          </a:prstGeom>
+          <a:ln/>
+        </p:spPr>
+        <p:style>
+          <a:lnRef idx="0">
+            <a:schemeClr val="accent4"/>
+          </a:lnRef>
+          <a:fillRef idx="3">
+            <a:schemeClr val="accent4"/>
+          </a:fillRef>
+          <a:effectRef idx="3">
+            <a:schemeClr val="accent4"/>
+          </a:effectRef>
+          <a:fontRef idx="minor">
+            <a:schemeClr val="lt1"/>
+          </a:fontRef>
+        </p:style>
+        <p:txBody>
+          <a:bodyPr rtlCol="0" anchor="ctr"/>
+          <a:lstStyle/>
+          <a:p>
+            <a:pPr algn="ctr"/>
+            <a:endParaRPr lang="es-ES" dirty="0"/>
+          </a:p>
+        </p:txBody>
+      </p:sp>
+      <p:sp>
+        <p:nvSpPr>
+          <p:cNvPr id="7" name="Rectángulo: esquinas redondeadas 6">
+            <a:extLst>
+              <a:ext uri="{FF2B5EF4-FFF2-40B4-BE49-F238E27FC236}">
+                <a16:creationId xmlns:a16="http://schemas.microsoft.com/office/drawing/2014/main" id="{F6AE598C-6606-40B7-87C0-BD54DD43D7AC}"/>
+              </a:ext>
+            </a:extLst>
+          </p:cNvPr>
+          <p:cNvSpPr/>
+          <p:nvPr/>
+        </p:nvSpPr>
+        <p:spPr>
+          <a:xfrm>
+            <a:off x="7329266" y="2487903"/>
+            <a:ext cx="3516922" cy="2893160"/>
+          </a:xfrm>
+          <a:prstGeom prst="roundRect">
+            <a:avLst/>
+          </a:prstGeom>
+        </p:spPr>
+        <p:style>
+          <a:lnRef idx="2">
+            <a:schemeClr val="accent1">
+              <a:shade val="50000"/>
+            </a:schemeClr>
+          </a:lnRef>
+          <a:fillRef idx="1">
+            <a:schemeClr val="accent1"/>
+          </a:fillRef>
+          <a:effectRef idx="0">
+            <a:schemeClr val="accent1"/>
+          </a:effectRef>
+          <a:fontRef idx="minor">
+            <a:schemeClr val="lt1"/>
+          </a:fontRef>
+        </p:style>
+        <p:txBody>
+          <a:bodyPr rtlCol="0" anchor="ctr"/>
+          <a:lstStyle/>
+          <a:p>
+            <a:pPr algn="ctr"/>
+            <a:endParaRPr lang="es-ES" sz="2200" b="1" dirty="0"/>
+          </a:p>
+          <a:p>
+            <a:pPr algn="ctr"/>
+            <a:endParaRPr lang="es-ES" sz="2200" b="1" dirty="0"/>
+          </a:p>
+          <a:p>
+            <a:pPr algn="ctr"/>
+            <a:endParaRPr lang="es-ES" sz="2200" b="1" dirty="0"/>
+          </a:p>
+          <a:p>
+            <a:pPr algn="ctr"/>
+            <a:endParaRPr lang="es-ES" sz="2200" b="1" dirty="0"/>
+          </a:p>
+          <a:p>
+            <a:pPr algn="ctr"/>
+            <a:endParaRPr lang="es-ES" sz="2200" b="1" dirty="0"/>
+          </a:p>
+          <a:p>
+            <a:pPr algn="ctr"/>
+            <a:r>
+              <a:rPr lang="es-ES" sz="2200" b="1" dirty="0"/>
+              <a:t>APLICACIÓN CEP</a:t>
+            </a:r>
+          </a:p>
+          <a:p>
+            <a:pPr algn="ctr"/>
+            <a:r>
+              <a:rPr lang="es-ES" sz="2200" b="1" dirty="0"/>
+              <a:t>[Patrones]</a:t>
+            </a:r>
+          </a:p>
+        </p:txBody>
+      </p:sp>
+      <p:pic>
+        <p:nvPicPr>
+          <p:cNvPr id="1026" name="Picture 2" descr="Resultado de imagen de tuerca png">
+            <a:extLst>
+              <a:ext uri="{FF2B5EF4-FFF2-40B4-BE49-F238E27FC236}">
+                <a16:creationId xmlns:a16="http://schemas.microsoft.com/office/drawing/2014/main" id="{74C764BC-A70F-493B-984F-491C72AF02F8}"/>
+              </a:ext>
+            </a:extLst>
+          </p:cNvPr>
+          <p:cNvPicPr>
+            <a:picLocks noChangeAspect="1" noChangeArrowheads="1"/>
+          </p:cNvPicPr>
+          <p:nvPr/>
+        </p:nvPicPr>
+        <p:blipFill>
+          <a:blip r:embed="rId4">
+            <a:extLst>
+              <a:ext uri="{28A0092B-C50C-407E-A947-70E740481C1C}">
+                <a14:useLocalDpi xmlns:a14="http://schemas.microsoft.com/office/drawing/2010/main" val="0"/>
+              </a:ext>
+            </a:extLst>
+          </a:blip>
+          <a:srcRect/>
+          <a:stretch>
+            <a:fillRect/>
+          </a:stretch>
+        </p:blipFill>
+        <p:spPr bwMode="auto">
+          <a:xfrm>
+            <a:off x="8475112" y="3137331"/>
+            <a:ext cx="1255713" cy="1255713"/>
+          </a:xfrm>
+          <a:prstGeom prst="rect">
+            <a:avLst/>
+          </a:prstGeom>
+          <a:noFill/>
+          <a:extLst>
+            <a:ext uri="{909E8E84-426E-40DD-AFC4-6F175D3DCCD1}">
+              <a14:hiddenFill xmlns:a14="http://schemas.microsoft.com/office/drawing/2010/main">
+                <a:solidFill>
+                  <a:srgbClr val="FFFFFF"/>
+                </a:solidFill>
+              </a14:hiddenFill>
+            </a:ext>
+          </a:extLst>
+        </p:spPr>
+      </p:pic>
+      <p:sp>
+        <p:nvSpPr>
+          <p:cNvPr id="26" name="Flecha: hacia abajo 25">
+            <a:extLst>
+              <a:ext uri="{FF2B5EF4-FFF2-40B4-BE49-F238E27FC236}">
+                <a16:creationId xmlns:a16="http://schemas.microsoft.com/office/drawing/2014/main" id="{8D20A0B6-EC28-44D2-BD05-6DEFDBDD910E}"/>
+              </a:ext>
+            </a:extLst>
+          </p:cNvPr>
+          <p:cNvSpPr/>
+          <p:nvPr/>
+        </p:nvSpPr>
+        <p:spPr>
+          <a:xfrm rot="10800000">
+            <a:off x="8666869" y="1444546"/>
+            <a:ext cx="872197" cy="1621301"/>
+          </a:xfrm>
+          <a:prstGeom prst="downArrow">
+            <a:avLst/>
+          </a:prstGeom>
+          <a:ln/>
+        </p:spPr>
+        <p:style>
+          <a:lnRef idx="0">
+            <a:schemeClr val="accent4"/>
+          </a:lnRef>
+          <a:fillRef idx="3">
+            <a:schemeClr val="accent4"/>
+          </a:fillRef>
+          <a:effectRef idx="3">
+            <a:schemeClr val="accent4"/>
+          </a:effectRef>
+          <a:fontRef idx="minor">
+            <a:schemeClr val="lt1"/>
+          </a:fontRef>
+        </p:style>
+        <p:txBody>
+          <a:bodyPr rtlCol="0" anchor="ctr"/>
+          <a:lstStyle/>
+          <a:p>
+            <a:pPr algn="ctr"/>
+            <a:endParaRPr lang="es-ES" dirty="0"/>
+          </a:p>
+        </p:txBody>
+      </p:sp>
+      <p:sp>
+        <p:nvSpPr>
+          <p:cNvPr id="9" name="CuadroTexto 8">
+            <a:extLst>
+              <a:ext uri="{FF2B5EF4-FFF2-40B4-BE49-F238E27FC236}">
+                <a16:creationId xmlns:a16="http://schemas.microsoft.com/office/drawing/2014/main" id="{F80A241C-0473-440B-A17C-A95C51CC5FE5}"/>
+              </a:ext>
+            </a:extLst>
+          </p:cNvPr>
+          <p:cNvSpPr txBox="1"/>
+          <p:nvPr/>
+        </p:nvSpPr>
+        <p:spPr>
+          <a:xfrm>
+            <a:off x="7582489" y="726731"/>
+            <a:ext cx="3117159" cy="646331"/>
+          </a:xfrm>
+          <a:prstGeom prst="rect">
+            <a:avLst/>
+          </a:prstGeom>
+          <a:solidFill>
+            <a:srgbClr val="FF0000"/>
+          </a:solidFill>
+          <a:ln>
+            <a:solidFill>
+              <a:schemeClr val="tx1"/>
+            </a:solidFill>
+          </a:ln>
+        </p:spPr>
+        <p:txBody>
+          <a:bodyPr wrap="square" rtlCol="0">
+            <a:spAutoFit/>
+          </a:bodyPr>
+          <a:lstStyle/>
+          <a:p>
+            <a:pPr algn="ctr"/>
+            <a:r>
+              <a:rPr lang="es-ES" b="1" dirty="0">
+                <a:solidFill>
+                  <a:schemeClr val="bg1"/>
+                </a:solidFill>
+              </a:rPr>
+              <a:t>ALERTA. PARADA DE AERO PELIGRO CAÍDA</a:t>
+            </a:r>
+          </a:p>
+        </p:txBody>
+      </p:sp>
+      <p:sp>
+        <p:nvSpPr>
+          <p:cNvPr id="28" name="CuadroTexto 27">
+            <a:extLst>
+              <a:ext uri="{FF2B5EF4-FFF2-40B4-BE49-F238E27FC236}">
+                <a16:creationId xmlns:a16="http://schemas.microsoft.com/office/drawing/2014/main" id="{50D94609-D9FE-4F00-A93E-637AB2A23E3F}"/>
+              </a:ext>
+            </a:extLst>
+          </p:cNvPr>
+          <p:cNvSpPr txBox="1"/>
+          <p:nvPr/>
+        </p:nvSpPr>
+        <p:spPr>
+          <a:xfrm>
+            <a:off x="3905432" y="1734363"/>
+            <a:ext cx="2405576" cy="369332"/>
+          </a:xfrm>
+          <a:prstGeom prst="rect">
+            <a:avLst/>
+          </a:prstGeom>
+          <a:solidFill>
+            <a:srgbClr val="FF0000"/>
+          </a:solidFill>
+          <a:ln>
+            <a:solidFill>
+              <a:schemeClr val="tx1"/>
+            </a:solidFill>
+          </a:ln>
+        </p:spPr>
+        <p:txBody>
+          <a:bodyPr wrap="square" rtlCol="0">
+            <a:spAutoFit/>
+          </a:bodyPr>
+          <a:lstStyle/>
+          <a:p>
+            <a:pPr algn="ctr"/>
+            <a:r>
+              <a:rPr lang="es-ES" b="1" dirty="0">
+                <a:solidFill>
+                  <a:schemeClr val="bg1"/>
+                </a:solidFill>
+              </a:rPr>
+              <a:t>Alertas predictivas</a:t>
+            </a:r>
+          </a:p>
+        </p:txBody>
+      </p:sp>
+      <p:sp>
+        <p:nvSpPr>
+          <p:cNvPr id="30" name="Flecha: hacia abajo 29">
+            <a:extLst>
+              <a:ext uri="{FF2B5EF4-FFF2-40B4-BE49-F238E27FC236}">
+                <a16:creationId xmlns:a16="http://schemas.microsoft.com/office/drawing/2014/main" id="{D0B3E69C-EED7-49C1-8F2B-A40A8592BD44}"/>
+              </a:ext>
+            </a:extLst>
+          </p:cNvPr>
+          <p:cNvSpPr/>
+          <p:nvPr/>
+        </p:nvSpPr>
+        <p:spPr>
+          <a:xfrm rot="3698463">
+            <a:off x="6505940" y="1011585"/>
+            <a:ext cx="872197" cy="1071133"/>
+          </a:xfrm>
+          <a:prstGeom prst="downArrow">
+            <a:avLst/>
+          </a:prstGeom>
+          <a:ln/>
+        </p:spPr>
+        <p:style>
+          <a:lnRef idx="0">
+            <a:schemeClr val="accent2"/>
+          </a:lnRef>
+          <a:fillRef idx="3">
+            <a:schemeClr val="accent2"/>
+          </a:fillRef>
+          <a:effectRef idx="3">
+            <a:schemeClr val="accent2"/>
+          </a:effectRef>
+          <a:fontRef idx="minor">
+            <a:schemeClr val="lt1"/>
+          </a:fontRef>
+        </p:style>
+        <p:txBody>
+          <a:bodyPr rtlCol="0" anchor="ctr"/>
+          <a:lstStyle/>
+          <a:p>
+            <a:pPr algn="ctr"/>
+            <a:endParaRPr lang="es-ES" dirty="0"/>
+          </a:p>
+        </p:txBody>
+      </p:sp>
+      <p:sp>
+        <p:nvSpPr>
+          <p:cNvPr id="31" name="Flecha: hacia abajo 30">
+            <a:extLst>
+              <a:ext uri="{FF2B5EF4-FFF2-40B4-BE49-F238E27FC236}">
+                <a16:creationId xmlns:a16="http://schemas.microsoft.com/office/drawing/2014/main" id="{764C0A78-EEAB-42B2-BC0F-1D2486C584E9}"/>
+              </a:ext>
+            </a:extLst>
+          </p:cNvPr>
+          <p:cNvSpPr/>
+          <p:nvPr/>
+        </p:nvSpPr>
+        <p:spPr>
+          <a:xfrm rot="13951412">
+            <a:off x="6686280" y="4243535"/>
+            <a:ext cx="872197" cy="1621301"/>
+          </a:xfrm>
+          <a:prstGeom prst="downArrow">
+            <a:avLst/>
+          </a:prstGeom>
+          <a:ln/>
+        </p:spPr>
+        <p:style>
+          <a:lnRef idx="0">
+            <a:schemeClr val="accent4"/>
+          </a:lnRef>
+          <a:fillRef idx="3">
+            <a:schemeClr val="accent4"/>
+          </a:fillRef>
+          <a:effectRef idx="3">
+            <a:schemeClr val="accent4"/>
+          </a:effectRef>
+          <a:fontRef idx="minor">
+            <a:schemeClr val="lt1"/>
+          </a:fontRef>
+        </p:style>
+        <p:txBody>
+          <a:bodyPr rtlCol="0" anchor="ctr"/>
+          <a:lstStyle/>
+          <a:p>
+            <a:pPr algn="ctr"/>
+            <a:endParaRPr lang="es-ES" dirty="0"/>
+          </a:p>
+        </p:txBody>
+      </p:sp>
+    </p:spTree>
+    <p:extLst>
+      <p:ext uri="{BB962C8B-B14F-4D97-AF65-F5344CB8AC3E}">
+        <p14:creationId xmlns:p14="http://schemas.microsoft.com/office/powerpoint/2010/main" val="3159167685"/>
+      </p:ext>
+    </p:extLst>
+  </p:cSld>
+  <p:clrMapOvr>
+    <a:masterClrMapping/>
+  </p:clrMapOvr>
+</p:sld>
+</file>
+
+<file path=ppt/slides/slide4.xml><?xml version="1.0" encoding="utf-8"?>
+<p:sld xmlns:a="http://schemas.openxmlformats.org/drawingml/2006/main" xmlns:r="http://schemas.openxmlformats.org/officeDocument/2006/relationships" xmlns:p="http://schemas.openxmlformats.org/presentationml/2006/main">
+  <p:cSld>
+    <p:spTree>
+      <p:nvGrpSpPr>
+        <p:cNvPr id="1" name=""/>
+        <p:cNvGrpSpPr/>
+        <p:nvPr/>
+      </p:nvGrpSpPr>
+      <p:grpSpPr>
+        <a:xfrm>
+          <a:off x="0" y="0"/>
+          <a:ext cx="0" cy="0"/>
+          <a:chOff x="0" y="0"/>
+          <a:chExt cx="0" cy="0"/>
+        </a:xfrm>
+      </p:grpSpPr>
+      <p:cxnSp>
+        <p:nvCxnSpPr>
+          <p:cNvPr id="5" name="Conector recto 4">
+            <a:extLst>
+              <a:ext uri="{FF2B5EF4-FFF2-40B4-BE49-F238E27FC236}">
+                <a16:creationId xmlns:a16="http://schemas.microsoft.com/office/drawing/2014/main" id="{32FFCCA6-5972-4286-8A14-5E0CF3E9B290}"/>
+              </a:ext>
+            </a:extLst>
+          </p:cNvPr>
+          <p:cNvCxnSpPr/>
+          <p:nvPr/>
+        </p:nvCxnSpPr>
+        <p:spPr>
+          <a:xfrm>
+            <a:off x="3165231" y="844062"/>
+            <a:ext cx="0" cy="2584938"/>
+          </a:xfrm>
+          <a:prstGeom prst="line">
+            <a:avLst/>
+          </a:prstGeom>
+          <a:ln>
+            <a:solidFill>
+              <a:schemeClr val="tx1"/>
+            </a:solidFill>
+          </a:ln>
+        </p:spPr>
+        <p:style>
+          <a:lnRef idx="1">
+            <a:schemeClr val="accent1"/>
+          </a:lnRef>
+          <a:fillRef idx="0">
+            <a:schemeClr val="accent1"/>
+          </a:fillRef>
+          <a:effectRef idx="0">
+            <a:schemeClr val="accent1"/>
+          </a:effectRef>
+          <a:fontRef idx="minor">
+            <a:schemeClr val="tx1"/>
+          </a:fontRef>
+        </p:style>
+      </p:cxnSp>
+      <p:cxnSp>
+        <p:nvCxnSpPr>
+          <p:cNvPr id="8" name="Conector recto 7">
+            <a:extLst>
+              <a:ext uri="{FF2B5EF4-FFF2-40B4-BE49-F238E27FC236}">
+                <a16:creationId xmlns:a16="http://schemas.microsoft.com/office/drawing/2014/main" id="{A959383B-8976-41CA-BEEC-2DC6BD4A502F}"/>
+              </a:ext>
+            </a:extLst>
+          </p:cNvPr>
+          <p:cNvCxnSpPr/>
+          <p:nvPr/>
+        </p:nvCxnSpPr>
+        <p:spPr>
+          <a:xfrm>
+            <a:off x="2346960" y="844062"/>
+            <a:ext cx="0" cy="2584938"/>
+          </a:xfrm>
+          <a:prstGeom prst="line">
+            <a:avLst/>
+          </a:prstGeom>
+          <a:ln>
+            <a:solidFill>
+              <a:schemeClr val="tx1"/>
+            </a:solidFill>
+          </a:ln>
+        </p:spPr>
+        <p:style>
+          <a:lnRef idx="1">
+            <a:schemeClr val="accent1"/>
+          </a:lnRef>
+          <a:fillRef idx="0">
+            <a:schemeClr val="accent1"/>
+          </a:fillRef>
+          <a:effectRef idx="0">
+            <a:schemeClr val="accent1"/>
+          </a:effectRef>
+          <a:fontRef idx="minor">
+            <a:schemeClr val="tx1"/>
+          </a:fontRef>
+        </p:style>
+      </p:cxnSp>
+      <p:cxnSp>
+        <p:nvCxnSpPr>
+          <p:cNvPr id="9" name="Conector recto 8">
+            <a:extLst>
+              <a:ext uri="{FF2B5EF4-FFF2-40B4-BE49-F238E27FC236}">
+                <a16:creationId xmlns:a16="http://schemas.microsoft.com/office/drawing/2014/main" id="{5DE1DB69-CBFC-4C16-989C-9BCFD08D0DFB}"/>
+              </a:ext>
+            </a:extLst>
+          </p:cNvPr>
+          <p:cNvCxnSpPr/>
+          <p:nvPr/>
+        </p:nvCxnSpPr>
+        <p:spPr>
+          <a:xfrm>
+            <a:off x="3906130" y="844062"/>
+            <a:ext cx="0" cy="2584938"/>
+          </a:xfrm>
+          <a:prstGeom prst="line">
+            <a:avLst/>
+          </a:prstGeom>
+          <a:ln>
+            <a:solidFill>
+              <a:schemeClr val="tx1"/>
+            </a:solidFill>
+          </a:ln>
+        </p:spPr>
+        <p:style>
+          <a:lnRef idx="1">
+            <a:schemeClr val="accent1"/>
+          </a:lnRef>
+          <a:fillRef idx="0">
+            <a:schemeClr val="accent1"/>
+          </a:fillRef>
+          <a:effectRef idx="0">
+            <a:schemeClr val="accent1"/>
+          </a:effectRef>
+          <a:fontRef idx="minor">
+            <a:schemeClr val="tx1"/>
+          </a:fontRef>
+        </p:style>
+      </p:cxnSp>
+      <p:sp>
+        <p:nvSpPr>
+          <p:cNvPr id="12" name="Arco 11">
+            <a:extLst>
+              <a:ext uri="{FF2B5EF4-FFF2-40B4-BE49-F238E27FC236}">
+                <a16:creationId xmlns:a16="http://schemas.microsoft.com/office/drawing/2014/main" id="{12205013-C6DD-4825-8212-3C35F8ACE3EE}"/>
+              </a:ext>
+            </a:extLst>
+          </p:cNvPr>
+          <p:cNvSpPr/>
+          <p:nvPr/>
+        </p:nvSpPr>
+        <p:spPr>
+          <a:xfrm>
+            <a:off x="3155853" y="1642403"/>
+            <a:ext cx="3305906" cy="3573194"/>
+          </a:xfrm>
+          <a:prstGeom prst="arc">
+            <a:avLst/>
+          </a:prstGeom>
+          <a:noFill/>
+          <a:ln>
+            <a:solidFill>
+              <a:schemeClr val="tx1"/>
+            </a:solidFill>
+          </a:ln>
+        </p:spPr>
+        <p:style>
+          <a:lnRef idx="1">
+            <a:schemeClr val="accent1"/>
+          </a:lnRef>
+          <a:fillRef idx="0">
+            <a:schemeClr val="accent1"/>
+          </a:fillRef>
+          <a:effectRef idx="0">
+            <a:schemeClr val="accent1"/>
+          </a:effectRef>
+          <a:fontRef idx="minor">
+            <a:schemeClr val="tx1"/>
+          </a:fontRef>
+        </p:style>
+        <p:txBody>
+          <a:bodyPr rtlCol="0" anchor="ctr"/>
+          <a:lstStyle/>
+          <a:p>
+            <a:pPr algn="ctr"/>
+            <a:endParaRPr lang="es-ES" dirty="0"/>
+          </a:p>
+        </p:txBody>
+      </p:sp>
+      <p:sp>
+        <p:nvSpPr>
+          <p:cNvPr id="13" name="Arco 12">
+            <a:extLst>
+              <a:ext uri="{FF2B5EF4-FFF2-40B4-BE49-F238E27FC236}">
+                <a16:creationId xmlns:a16="http://schemas.microsoft.com/office/drawing/2014/main" id="{46A0E029-534F-42EA-BD5D-973C74A69274}"/>
+              </a:ext>
+            </a:extLst>
+          </p:cNvPr>
+          <p:cNvSpPr/>
+          <p:nvPr/>
+        </p:nvSpPr>
+        <p:spPr>
+          <a:xfrm>
+            <a:off x="3896751" y="1049215"/>
+            <a:ext cx="3305906" cy="3573194"/>
+          </a:xfrm>
+          <a:prstGeom prst="arc">
+            <a:avLst/>
+          </a:prstGeom>
+          <a:noFill/>
+          <a:ln>
+            <a:solidFill>
+              <a:schemeClr val="tx1"/>
+            </a:solidFill>
+          </a:ln>
+        </p:spPr>
+        <p:style>
+          <a:lnRef idx="1">
+            <a:schemeClr val="accent1"/>
+          </a:lnRef>
+          <a:fillRef idx="0">
+            <a:schemeClr val="accent1"/>
+          </a:fillRef>
+          <a:effectRef idx="0">
+            <a:schemeClr val="accent1"/>
+          </a:effectRef>
+          <a:fontRef idx="minor">
+            <a:schemeClr val="tx1"/>
+          </a:fontRef>
+        </p:style>
+        <p:txBody>
+          <a:bodyPr rtlCol="0" anchor="ctr"/>
+          <a:lstStyle/>
+          <a:p>
+            <a:pPr algn="ctr"/>
+            <a:endParaRPr lang="es-ES"/>
+          </a:p>
+        </p:txBody>
+      </p:sp>
+      <p:sp>
+        <p:nvSpPr>
+          <p:cNvPr id="14" name="Arco 13">
+            <a:extLst>
+              <a:ext uri="{FF2B5EF4-FFF2-40B4-BE49-F238E27FC236}">
+                <a16:creationId xmlns:a16="http://schemas.microsoft.com/office/drawing/2014/main" id="{3C0FE9C6-6849-490E-A97C-8F47967A05E0}"/>
+              </a:ext>
+            </a:extLst>
+          </p:cNvPr>
+          <p:cNvSpPr/>
+          <p:nvPr/>
+        </p:nvSpPr>
+        <p:spPr>
+          <a:xfrm>
+            <a:off x="4979965" y="456027"/>
+            <a:ext cx="3193354" cy="6521548"/>
+          </a:xfrm>
+          <a:prstGeom prst="arc">
+            <a:avLst/>
+          </a:prstGeom>
+          <a:noFill/>
+          <a:ln>
+            <a:solidFill>
+              <a:schemeClr val="tx1"/>
+            </a:solidFill>
+          </a:ln>
+        </p:spPr>
+        <p:style>
+          <a:lnRef idx="1">
+            <a:schemeClr val="accent1"/>
+          </a:lnRef>
+          <a:fillRef idx="0">
+            <a:schemeClr val="accent1"/>
+          </a:fillRef>
+          <a:effectRef idx="0">
+            <a:schemeClr val="accent1"/>
+          </a:effectRef>
+          <a:fontRef idx="minor">
+            <a:schemeClr val="tx1"/>
+          </a:fontRef>
+        </p:style>
+        <p:txBody>
+          <a:bodyPr rtlCol="0" anchor="ctr"/>
+          <a:lstStyle/>
+          <a:p>
+            <a:pPr algn="ctr"/>
+            <a:endParaRPr lang="es-ES"/>
+          </a:p>
+        </p:txBody>
+      </p:sp>
+      <p:sp>
+        <p:nvSpPr>
+          <p:cNvPr id="15" name="Elipse 14">
+            <a:extLst>
+              <a:ext uri="{FF2B5EF4-FFF2-40B4-BE49-F238E27FC236}">
+                <a16:creationId xmlns:a16="http://schemas.microsoft.com/office/drawing/2014/main" id="{53D5E6CA-BE0C-4A43-AC49-FC28E28E3BE9}"/>
+              </a:ext>
+            </a:extLst>
+          </p:cNvPr>
+          <p:cNvSpPr/>
+          <p:nvPr/>
+        </p:nvSpPr>
+        <p:spPr>
+          <a:xfrm>
+            <a:off x="2227387" y="1049215"/>
+            <a:ext cx="239146" cy="230945"/>
+          </a:xfrm>
+          <a:prstGeom prst="ellipse">
+            <a:avLst/>
+          </a:prstGeom>
+          <a:solidFill>
+            <a:srgbClr val="FFFF00"/>
+          </a:solidFill>
+          <a:ln>
+            <a:solidFill>
+              <a:schemeClr val="tx1"/>
+            </a:solidFill>
+          </a:ln>
+        </p:spPr>
+        <p:style>
+          <a:lnRef idx="2">
+            <a:schemeClr val="accent1">
+              <a:shade val="50000"/>
+            </a:schemeClr>
+          </a:lnRef>
+          <a:fillRef idx="1">
+            <a:schemeClr val="accent1"/>
+          </a:fillRef>
+          <a:effectRef idx="0">
+            <a:schemeClr val="accent1"/>
+          </a:effectRef>
+          <a:fontRef idx="minor">
+            <a:schemeClr val="lt1"/>
+          </a:fontRef>
+        </p:style>
+        <p:txBody>
+          <a:bodyPr rtlCol="0" anchor="ctr"/>
+          <a:lstStyle/>
+          <a:p>
+            <a:pPr algn="ctr"/>
+            <a:endParaRPr lang="es-ES"/>
+          </a:p>
+        </p:txBody>
+      </p:sp>
+      <p:sp>
+        <p:nvSpPr>
+          <p:cNvPr id="16" name="Elipse 15">
+            <a:extLst>
+              <a:ext uri="{FF2B5EF4-FFF2-40B4-BE49-F238E27FC236}">
+                <a16:creationId xmlns:a16="http://schemas.microsoft.com/office/drawing/2014/main" id="{2F70B37E-8D65-48B9-8CDD-BE5603CB5A51}"/>
+              </a:ext>
+            </a:extLst>
+          </p:cNvPr>
+          <p:cNvSpPr/>
+          <p:nvPr/>
+        </p:nvSpPr>
+        <p:spPr>
+          <a:xfrm>
+            <a:off x="2230911" y="1642403"/>
+            <a:ext cx="239146" cy="230945"/>
+          </a:xfrm>
+          <a:prstGeom prst="ellipse">
+            <a:avLst/>
+          </a:prstGeom>
+          <a:solidFill>
+            <a:srgbClr val="FFFF00"/>
+          </a:solidFill>
+          <a:ln>
+            <a:solidFill>
+              <a:schemeClr val="tx1"/>
+            </a:solidFill>
+          </a:ln>
+        </p:spPr>
+        <p:style>
+          <a:lnRef idx="2">
+            <a:schemeClr val="accent1">
+              <a:shade val="50000"/>
+            </a:schemeClr>
+          </a:lnRef>
+          <a:fillRef idx="1">
+            <a:schemeClr val="accent1"/>
+          </a:fillRef>
+          <a:effectRef idx="0">
+            <a:schemeClr val="accent1"/>
+          </a:effectRef>
+          <a:fontRef idx="minor">
+            <a:schemeClr val="lt1"/>
+          </a:fontRef>
+        </p:style>
+        <p:txBody>
+          <a:bodyPr rtlCol="0" anchor="ctr"/>
+          <a:lstStyle/>
+          <a:p>
+            <a:pPr algn="ctr"/>
+            <a:endParaRPr lang="es-ES"/>
+          </a:p>
+        </p:txBody>
+      </p:sp>
+      <p:sp>
+        <p:nvSpPr>
+          <p:cNvPr id="17" name="Elipse 16">
+            <a:extLst>
+              <a:ext uri="{FF2B5EF4-FFF2-40B4-BE49-F238E27FC236}">
+                <a16:creationId xmlns:a16="http://schemas.microsoft.com/office/drawing/2014/main" id="{8D268A60-F0C7-4C75-A132-244B9F9473D6}"/>
+              </a:ext>
+            </a:extLst>
+          </p:cNvPr>
+          <p:cNvSpPr/>
+          <p:nvPr/>
+        </p:nvSpPr>
+        <p:spPr>
+          <a:xfrm>
+            <a:off x="2227387" y="2235591"/>
+            <a:ext cx="239146" cy="230945"/>
+          </a:xfrm>
+          <a:prstGeom prst="ellipse">
+            <a:avLst/>
+          </a:prstGeom>
+          <a:solidFill>
+            <a:srgbClr val="FFFF00"/>
+          </a:solidFill>
+          <a:ln>
+            <a:solidFill>
+              <a:schemeClr val="tx1"/>
+            </a:solidFill>
+          </a:ln>
+        </p:spPr>
+        <p:style>
+          <a:lnRef idx="2">
+            <a:schemeClr val="accent1">
+              <a:shade val="50000"/>
+            </a:schemeClr>
+          </a:lnRef>
+          <a:fillRef idx="1">
+            <a:schemeClr val="accent1"/>
+          </a:fillRef>
+          <a:effectRef idx="0">
+            <a:schemeClr val="accent1"/>
+          </a:effectRef>
+          <a:fontRef idx="minor">
+            <a:schemeClr val="lt1"/>
+          </a:fontRef>
+        </p:style>
+        <p:txBody>
+          <a:bodyPr rtlCol="0" anchor="ctr"/>
+          <a:lstStyle/>
+          <a:p>
+            <a:pPr algn="ctr"/>
+            <a:endParaRPr lang="es-ES"/>
+          </a:p>
+        </p:txBody>
+      </p:sp>
+      <p:sp>
+        <p:nvSpPr>
+          <p:cNvPr id="18" name="Elipse 17">
+            <a:extLst>
+              <a:ext uri="{FF2B5EF4-FFF2-40B4-BE49-F238E27FC236}">
+                <a16:creationId xmlns:a16="http://schemas.microsoft.com/office/drawing/2014/main" id="{CD7DF6AD-817D-450A-8E49-289A24A4DF3E}"/>
+              </a:ext>
+            </a:extLst>
+          </p:cNvPr>
+          <p:cNvSpPr/>
+          <p:nvPr/>
+        </p:nvSpPr>
+        <p:spPr>
+          <a:xfrm>
+            <a:off x="2225050" y="2835812"/>
+            <a:ext cx="239146" cy="230945"/>
+          </a:xfrm>
+          <a:prstGeom prst="ellipse">
+            <a:avLst/>
+          </a:prstGeom>
+          <a:solidFill>
+            <a:srgbClr val="FFFF00"/>
+          </a:solidFill>
+          <a:ln>
+            <a:solidFill>
+              <a:schemeClr val="tx1"/>
+            </a:solidFill>
+          </a:ln>
+        </p:spPr>
+        <p:style>
+          <a:lnRef idx="2">
+            <a:schemeClr val="accent1">
+              <a:shade val="50000"/>
+            </a:schemeClr>
+          </a:lnRef>
+          <a:fillRef idx="1">
+            <a:schemeClr val="accent1"/>
+          </a:fillRef>
+          <a:effectRef idx="0">
+            <a:schemeClr val="accent1"/>
+          </a:effectRef>
+          <a:fontRef idx="minor">
+            <a:schemeClr val="lt1"/>
+          </a:fontRef>
+        </p:style>
+        <p:txBody>
+          <a:bodyPr rtlCol="0" anchor="ctr"/>
+          <a:lstStyle/>
+          <a:p>
+            <a:pPr algn="ctr"/>
+            <a:endParaRPr lang="es-ES"/>
+          </a:p>
+        </p:txBody>
+      </p:sp>
+      <p:sp>
+        <p:nvSpPr>
+          <p:cNvPr id="20" name="Elipse 19">
+            <a:extLst>
+              <a:ext uri="{FF2B5EF4-FFF2-40B4-BE49-F238E27FC236}">
+                <a16:creationId xmlns:a16="http://schemas.microsoft.com/office/drawing/2014/main" id="{FA563D03-891F-439F-BC7C-04FF6C6EA1C3}"/>
+              </a:ext>
+            </a:extLst>
+          </p:cNvPr>
+          <p:cNvSpPr/>
+          <p:nvPr/>
+        </p:nvSpPr>
+        <p:spPr>
+          <a:xfrm>
+            <a:off x="3045658" y="1049215"/>
+            <a:ext cx="239146" cy="230945"/>
+          </a:xfrm>
+          <a:prstGeom prst="ellipse">
+            <a:avLst/>
+          </a:prstGeom>
+          <a:solidFill>
+            <a:srgbClr val="FFFF00"/>
+          </a:solidFill>
+          <a:ln>
+            <a:solidFill>
+              <a:schemeClr val="tx1"/>
+            </a:solidFill>
+          </a:ln>
+        </p:spPr>
+        <p:style>
+          <a:lnRef idx="2">
+            <a:schemeClr val="accent1">
+              <a:shade val="50000"/>
+            </a:schemeClr>
+          </a:lnRef>
+          <a:fillRef idx="1">
+            <a:schemeClr val="accent1"/>
+          </a:fillRef>
+          <a:effectRef idx="0">
+            <a:schemeClr val="accent1"/>
+          </a:effectRef>
+          <a:fontRef idx="minor">
+            <a:schemeClr val="lt1"/>
+          </a:fontRef>
+        </p:style>
+        <p:txBody>
+          <a:bodyPr rtlCol="0" anchor="ctr"/>
+          <a:lstStyle/>
+          <a:p>
+            <a:pPr algn="ctr"/>
+            <a:endParaRPr lang="es-ES"/>
+          </a:p>
+        </p:txBody>
+      </p:sp>
+      <p:sp>
+        <p:nvSpPr>
+          <p:cNvPr id="21" name="Elipse 20">
+            <a:extLst>
+              <a:ext uri="{FF2B5EF4-FFF2-40B4-BE49-F238E27FC236}">
+                <a16:creationId xmlns:a16="http://schemas.microsoft.com/office/drawing/2014/main" id="{FBE1577A-E5DE-49F6-AD14-99F76FD46DA5}"/>
+              </a:ext>
+            </a:extLst>
+          </p:cNvPr>
+          <p:cNvSpPr/>
+          <p:nvPr/>
+        </p:nvSpPr>
+        <p:spPr>
+          <a:xfrm>
+            <a:off x="3049182" y="1642403"/>
+            <a:ext cx="239146" cy="230945"/>
+          </a:xfrm>
+          <a:prstGeom prst="ellipse">
+            <a:avLst/>
+          </a:prstGeom>
+          <a:solidFill>
+            <a:srgbClr val="FFFF00"/>
+          </a:solidFill>
+          <a:ln>
+            <a:solidFill>
+              <a:schemeClr val="tx1"/>
+            </a:solidFill>
+          </a:ln>
+        </p:spPr>
+        <p:style>
+          <a:lnRef idx="2">
+            <a:schemeClr val="accent1">
+              <a:shade val="50000"/>
+            </a:schemeClr>
+          </a:lnRef>
+          <a:fillRef idx="1">
+            <a:schemeClr val="accent1"/>
+          </a:fillRef>
+          <a:effectRef idx="0">
+            <a:schemeClr val="accent1"/>
+          </a:effectRef>
+          <a:fontRef idx="minor">
+            <a:schemeClr val="lt1"/>
+          </a:fontRef>
+        </p:style>
+        <p:txBody>
+          <a:bodyPr rtlCol="0" anchor="ctr"/>
+          <a:lstStyle/>
+          <a:p>
+            <a:pPr algn="ctr"/>
+            <a:endParaRPr lang="es-ES"/>
+          </a:p>
+        </p:txBody>
+      </p:sp>
+      <p:sp>
+        <p:nvSpPr>
+          <p:cNvPr id="22" name="Elipse 21">
+            <a:extLst>
+              <a:ext uri="{FF2B5EF4-FFF2-40B4-BE49-F238E27FC236}">
+                <a16:creationId xmlns:a16="http://schemas.microsoft.com/office/drawing/2014/main" id="{738EC79F-E7B5-4DCF-BB14-BED6E2819CF9}"/>
+              </a:ext>
+            </a:extLst>
+          </p:cNvPr>
+          <p:cNvSpPr/>
+          <p:nvPr/>
+        </p:nvSpPr>
+        <p:spPr>
+          <a:xfrm>
+            <a:off x="3045658" y="2235591"/>
+            <a:ext cx="239146" cy="230945"/>
+          </a:xfrm>
+          <a:prstGeom prst="ellipse">
+            <a:avLst/>
+          </a:prstGeom>
+          <a:solidFill>
+            <a:srgbClr val="FFFF00"/>
+          </a:solidFill>
+          <a:ln>
+            <a:solidFill>
+              <a:schemeClr val="tx1"/>
+            </a:solidFill>
+          </a:ln>
+        </p:spPr>
+        <p:style>
+          <a:lnRef idx="2">
+            <a:schemeClr val="accent1">
+              <a:shade val="50000"/>
+            </a:schemeClr>
+          </a:lnRef>
+          <a:fillRef idx="1">
+            <a:schemeClr val="accent1"/>
+          </a:fillRef>
+          <a:effectRef idx="0">
+            <a:schemeClr val="accent1"/>
+          </a:effectRef>
+          <a:fontRef idx="minor">
+            <a:schemeClr val="lt1"/>
+          </a:fontRef>
+        </p:style>
+        <p:txBody>
+          <a:bodyPr rtlCol="0" anchor="ctr"/>
+          <a:lstStyle/>
+          <a:p>
+            <a:pPr algn="ctr"/>
+            <a:endParaRPr lang="es-ES"/>
+          </a:p>
+        </p:txBody>
+      </p:sp>
+      <p:sp>
+        <p:nvSpPr>
+          <p:cNvPr id="23" name="Elipse 22">
+            <a:extLst>
+              <a:ext uri="{FF2B5EF4-FFF2-40B4-BE49-F238E27FC236}">
+                <a16:creationId xmlns:a16="http://schemas.microsoft.com/office/drawing/2014/main" id="{F08A8B01-EDF6-4A9F-A3EC-158CA0488F8A}"/>
+              </a:ext>
+            </a:extLst>
+          </p:cNvPr>
+          <p:cNvSpPr/>
+          <p:nvPr/>
+        </p:nvSpPr>
+        <p:spPr>
+          <a:xfrm>
+            <a:off x="3043321" y="2835812"/>
+            <a:ext cx="239146" cy="230945"/>
+          </a:xfrm>
+          <a:prstGeom prst="ellipse">
+            <a:avLst/>
+          </a:prstGeom>
+          <a:solidFill>
+            <a:srgbClr val="FFFF00"/>
+          </a:solidFill>
+          <a:ln>
+            <a:solidFill>
+              <a:schemeClr val="tx1"/>
+            </a:solidFill>
+          </a:ln>
+        </p:spPr>
+        <p:style>
+          <a:lnRef idx="2">
+            <a:schemeClr val="accent1">
+              <a:shade val="50000"/>
+            </a:schemeClr>
+          </a:lnRef>
+          <a:fillRef idx="1">
+            <a:schemeClr val="accent1"/>
+          </a:fillRef>
+          <a:effectRef idx="0">
+            <a:schemeClr val="accent1"/>
+          </a:effectRef>
+          <a:fontRef idx="minor">
+            <a:schemeClr val="lt1"/>
+          </a:fontRef>
+        </p:style>
+        <p:txBody>
+          <a:bodyPr rtlCol="0" anchor="ctr"/>
+          <a:lstStyle/>
+          <a:p>
+            <a:pPr algn="ctr"/>
+            <a:endParaRPr lang="es-ES"/>
+          </a:p>
+        </p:txBody>
+      </p:sp>
+      <p:sp>
+        <p:nvSpPr>
+          <p:cNvPr id="24" name="Elipse 23">
+            <a:extLst>
+              <a:ext uri="{FF2B5EF4-FFF2-40B4-BE49-F238E27FC236}">
+                <a16:creationId xmlns:a16="http://schemas.microsoft.com/office/drawing/2014/main" id="{D4EFF470-F468-430E-AA14-EF455C81CB18}"/>
+              </a:ext>
+            </a:extLst>
+          </p:cNvPr>
+          <p:cNvSpPr/>
+          <p:nvPr/>
+        </p:nvSpPr>
+        <p:spPr>
+          <a:xfrm>
+            <a:off x="3778935" y="1049215"/>
+            <a:ext cx="239146" cy="230945"/>
+          </a:xfrm>
+          <a:prstGeom prst="ellipse">
+            <a:avLst/>
+          </a:prstGeom>
+          <a:solidFill>
+            <a:srgbClr val="FFFF00"/>
+          </a:solidFill>
+          <a:ln>
+            <a:solidFill>
+              <a:schemeClr val="tx1"/>
+            </a:solidFill>
+          </a:ln>
+        </p:spPr>
+        <p:style>
+          <a:lnRef idx="2">
+            <a:schemeClr val="accent1">
+              <a:shade val="50000"/>
+            </a:schemeClr>
+          </a:lnRef>
+          <a:fillRef idx="1">
+            <a:schemeClr val="accent1"/>
+          </a:fillRef>
+          <a:effectRef idx="0">
+            <a:schemeClr val="accent1"/>
+          </a:effectRef>
+          <a:fontRef idx="minor">
+            <a:schemeClr val="lt1"/>
+          </a:fontRef>
+        </p:style>
+        <p:txBody>
+          <a:bodyPr rtlCol="0" anchor="ctr"/>
+          <a:lstStyle/>
+          <a:p>
+            <a:pPr algn="ctr"/>
+            <a:endParaRPr lang="es-ES"/>
+          </a:p>
+        </p:txBody>
+      </p:sp>
+      <p:sp>
+        <p:nvSpPr>
+          <p:cNvPr id="25" name="Elipse 24">
+            <a:extLst>
+              <a:ext uri="{FF2B5EF4-FFF2-40B4-BE49-F238E27FC236}">
+                <a16:creationId xmlns:a16="http://schemas.microsoft.com/office/drawing/2014/main" id="{A42A2CF4-3978-426F-9C46-5683981AD75F}"/>
+              </a:ext>
+            </a:extLst>
+          </p:cNvPr>
+          <p:cNvSpPr/>
+          <p:nvPr/>
+        </p:nvSpPr>
+        <p:spPr>
+          <a:xfrm>
+            <a:off x="3782459" y="1642403"/>
+            <a:ext cx="239146" cy="230945"/>
+          </a:xfrm>
+          <a:prstGeom prst="ellipse">
+            <a:avLst/>
+          </a:prstGeom>
+          <a:solidFill>
+            <a:srgbClr val="FFFF00"/>
+          </a:solidFill>
+          <a:ln>
+            <a:solidFill>
+              <a:schemeClr val="tx1"/>
+            </a:solidFill>
+          </a:ln>
+        </p:spPr>
+        <p:style>
+          <a:lnRef idx="2">
+            <a:schemeClr val="accent1">
+              <a:shade val="50000"/>
+            </a:schemeClr>
+          </a:lnRef>
+          <a:fillRef idx="1">
+            <a:schemeClr val="accent1"/>
+          </a:fillRef>
+          <a:effectRef idx="0">
+            <a:schemeClr val="accent1"/>
+          </a:effectRef>
+          <a:fontRef idx="minor">
+            <a:schemeClr val="lt1"/>
+          </a:fontRef>
+        </p:style>
+        <p:txBody>
+          <a:bodyPr rtlCol="0" anchor="ctr"/>
+          <a:lstStyle/>
+          <a:p>
+            <a:pPr algn="ctr"/>
+            <a:endParaRPr lang="es-ES"/>
+          </a:p>
+        </p:txBody>
+      </p:sp>
+      <p:sp>
+        <p:nvSpPr>
+          <p:cNvPr id="26" name="Elipse 25">
+            <a:extLst>
+              <a:ext uri="{FF2B5EF4-FFF2-40B4-BE49-F238E27FC236}">
+                <a16:creationId xmlns:a16="http://schemas.microsoft.com/office/drawing/2014/main" id="{583A0BE1-BDB6-448F-A3A4-1510A0C3DD98}"/>
+              </a:ext>
+            </a:extLst>
+          </p:cNvPr>
+          <p:cNvSpPr/>
+          <p:nvPr/>
+        </p:nvSpPr>
+        <p:spPr>
+          <a:xfrm>
+            <a:off x="3778935" y="2235591"/>
+            <a:ext cx="239146" cy="230945"/>
+          </a:xfrm>
+          <a:prstGeom prst="ellipse">
+            <a:avLst/>
+          </a:prstGeom>
+          <a:solidFill>
+            <a:srgbClr val="FFFF00"/>
+          </a:solidFill>
+          <a:ln>
+            <a:solidFill>
+              <a:schemeClr val="tx1"/>
+            </a:solidFill>
+          </a:ln>
+        </p:spPr>
+        <p:style>
+          <a:lnRef idx="2">
+            <a:schemeClr val="accent1">
+              <a:shade val="50000"/>
+            </a:schemeClr>
+          </a:lnRef>
+          <a:fillRef idx="1">
+            <a:schemeClr val="accent1"/>
+          </a:fillRef>
+          <a:effectRef idx="0">
+            <a:schemeClr val="accent1"/>
+          </a:effectRef>
+          <a:fontRef idx="minor">
+            <a:schemeClr val="lt1"/>
+          </a:fontRef>
+        </p:style>
+        <p:txBody>
+          <a:bodyPr rtlCol="0" anchor="ctr"/>
+          <a:lstStyle/>
+          <a:p>
+            <a:pPr algn="ctr"/>
+            <a:endParaRPr lang="es-ES"/>
+          </a:p>
+        </p:txBody>
+      </p:sp>
+      <p:sp>
+        <p:nvSpPr>
+          <p:cNvPr id="27" name="Elipse 26">
+            <a:extLst>
+              <a:ext uri="{FF2B5EF4-FFF2-40B4-BE49-F238E27FC236}">
+                <a16:creationId xmlns:a16="http://schemas.microsoft.com/office/drawing/2014/main" id="{753FFADF-D9EB-4E64-AA99-C0EB229A2174}"/>
+              </a:ext>
+            </a:extLst>
+          </p:cNvPr>
+          <p:cNvSpPr/>
+          <p:nvPr/>
+        </p:nvSpPr>
+        <p:spPr>
+          <a:xfrm>
+            <a:off x="3776598" y="2835812"/>
+            <a:ext cx="239146" cy="230945"/>
+          </a:xfrm>
+          <a:prstGeom prst="ellipse">
+            <a:avLst/>
+          </a:prstGeom>
+          <a:solidFill>
+            <a:srgbClr val="FFFF00"/>
+          </a:solidFill>
+          <a:ln>
+            <a:solidFill>
+              <a:schemeClr val="tx1"/>
+            </a:solidFill>
+          </a:ln>
+        </p:spPr>
+        <p:style>
+          <a:lnRef idx="2">
+            <a:schemeClr val="accent1">
+              <a:shade val="50000"/>
+            </a:schemeClr>
+          </a:lnRef>
+          <a:fillRef idx="1">
+            <a:schemeClr val="accent1"/>
+          </a:fillRef>
+          <a:effectRef idx="0">
+            <a:schemeClr val="accent1"/>
+          </a:effectRef>
+          <a:fontRef idx="minor">
+            <a:schemeClr val="lt1"/>
+          </a:fontRef>
+        </p:style>
+        <p:txBody>
+          <a:bodyPr rtlCol="0" anchor="ctr"/>
+          <a:lstStyle/>
+          <a:p>
+            <a:pPr algn="ctr"/>
+            <a:endParaRPr lang="es-ES"/>
+          </a:p>
+        </p:txBody>
+      </p:sp>
+      <p:sp>
+        <p:nvSpPr>
+          <p:cNvPr id="28" name="Elipse 27">
+            <a:extLst>
+              <a:ext uri="{FF2B5EF4-FFF2-40B4-BE49-F238E27FC236}">
+                <a16:creationId xmlns:a16="http://schemas.microsoft.com/office/drawing/2014/main" id="{B61E1E7C-3A10-4E02-85A5-449B615C0F4F}"/>
+              </a:ext>
+            </a:extLst>
+          </p:cNvPr>
+          <p:cNvSpPr/>
+          <p:nvPr/>
+        </p:nvSpPr>
+        <p:spPr>
+          <a:xfrm>
+            <a:off x="5077465" y="1548423"/>
+            <a:ext cx="239146" cy="230945"/>
+          </a:xfrm>
+          <a:prstGeom prst="ellipse">
+            <a:avLst/>
+          </a:prstGeom>
+          <a:solidFill>
+            <a:srgbClr val="FFFF00"/>
+          </a:solidFill>
+          <a:ln>
+            <a:solidFill>
+              <a:schemeClr val="tx1"/>
+            </a:solidFill>
+          </a:ln>
+        </p:spPr>
+        <p:style>
+          <a:lnRef idx="2">
+            <a:schemeClr val="accent1">
+              <a:shade val="50000"/>
+            </a:schemeClr>
+          </a:lnRef>
+          <a:fillRef idx="1">
+            <a:schemeClr val="accent1"/>
+          </a:fillRef>
+          <a:effectRef idx="0">
+            <a:schemeClr val="accent1"/>
+          </a:effectRef>
+          <a:fontRef idx="minor">
+            <a:schemeClr val="lt1"/>
+          </a:fontRef>
+        </p:style>
+        <p:txBody>
+          <a:bodyPr rtlCol="0" anchor="ctr"/>
+          <a:lstStyle/>
+          <a:p>
+            <a:pPr algn="ctr"/>
+            <a:endParaRPr lang="es-ES"/>
+          </a:p>
+        </p:txBody>
+      </p:sp>
+      <p:sp>
+        <p:nvSpPr>
+          <p:cNvPr id="29" name="Elipse 28">
+            <a:extLst>
+              <a:ext uri="{FF2B5EF4-FFF2-40B4-BE49-F238E27FC236}">
+                <a16:creationId xmlns:a16="http://schemas.microsoft.com/office/drawing/2014/main" id="{F2E6F038-12A7-4579-A923-D2795BF5EBE1}"/>
+              </a:ext>
+            </a:extLst>
+          </p:cNvPr>
+          <p:cNvSpPr/>
+          <p:nvPr/>
+        </p:nvSpPr>
+        <p:spPr>
+          <a:xfrm>
+            <a:off x="5850996" y="2021058"/>
+            <a:ext cx="239146" cy="230945"/>
+          </a:xfrm>
+          <a:prstGeom prst="ellipse">
+            <a:avLst/>
+          </a:prstGeom>
+          <a:solidFill>
+            <a:srgbClr val="FFFF00"/>
+          </a:solidFill>
+          <a:ln>
+            <a:solidFill>
+              <a:schemeClr val="tx1"/>
+            </a:solidFill>
+          </a:ln>
+        </p:spPr>
+        <p:style>
+          <a:lnRef idx="2">
+            <a:schemeClr val="accent1">
+              <a:shade val="50000"/>
+            </a:schemeClr>
+          </a:lnRef>
+          <a:fillRef idx="1">
+            <a:schemeClr val="accent1"/>
+          </a:fillRef>
+          <a:effectRef idx="0">
+            <a:schemeClr val="accent1"/>
+          </a:effectRef>
+          <a:fontRef idx="minor">
+            <a:schemeClr val="lt1"/>
+          </a:fontRef>
+        </p:style>
+        <p:txBody>
+          <a:bodyPr rtlCol="0" anchor="ctr"/>
+          <a:lstStyle/>
+          <a:p>
+            <a:pPr algn="ctr"/>
+            <a:endParaRPr lang="es-ES"/>
+          </a:p>
+        </p:txBody>
+      </p:sp>
+      <p:sp>
+        <p:nvSpPr>
+          <p:cNvPr id="30" name="Elipse 29">
+            <a:extLst>
+              <a:ext uri="{FF2B5EF4-FFF2-40B4-BE49-F238E27FC236}">
+                <a16:creationId xmlns:a16="http://schemas.microsoft.com/office/drawing/2014/main" id="{951016C5-0D6E-4805-8EBB-81446FBE08A7}"/>
+              </a:ext>
+            </a:extLst>
+          </p:cNvPr>
+          <p:cNvSpPr/>
+          <p:nvPr/>
+        </p:nvSpPr>
+        <p:spPr>
+          <a:xfrm>
+            <a:off x="6245665" y="2838937"/>
+            <a:ext cx="239146" cy="230945"/>
+          </a:xfrm>
+          <a:prstGeom prst="ellipse">
+            <a:avLst/>
+          </a:prstGeom>
+          <a:solidFill>
+            <a:srgbClr val="FFFF00"/>
+          </a:solidFill>
+          <a:ln>
+            <a:solidFill>
+              <a:schemeClr val="tx1"/>
+            </a:solidFill>
+          </a:ln>
+        </p:spPr>
+        <p:style>
+          <a:lnRef idx="2">
+            <a:schemeClr val="accent1">
+              <a:shade val="50000"/>
+            </a:schemeClr>
+          </a:lnRef>
+          <a:fillRef idx="1">
+            <a:schemeClr val="accent1"/>
+          </a:fillRef>
+          <a:effectRef idx="0">
+            <a:schemeClr val="accent1"/>
+          </a:effectRef>
+          <a:fontRef idx="minor">
+            <a:schemeClr val="lt1"/>
+          </a:fontRef>
+        </p:style>
+        <p:txBody>
+          <a:bodyPr rtlCol="0" anchor="ctr"/>
+          <a:lstStyle/>
+          <a:p>
+            <a:pPr algn="ctr"/>
+            <a:endParaRPr lang="es-ES"/>
+          </a:p>
+        </p:txBody>
+      </p:sp>
+      <p:sp>
+        <p:nvSpPr>
+          <p:cNvPr id="31" name="Elipse 30">
+            <a:extLst>
+              <a:ext uri="{FF2B5EF4-FFF2-40B4-BE49-F238E27FC236}">
+                <a16:creationId xmlns:a16="http://schemas.microsoft.com/office/drawing/2014/main" id="{50515491-C142-4777-A188-D4A5C40DA994}"/>
+              </a:ext>
+            </a:extLst>
+          </p:cNvPr>
+          <p:cNvSpPr/>
+          <p:nvPr/>
+        </p:nvSpPr>
+        <p:spPr>
+          <a:xfrm>
+            <a:off x="7018318" y="2235590"/>
+            <a:ext cx="239146" cy="230945"/>
+          </a:xfrm>
+          <a:prstGeom prst="ellipse">
+            <a:avLst/>
+          </a:prstGeom>
+          <a:solidFill>
+            <a:srgbClr val="FFFF00"/>
+          </a:solidFill>
+          <a:ln>
+            <a:solidFill>
+              <a:schemeClr val="tx1"/>
+            </a:solidFill>
+          </a:ln>
+        </p:spPr>
+        <p:style>
+          <a:lnRef idx="2">
+            <a:schemeClr val="accent1">
+              <a:shade val="50000"/>
+            </a:schemeClr>
+          </a:lnRef>
+          <a:fillRef idx="1">
+            <a:schemeClr val="accent1"/>
+          </a:fillRef>
+          <a:effectRef idx="0">
+            <a:schemeClr val="accent1"/>
+          </a:effectRef>
+          <a:fontRef idx="minor">
+            <a:schemeClr val="lt1"/>
+          </a:fontRef>
+        </p:style>
+        <p:txBody>
+          <a:bodyPr rtlCol="0" anchor="ctr"/>
+          <a:lstStyle/>
+          <a:p>
+            <a:pPr algn="ctr"/>
+            <a:endParaRPr lang="es-ES"/>
+          </a:p>
+        </p:txBody>
+      </p:sp>
+      <p:sp>
+        <p:nvSpPr>
+          <p:cNvPr id="32" name="Elipse 31">
+            <a:extLst>
+              <a:ext uri="{FF2B5EF4-FFF2-40B4-BE49-F238E27FC236}">
+                <a16:creationId xmlns:a16="http://schemas.microsoft.com/office/drawing/2014/main" id="{75191F56-6F48-439F-A933-DA268C5ADC2A}"/>
+              </a:ext>
+            </a:extLst>
+          </p:cNvPr>
+          <p:cNvSpPr/>
+          <p:nvPr/>
+        </p:nvSpPr>
+        <p:spPr>
+          <a:xfrm>
+            <a:off x="6084868" y="1049215"/>
+            <a:ext cx="239146" cy="230945"/>
+          </a:xfrm>
+          <a:prstGeom prst="ellipse">
+            <a:avLst/>
+          </a:prstGeom>
+          <a:solidFill>
+            <a:srgbClr val="FFFF00"/>
+          </a:solidFill>
+          <a:ln>
+            <a:solidFill>
+              <a:schemeClr val="tx1"/>
+            </a:solidFill>
+          </a:ln>
+        </p:spPr>
+        <p:style>
+          <a:lnRef idx="2">
+            <a:schemeClr val="accent1">
+              <a:shade val="50000"/>
+            </a:schemeClr>
+          </a:lnRef>
+          <a:fillRef idx="1">
+            <a:schemeClr val="accent1"/>
+          </a:fillRef>
+          <a:effectRef idx="0">
+            <a:schemeClr val="accent1"/>
+          </a:effectRef>
+          <a:fontRef idx="minor">
+            <a:schemeClr val="lt1"/>
+          </a:fontRef>
+        </p:style>
+        <p:txBody>
+          <a:bodyPr rtlCol="0" anchor="ctr"/>
+          <a:lstStyle/>
+          <a:p>
+            <a:pPr algn="ctr"/>
+            <a:endParaRPr lang="es-ES"/>
+          </a:p>
+        </p:txBody>
+      </p:sp>
+      <p:sp>
+        <p:nvSpPr>
+          <p:cNvPr id="33" name="Elipse 32">
+            <a:extLst>
+              <a:ext uri="{FF2B5EF4-FFF2-40B4-BE49-F238E27FC236}">
+                <a16:creationId xmlns:a16="http://schemas.microsoft.com/office/drawing/2014/main" id="{78CB8C60-605A-4CF2-9285-759086C50DD5}"/>
+              </a:ext>
+            </a:extLst>
+          </p:cNvPr>
+          <p:cNvSpPr/>
+          <p:nvPr/>
+        </p:nvSpPr>
+        <p:spPr>
+          <a:xfrm>
+            <a:off x="7083084" y="600221"/>
+            <a:ext cx="239146" cy="230945"/>
+          </a:xfrm>
+          <a:prstGeom prst="ellipse">
+            <a:avLst/>
+          </a:prstGeom>
+          <a:solidFill>
+            <a:srgbClr val="FFFF00"/>
+          </a:solidFill>
+          <a:ln>
+            <a:solidFill>
+              <a:schemeClr val="tx1"/>
+            </a:solidFill>
+          </a:ln>
+        </p:spPr>
+        <p:style>
+          <a:lnRef idx="2">
+            <a:schemeClr val="accent1">
+              <a:shade val="50000"/>
+            </a:schemeClr>
+          </a:lnRef>
+          <a:fillRef idx="1">
+            <a:schemeClr val="accent1"/>
+          </a:fillRef>
+          <a:effectRef idx="0">
+            <a:schemeClr val="accent1"/>
+          </a:effectRef>
+          <a:fontRef idx="minor">
+            <a:schemeClr val="lt1"/>
+          </a:fontRef>
+        </p:style>
+        <p:txBody>
+          <a:bodyPr rtlCol="0" anchor="ctr"/>
+          <a:lstStyle/>
+          <a:p>
+            <a:pPr algn="ctr"/>
+            <a:endParaRPr lang="es-ES"/>
+          </a:p>
+        </p:txBody>
+      </p:sp>
+      <p:sp>
+        <p:nvSpPr>
+          <p:cNvPr id="34" name="Elipse 33">
+            <a:extLst>
+              <a:ext uri="{FF2B5EF4-FFF2-40B4-BE49-F238E27FC236}">
+                <a16:creationId xmlns:a16="http://schemas.microsoft.com/office/drawing/2014/main" id="{9E07C6E2-D559-4428-9283-2DBD8200583B}"/>
+              </a:ext>
+            </a:extLst>
+          </p:cNvPr>
+          <p:cNvSpPr/>
+          <p:nvPr/>
+        </p:nvSpPr>
+        <p:spPr>
+          <a:xfrm>
+            <a:off x="7609459" y="1317478"/>
+            <a:ext cx="239146" cy="230945"/>
+          </a:xfrm>
+          <a:prstGeom prst="ellipse">
+            <a:avLst/>
+          </a:prstGeom>
+          <a:solidFill>
+            <a:srgbClr val="FFFF00"/>
+          </a:solidFill>
+          <a:ln>
+            <a:solidFill>
+              <a:schemeClr val="tx1"/>
+            </a:solidFill>
+          </a:ln>
+        </p:spPr>
+        <p:style>
+          <a:lnRef idx="2">
+            <a:schemeClr val="accent1">
+              <a:shade val="50000"/>
+            </a:schemeClr>
+          </a:lnRef>
+          <a:fillRef idx="1">
+            <a:schemeClr val="accent1"/>
+          </a:fillRef>
+          <a:effectRef idx="0">
+            <a:schemeClr val="accent1"/>
+          </a:effectRef>
+          <a:fontRef idx="minor">
+            <a:schemeClr val="lt1"/>
+          </a:fontRef>
+        </p:style>
+        <p:txBody>
+          <a:bodyPr rtlCol="0" anchor="ctr"/>
+          <a:lstStyle/>
+          <a:p>
+            <a:pPr algn="ctr"/>
+            <a:endParaRPr lang="es-ES"/>
+          </a:p>
+        </p:txBody>
+      </p:sp>
+      <p:sp>
+        <p:nvSpPr>
+          <p:cNvPr id="35" name="Elipse 34">
+            <a:extLst>
+              <a:ext uri="{FF2B5EF4-FFF2-40B4-BE49-F238E27FC236}">
+                <a16:creationId xmlns:a16="http://schemas.microsoft.com/office/drawing/2014/main" id="{20E07A85-6535-41DF-8F3F-DF4F5DC0B788}"/>
+              </a:ext>
+            </a:extLst>
+          </p:cNvPr>
+          <p:cNvSpPr/>
+          <p:nvPr/>
+        </p:nvSpPr>
+        <p:spPr>
+          <a:xfrm>
+            <a:off x="7904875" y="2235589"/>
+            <a:ext cx="239146" cy="230945"/>
+          </a:xfrm>
+          <a:prstGeom prst="ellipse">
+            <a:avLst/>
+          </a:prstGeom>
+          <a:solidFill>
+            <a:srgbClr val="FFFF00"/>
+          </a:solidFill>
+          <a:ln>
+            <a:solidFill>
+              <a:schemeClr val="tx1"/>
+            </a:solidFill>
+          </a:ln>
+        </p:spPr>
+        <p:style>
+          <a:lnRef idx="2">
+            <a:schemeClr val="accent1">
+              <a:shade val="50000"/>
+            </a:schemeClr>
+          </a:lnRef>
+          <a:fillRef idx="1">
+            <a:schemeClr val="accent1"/>
+          </a:fillRef>
+          <a:effectRef idx="0">
+            <a:schemeClr val="accent1"/>
+          </a:effectRef>
+          <a:fontRef idx="minor">
+            <a:schemeClr val="lt1"/>
+          </a:fontRef>
+        </p:style>
+        <p:txBody>
+          <a:bodyPr rtlCol="0" anchor="ctr"/>
+          <a:lstStyle/>
+          <a:p>
+            <a:pPr algn="ctr"/>
+            <a:endParaRPr lang="es-ES"/>
+          </a:p>
+        </p:txBody>
+      </p:sp>
+      <p:sp>
+        <p:nvSpPr>
+          <p:cNvPr id="36" name="Elipse 35">
+            <a:extLst>
+              <a:ext uri="{FF2B5EF4-FFF2-40B4-BE49-F238E27FC236}">
+                <a16:creationId xmlns:a16="http://schemas.microsoft.com/office/drawing/2014/main" id="{9997353D-B0AC-4348-8126-324B28DE9D28}"/>
+              </a:ext>
+            </a:extLst>
+          </p:cNvPr>
+          <p:cNvSpPr/>
+          <p:nvPr/>
+        </p:nvSpPr>
+        <p:spPr>
+          <a:xfrm>
+            <a:off x="8053746" y="3198055"/>
+            <a:ext cx="239146" cy="230945"/>
+          </a:xfrm>
+          <a:prstGeom prst="ellipse">
+            <a:avLst/>
+          </a:prstGeom>
+          <a:solidFill>
+            <a:srgbClr val="FFFF00"/>
+          </a:solidFill>
+          <a:ln>
+            <a:solidFill>
+              <a:schemeClr val="tx1"/>
+            </a:solidFill>
+          </a:ln>
+        </p:spPr>
+        <p:style>
+          <a:lnRef idx="2">
+            <a:schemeClr val="accent1">
+              <a:shade val="50000"/>
+            </a:schemeClr>
+          </a:lnRef>
+          <a:fillRef idx="1">
+            <a:schemeClr val="accent1"/>
+          </a:fillRef>
+          <a:effectRef idx="0">
+            <a:schemeClr val="accent1"/>
+          </a:effectRef>
+          <a:fontRef idx="minor">
+            <a:schemeClr val="lt1"/>
+          </a:fontRef>
+        </p:style>
+        <p:txBody>
+          <a:bodyPr rtlCol="0" anchor="ctr"/>
+          <a:lstStyle/>
+          <a:p>
+            <a:pPr algn="ctr"/>
+            <a:endParaRPr lang="es-ES"/>
+          </a:p>
+        </p:txBody>
+      </p:sp>
+      <p:sp>
+        <p:nvSpPr>
+          <p:cNvPr id="38" name="CuadroTexto 37">
+            <a:extLst>
+              <a:ext uri="{FF2B5EF4-FFF2-40B4-BE49-F238E27FC236}">
+                <a16:creationId xmlns:a16="http://schemas.microsoft.com/office/drawing/2014/main" id="{52C95342-6294-435B-8658-045AA198BA83}"/>
+              </a:ext>
+            </a:extLst>
+          </p:cNvPr>
+          <p:cNvSpPr txBox="1"/>
+          <p:nvPr/>
+        </p:nvSpPr>
+        <p:spPr>
+          <a:xfrm>
+            <a:off x="1937089" y="3393748"/>
+            <a:ext cx="2417328" cy="369332"/>
+          </a:xfrm>
+          <a:prstGeom prst="rect">
+            <a:avLst/>
+          </a:prstGeom>
+          <a:noFill/>
+        </p:spPr>
+        <p:txBody>
+          <a:bodyPr wrap="none" rtlCol="0">
+            <a:spAutoFit/>
+          </a:bodyPr>
+          <a:lstStyle/>
+          <a:p>
+            <a:r>
+              <a:rPr lang="es-ES" b="1" dirty="0"/>
+              <a:t>Formación poco común</a:t>
+            </a:r>
+          </a:p>
+        </p:txBody>
+      </p:sp>
+      <p:sp>
+        <p:nvSpPr>
+          <p:cNvPr id="39" name="CuadroTexto 38">
+            <a:extLst>
+              <a:ext uri="{FF2B5EF4-FFF2-40B4-BE49-F238E27FC236}">
+                <a16:creationId xmlns:a16="http://schemas.microsoft.com/office/drawing/2014/main" id="{DB203FF8-09C1-49AF-A601-E6C71F2818D2}"/>
+              </a:ext>
+            </a:extLst>
+          </p:cNvPr>
+          <p:cNvSpPr txBox="1"/>
+          <p:nvPr/>
+        </p:nvSpPr>
+        <p:spPr>
+          <a:xfrm>
+            <a:off x="5829922" y="3501627"/>
+            <a:ext cx="1899110" cy="369332"/>
+          </a:xfrm>
+          <a:prstGeom prst="rect">
+            <a:avLst/>
+          </a:prstGeom>
+          <a:noFill/>
+        </p:spPr>
+        <p:txBody>
+          <a:bodyPr wrap="none" rtlCol="0">
+            <a:spAutoFit/>
+          </a:bodyPr>
+          <a:lstStyle/>
+          <a:p>
+            <a:r>
+              <a:rPr lang="es-ES" b="1" dirty="0"/>
+              <a:t>Formación común</a:t>
+            </a:r>
+          </a:p>
+        </p:txBody>
+      </p:sp>
+      <p:cxnSp>
+        <p:nvCxnSpPr>
+          <p:cNvPr id="41" name="Conector recto de flecha 40">
+            <a:extLst>
+              <a:ext uri="{FF2B5EF4-FFF2-40B4-BE49-F238E27FC236}">
+                <a16:creationId xmlns:a16="http://schemas.microsoft.com/office/drawing/2014/main" id="{F340FAC3-D086-461A-A42C-5520A352AFA3}"/>
+              </a:ext>
+            </a:extLst>
+          </p:cNvPr>
+          <p:cNvCxnSpPr/>
+          <p:nvPr/>
+        </p:nvCxnSpPr>
+        <p:spPr>
+          <a:xfrm flipV="1">
+            <a:off x="4953818" y="2589628"/>
+            <a:ext cx="876104" cy="608427"/>
+          </a:xfrm>
+          <a:prstGeom prst="straightConnector1">
+            <a:avLst/>
+          </a:prstGeom>
+          <a:ln>
+            <a:tailEnd type="triangle"/>
+          </a:ln>
+        </p:spPr>
+        <p:style>
+          <a:lnRef idx="1">
+            <a:schemeClr val="accent1"/>
+          </a:lnRef>
+          <a:fillRef idx="0">
+            <a:schemeClr val="accent1"/>
+          </a:fillRef>
+          <a:effectRef idx="0">
+            <a:schemeClr val="accent1"/>
+          </a:effectRef>
+          <a:fontRef idx="minor">
+            <a:schemeClr val="tx1"/>
+          </a:fontRef>
+        </p:style>
+      </p:cxnSp>
+      <p:cxnSp>
+        <p:nvCxnSpPr>
+          <p:cNvPr id="43" name="Conector recto de flecha 42">
+            <a:extLst>
+              <a:ext uri="{FF2B5EF4-FFF2-40B4-BE49-F238E27FC236}">
+                <a16:creationId xmlns:a16="http://schemas.microsoft.com/office/drawing/2014/main" id="{B7C7EE75-082B-450B-A91A-B8F252BA45D5}"/>
+              </a:ext>
+            </a:extLst>
+          </p:cNvPr>
+          <p:cNvCxnSpPr/>
+          <p:nvPr/>
+        </p:nvCxnSpPr>
+        <p:spPr>
+          <a:xfrm>
+            <a:off x="1016000" y="2351061"/>
+            <a:ext cx="921089" cy="0"/>
+          </a:xfrm>
+          <a:prstGeom prst="straightConnector1">
+            <a:avLst/>
+          </a:prstGeom>
+          <a:ln w="76200">
+            <a:tailEnd type="triangle"/>
+          </a:ln>
+        </p:spPr>
+        <p:style>
+          <a:lnRef idx="1">
+            <a:schemeClr val="accent1"/>
+          </a:lnRef>
+          <a:fillRef idx="0">
+            <a:schemeClr val="accent1"/>
+          </a:fillRef>
+          <a:effectRef idx="0">
+            <a:schemeClr val="accent1"/>
+          </a:effectRef>
+          <a:fontRef idx="minor">
+            <a:schemeClr val="tx1"/>
+          </a:fontRef>
+        </p:style>
+      </p:cxnSp>
+      <p:cxnSp>
+        <p:nvCxnSpPr>
+          <p:cNvPr id="44" name="Conector recto de flecha 43">
+            <a:extLst>
+              <a:ext uri="{FF2B5EF4-FFF2-40B4-BE49-F238E27FC236}">
+                <a16:creationId xmlns:a16="http://schemas.microsoft.com/office/drawing/2014/main" id="{6B1DEC5B-1E6A-4276-A2A8-AD1894597D35}"/>
+              </a:ext>
+            </a:extLst>
+          </p:cNvPr>
+          <p:cNvCxnSpPr>
+            <a:cxnSpLocks/>
+          </p:cNvCxnSpPr>
+          <p:nvPr/>
+        </p:nvCxnSpPr>
+        <p:spPr>
+          <a:xfrm flipV="1">
+            <a:off x="4898720" y="2555575"/>
+            <a:ext cx="1016751" cy="723899"/>
+          </a:xfrm>
+          <a:prstGeom prst="straightConnector1">
+            <a:avLst/>
+          </a:prstGeom>
+          <a:ln w="76200">
+            <a:tailEnd type="triangle"/>
+          </a:ln>
+        </p:spPr>
+        <p:style>
+          <a:lnRef idx="1">
+            <a:schemeClr val="accent1"/>
+          </a:lnRef>
+          <a:fillRef idx="0">
+            <a:schemeClr val="accent1"/>
+          </a:fillRef>
+          <a:effectRef idx="0">
+            <a:schemeClr val="accent1"/>
+          </a:effectRef>
+          <a:fontRef idx="minor">
+            <a:schemeClr val="tx1"/>
+          </a:fontRef>
+        </p:style>
+      </p:cxnSp>
+      <p:sp>
+        <p:nvSpPr>
+          <p:cNvPr id="46" name="CuadroTexto 45">
+            <a:extLst>
+              <a:ext uri="{FF2B5EF4-FFF2-40B4-BE49-F238E27FC236}">
+                <a16:creationId xmlns:a16="http://schemas.microsoft.com/office/drawing/2014/main" id="{6B9A8734-D002-4974-8911-589A5B63376F}"/>
+              </a:ext>
+            </a:extLst>
+          </p:cNvPr>
+          <p:cNvSpPr txBox="1"/>
+          <p:nvPr/>
+        </p:nvSpPr>
+        <p:spPr>
+          <a:xfrm>
+            <a:off x="1010947" y="1951864"/>
+            <a:ext cx="815095" cy="369332"/>
+          </a:xfrm>
+          <a:prstGeom prst="rect">
+            <a:avLst/>
+          </a:prstGeom>
+          <a:noFill/>
+        </p:spPr>
+        <p:txBody>
+          <a:bodyPr wrap="none" rtlCol="0">
+            <a:spAutoFit/>
+          </a:bodyPr>
+          <a:lstStyle/>
+          <a:p>
+            <a:r>
+              <a:rPr lang="es-ES" b="1" dirty="0"/>
+              <a:t>Viento</a:t>
+            </a:r>
+          </a:p>
+        </p:txBody>
+      </p:sp>
+      <p:sp>
+        <p:nvSpPr>
+          <p:cNvPr id="47" name="CuadroTexto 46">
+            <a:extLst>
+              <a:ext uri="{FF2B5EF4-FFF2-40B4-BE49-F238E27FC236}">
+                <a16:creationId xmlns:a16="http://schemas.microsoft.com/office/drawing/2014/main" id="{A20C08A9-C1DE-4B5B-9DFF-8E5D0F2B5FF8}"/>
+              </a:ext>
+            </a:extLst>
+          </p:cNvPr>
+          <p:cNvSpPr txBox="1"/>
+          <p:nvPr/>
+        </p:nvSpPr>
+        <p:spPr>
+          <a:xfrm>
+            <a:off x="4744743" y="2466480"/>
+            <a:ext cx="815095" cy="369332"/>
+          </a:xfrm>
+          <a:prstGeom prst="rect">
+            <a:avLst/>
+          </a:prstGeom>
+          <a:noFill/>
+        </p:spPr>
+        <p:txBody>
+          <a:bodyPr wrap="none" rtlCol="0">
+            <a:spAutoFit/>
+          </a:bodyPr>
+          <a:lstStyle/>
+          <a:p>
+            <a:r>
+              <a:rPr lang="es-ES" b="1" dirty="0"/>
+              <a:t>Viento</a:t>
+            </a:r>
+          </a:p>
+        </p:txBody>
+      </p:sp>
+    </p:spTree>
+    <p:extLst>
+      <p:ext uri="{BB962C8B-B14F-4D97-AF65-F5344CB8AC3E}">
+        <p14:creationId xmlns:p14="http://schemas.microsoft.com/office/powerpoint/2010/main" val="1567691406"/>
+      </p:ext>
+    </p:extLst>
+  </p:cSld>
+  <p:clrMapOvr>
+    <a:masterClrMapping/>
+  </p:clrMapOvr>
+</p:sld>
+</file>
+
 <file path=ppt/theme/theme1.xml><?xml version="1.0" encoding="utf-8"?>
 <a:theme xmlns:a="http://schemas.openxmlformats.org/drawingml/2006/main" name="Tema de Office">
   <a:themeElements>

</xml_diff>

<commit_message>
Integrar reuniones, comienzo de estado del arte
</commit_message>
<xml_diff>
--- a/docs/Diagrama de arquitectura.pptx
+++ b/docs/Diagrama de arquitectura.pptx
@@ -9,6 +9,7 @@
     <p:sldId id="257" r:id="rId3"/>
     <p:sldId id="258" r:id="rId4"/>
     <p:sldId id="259" r:id="rId5"/>
+    <p:sldId id="260" r:id="rId6"/>
   </p:sldIdLst>
   <p:sldSz cx="12192000" cy="6858000"/>
   <p:notesSz cx="6858000" cy="9144000"/>
@@ -262,7 +263,7 @@
           <a:p>
             <a:fld id="{4DAFCE15-DBFD-4C2D-8258-132D751D944C}" type="datetimeFigureOut">
               <a:rPr lang="es-ES" smtClean="0"/>
-              <a:t>12/02/2018</a:t>
+              <a:t>15/03/2018</a:t>
             </a:fld>
             <a:endParaRPr lang="es-ES"/>
           </a:p>
@@ -460,7 +461,7 @@
           <a:p>
             <a:fld id="{4DAFCE15-DBFD-4C2D-8258-132D751D944C}" type="datetimeFigureOut">
               <a:rPr lang="es-ES" smtClean="0"/>
-              <a:t>12/02/2018</a:t>
+              <a:t>15/03/2018</a:t>
             </a:fld>
             <a:endParaRPr lang="es-ES"/>
           </a:p>
@@ -668,7 +669,7 @@
           <a:p>
             <a:fld id="{4DAFCE15-DBFD-4C2D-8258-132D751D944C}" type="datetimeFigureOut">
               <a:rPr lang="es-ES" smtClean="0"/>
-              <a:t>12/02/2018</a:t>
+              <a:t>15/03/2018</a:t>
             </a:fld>
             <a:endParaRPr lang="es-ES"/>
           </a:p>
@@ -866,7 +867,7 @@
           <a:p>
             <a:fld id="{4DAFCE15-DBFD-4C2D-8258-132D751D944C}" type="datetimeFigureOut">
               <a:rPr lang="es-ES" smtClean="0"/>
-              <a:t>12/02/2018</a:t>
+              <a:t>15/03/2018</a:t>
             </a:fld>
             <a:endParaRPr lang="es-ES"/>
           </a:p>
@@ -1141,7 +1142,7 @@
           <a:p>
             <a:fld id="{4DAFCE15-DBFD-4C2D-8258-132D751D944C}" type="datetimeFigureOut">
               <a:rPr lang="es-ES" smtClean="0"/>
-              <a:t>12/02/2018</a:t>
+              <a:t>15/03/2018</a:t>
             </a:fld>
             <a:endParaRPr lang="es-ES"/>
           </a:p>
@@ -1406,7 +1407,7 @@
           <a:p>
             <a:fld id="{4DAFCE15-DBFD-4C2D-8258-132D751D944C}" type="datetimeFigureOut">
               <a:rPr lang="es-ES" smtClean="0"/>
-              <a:t>12/02/2018</a:t>
+              <a:t>15/03/2018</a:t>
             </a:fld>
             <a:endParaRPr lang="es-ES"/>
           </a:p>
@@ -1818,7 +1819,7 @@
           <a:p>
             <a:fld id="{4DAFCE15-DBFD-4C2D-8258-132D751D944C}" type="datetimeFigureOut">
               <a:rPr lang="es-ES" smtClean="0"/>
-              <a:t>12/02/2018</a:t>
+              <a:t>15/03/2018</a:t>
             </a:fld>
             <a:endParaRPr lang="es-ES"/>
           </a:p>
@@ -1959,7 +1960,7 @@
           <a:p>
             <a:fld id="{4DAFCE15-DBFD-4C2D-8258-132D751D944C}" type="datetimeFigureOut">
               <a:rPr lang="es-ES" smtClean="0"/>
-              <a:t>12/02/2018</a:t>
+              <a:t>15/03/2018</a:t>
             </a:fld>
             <a:endParaRPr lang="es-ES"/>
           </a:p>
@@ -2072,7 +2073,7 @@
           <a:p>
             <a:fld id="{4DAFCE15-DBFD-4C2D-8258-132D751D944C}" type="datetimeFigureOut">
               <a:rPr lang="es-ES" smtClean="0"/>
-              <a:t>12/02/2018</a:t>
+              <a:t>15/03/2018</a:t>
             </a:fld>
             <a:endParaRPr lang="es-ES"/>
           </a:p>
@@ -2383,7 +2384,7 @@
           <a:p>
             <a:fld id="{4DAFCE15-DBFD-4C2D-8258-132D751D944C}" type="datetimeFigureOut">
               <a:rPr lang="es-ES" smtClean="0"/>
-              <a:t>12/02/2018</a:t>
+              <a:t>15/03/2018</a:t>
             </a:fld>
             <a:endParaRPr lang="es-ES"/>
           </a:p>
@@ -2671,7 +2672,7 @@
           <a:p>
             <a:fld id="{4DAFCE15-DBFD-4C2D-8258-132D751D944C}" type="datetimeFigureOut">
               <a:rPr lang="es-ES" smtClean="0"/>
-              <a:t>12/02/2018</a:t>
+              <a:t>15/03/2018</a:t>
             </a:fld>
             <a:endParaRPr lang="es-ES"/>
           </a:p>
@@ -2912,7 +2913,7 @@
           <a:p>
             <a:fld id="{4DAFCE15-DBFD-4C2D-8258-132D751D944C}" type="datetimeFigureOut">
               <a:rPr lang="es-ES" smtClean="0"/>
-              <a:t>12/02/2018</a:t>
+              <a:t>15/03/2018</a:t>
             </a:fld>
             <a:endParaRPr lang="es-ES"/>
           </a:p>
@@ -8511,6 +8512,649 @@
 </p:sld>
 </file>
 
+<file path=ppt/slides/slide5.xml><?xml version="1.0" encoding="utf-8"?>
+<p:sld xmlns:a="http://schemas.openxmlformats.org/drawingml/2006/main" xmlns:r="http://schemas.openxmlformats.org/officeDocument/2006/relationships" xmlns:p="http://schemas.openxmlformats.org/presentationml/2006/main">
+  <p:cSld>
+    <p:spTree>
+      <p:nvGrpSpPr>
+        <p:cNvPr id="1" name=""/>
+        <p:cNvGrpSpPr/>
+        <p:nvPr/>
+      </p:nvGrpSpPr>
+      <p:grpSpPr>
+        <a:xfrm>
+          <a:off x="0" y="0"/>
+          <a:ext cx="0" cy="0"/>
+          <a:chOff x="0" y="0"/>
+          <a:chExt cx="0" cy="0"/>
+        </a:xfrm>
+      </p:grpSpPr>
+      <p:pic>
+        <p:nvPicPr>
+          <p:cNvPr id="1026" name="Picture 2" descr="Resultado de imagen de usuario">
+            <a:extLst>
+              <a:ext uri="{FF2B5EF4-FFF2-40B4-BE49-F238E27FC236}">
+                <a16:creationId xmlns:a16="http://schemas.microsoft.com/office/drawing/2014/main" id="{89791D83-D7E7-4F39-A8E2-136066A288D8}"/>
+              </a:ext>
+            </a:extLst>
+          </p:cNvPr>
+          <p:cNvPicPr>
+            <a:picLocks noChangeAspect="1" noChangeArrowheads="1"/>
+          </p:cNvPicPr>
+          <p:nvPr/>
+        </p:nvPicPr>
+        <p:blipFill>
+          <a:blip r:embed="rId2">
+            <a:extLst>
+              <a:ext uri="{28A0092B-C50C-407E-A947-70E740481C1C}">
+                <a14:useLocalDpi xmlns:a14="http://schemas.microsoft.com/office/drawing/2010/main" val="0"/>
+              </a:ext>
+            </a:extLst>
+          </a:blip>
+          <a:srcRect/>
+          <a:stretch>
+            <a:fillRect/>
+          </a:stretch>
+        </p:blipFill>
+        <p:spPr bwMode="auto">
+          <a:xfrm>
+            <a:off x="3121682" y="3370878"/>
+            <a:ext cx="1443087" cy="2220134"/>
+          </a:xfrm>
+          <a:prstGeom prst="rect">
+            <a:avLst/>
+          </a:prstGeom>
+          <a:noFill/>
+          <a:extLst>
+            <a:ext uri="{909E8E84-426E-40DD-AFC4-6F175D3DCCD1}">
+              <a14:hiddenFill xmlns:a14="http://schemas.microsoft.com/office/drawing/2010/main">
+                <a:solidFill>
+                  <a:srgbClr val="FFFFFF"/>
+                </a:solidFill>
+              </a14:hiddenFill>
+            </a:ext>
+          </a:extLst>
+        </p:spPr>
+      </p:pic>
+      <p:pic>
+        <p:nvPicPr>
+          <p:cNvPr id="1028" name="Picture 4" descr="Resultado de imagen de usuario">
+            <a:extLst>
+              <a:ext uri="{FF2B5EF4-FFF2-40B4-BE49-F238E27FC236}">
+                <a16:creationId xmlns:a16="http://schemas.microsoft.com/office/drawing/2014/main" id="{C91F132C-F1CB-4A98-93FE-AF909797E7DB}"/>
+              </a:ext>
+            </a:extLst>
+          </p:cNvPr>
+          <p:cNvPicPr>
+            <a:picLocks noChangeAspect="1" noChangeArrowheads="1"/>
+          </p:cNvPicPr>
+          <p:nvPr/>
+        </p:nvPicPr>
+        <p:blipFill>
+          <a:blip r:embed="rId3">
+            <a:extLst>
+              <a:ext uri="{BEBA8EAE-BF5A-486C-A8C5-ECC9F3942E4B}">
+                <a14:imgProps xmlns:a14="http://schemas.microsoft.com/office/drawing/2010/main">
+                  <a14:imgLayer r:embed="rId4">
+                    <a14:imgEffect>
+                      <a14:sharpenSoften amount="-50000"/>
+                    </a14:imgEffect>
+                    <a14:imgEffect>
+                      <a14:brightnessContrast bright="20000" contrast="20000"/>
+                    </a14:imgEffect>
+                  </a14:imgLayer>
+                </a14:imgProps>
+              </a:ext>
+              <a:ext uri="{28A0092B-C50C-407E-A947-70E740481C1C}">
+                <a14:useLocalDpi xmlns:a14="http://schemas.microsoft.com/office/drawing/2010/main" val="0"/>
+              </a:ext>
+            </a:extLst>
+          </a:blip>
+          <a:srcRect/>
+          <a:stretch>
+            <a:fillRect/>
+          </a:stretch>
+        </p:blipFill>
+        <p:spPr bwMode="auto">
+          <a:xfrm>
+            <a:off x="7695232" y="3266267"/>
+            <a:ext cx="2324745" cy="2324745"/>
+          </a:xfrm>
+          <a:prstGeom prst="rect">
+            <a:avLst/>
+          </a:prstGeom>
+          <a:noFill/>
+          <a:extLst>
+            <a:ext uri="{909E8E84-426E-40DD-AFC4-6F175D3DCCD1}">
+              <a14:hiddenFill xmlns:a14="http://schemas.microsoft.com/office/drawing/2010/main">
+                <a:solidFill>
+                  <a:srgbClr val="FFFFFF"/>
+                </a:solidFill>
+              </a14:hiddenFill>
+            </a:ext>
+          </a:extLst>
+        </p:spPr>
+      </p:pic>
+      <p:pic>
+        <p:nvPicPr>
+          <p:cNvPr id="1030" name="Picture 6" descr="Resultado de imagen de ajustes">
+            <a:extLst>
+              <a:ext uri="{FF2B5EF4-FFF2-40B4-BE49-F238E27FC236}">
+                <a16:creationId xmlns:a16="http://schemas.microsoft.com/office/drawing/2014/main" id="{0BA96AC7-1328-436E-8668-E5973C6F0FCB}"/>
+              </a:ext>
+            </a:extLst>
+          </p:cNvPr>
+          <p:cNvPicPr>
+            <a:picLocks noChangeAspect="1" noChangeArrowheads="1"/>
+          </p:cNvPicPr>
+          <p:nvPr/>
+        </p:nvPicPr>
+        <p:blipFill>
+          <a:blip r:embed="rId5">
+            <a:biLevel thresh="75000"/>
+            <a:extLst>
+              <a:ext uri="{28A0092B-C50C-407E-A947-70E740481C1C}">
+                <a14:useLocalDpi xmlns:a14="http://schemas.microsoft.com/office/drawing/2010/main" val="0"/>
+              </a:ext>
+            </a:extLst>
+          </a:blip>
+          <a:srcRect/>
+          <a:stretch>
+            <a:fillRect/>
+          </a:stretch>
+        </p:blipFill>
+        <p:spPr bwMode="auto">
+          <a:xfrm>
+            <a:off x="8039422" y="3610457"/>
+            <a:ext cx="1636363" cy="1636363"/>
+          </a:xfrm>
+          <a:prstGeom prst="rect">
+            <a:avLst/>
+          </a:prstGeom>
+          <a:noFill/>
+          <a:extLst>
+            <a:ext uri="{909E8E84-426E-40DD-AFC4-6F175D3DCCD1}">
+              <a14:hiddenFill xmlns:a14="http://schemas.microsoft.com/office/drawing/2010/main">
+                <a:solidFill>
+                  <a:srgbClr val="FFFFFF"/>
+                </a:solidFill>
+              </a14:hiddenFill>
+            </a:ext>
+          </a:extLst>
+        </p:spPr>
+      </p:pic>
+      <p:sp>
+        <p:nvSpPr>
+          <p:cNvPr id="4" name="Rectángulo 3">
+            <a:extLst>
+              <a:ext uri="{FF2B5EF4-FFF2-40B4-BE49-F238E27FC236}">
+                <a16:creationId xmlns:a16="http://schemas.microsoft.com/office/drawing/2014/main" id="{0F9774D5-4FD6-4212-8952-92736A3C0116}"/>
+              </a:ext>
+            </a:extLst>
+          </p:cNvPr>
+          <p:cNvSpPr/>
+          <p:nvPr/>
+        </p:nvSpPr>
+        <p:spPr>
+          <a:xfrm>
+            <a:off x="5242487" y="782666"/>
+            <a:ext cx="1968284" cy="2483601"/>
+          </a:xfrm>
+          <a:prstGeom prst="rect">
+            <a:avLst/>
+          </a:prstGeom>
+          <a:ln/>
+        </p:spPr>
+        <p:style>
+          <a:lnRef idx="1">
+            <a:schemeClr val="accent4"/>
+          </a:lnRef>
+          <a:fillRef idx="2">
+            <a:schemeClr val="accent4"/>
+          </a:fillRef>
+          <a:effectRef idx="1">
+            <a:schemeClr val="accent4"/>
+          </a:effectRef>
+          <a:fontRef idx="minor">
+            <a:schemeClr val="dk1"/>
+          </a:fontRef>
+        </p:style>
+        <p:txBody>
+          <a:bodyPr rtlCol="0" anchor="ctr"/>
+          <a:lstStyle/>
+          <a:p>
+            <a:pPr algn="ctr"/>
+            <a:r>
+              <a:rPr lang="es-ES" b="1" dirty="0">
+                <a:solidFill>
+                  <a:schemeClr val="tx1"/>
+                </a:solidFill>
+              </a:rPr>
+              <a:t>Alta</a:t>
+            </a:r>
+          </a:p>
+          <a:p>
+            <a:pPr algn="ctr"/>
+            <a:r>
+              <a:rPr lang="es-ES" b="1" dirty="0">
+                <a:solidFill>
+                  <a:schemeClr val="tx1"/>
+                </a:solidFill>
+              </a:rPr>
+              <a:t>Baja</a:t>
+            </a:r>
+          </a:p>
+          <a:p>
+            <a:pPr algn="ctr"/>
+            <a:r>
+              <a:rPr lang="es-ES" b="1" dirty="0">
+                <a:solidFill>
+                  <a:schemeClr val="tx1"/>
+                </a:solidFill>
+              </a:rPr>
+              <a:t>Mostrar perfil</a:t>
+            </a:r>
+          </a:p>
+          <a:p>
+            <a:pPr algn="ctr"/>
+            <a:r>
+              <a:rPr lang="es-ES" b="1" dirty="0">
+                <a:solidFill>
+                  <a:schemeClr val="tx1"/>
+                </a:solidFill>
+              </a:rPr>
+              <a:t>Mostrar compras</a:t>
+            </a:r>
+          </a:p>
+          <a:p>
+            <a:pPr algn="ctr"/>
+            <a:r>
+              <a:rPr lang="es-ES" b="1" dirty="0">
+                <a:solidFill>
+                  <a:schemeClr val="tx1"/>
+                </a:solidFill>
+              </a:rPr>
+              <a:t>Cerrar sesión</a:t>
+            </a:r>
+          </a:p>
+          <a:p>
+            <a:pPr algn="ctr"/>
+            <a:r>
+              <a:rPr lang="es-ES" b="1" dirty="0">
+                <a:solidFill>
+                  <a:schemeClr val="tx1"/>
+                </a:solidFill>
+              </a:rPr>
+              <a:t>Login</a:t>
+            </a:r>
+          </a:p>
+          <a:p>
+            <a:pPr algn="ctr"/>
+            <a:r>
+              <a:rPr lang="es-ES" b="1" dirty="0">
+                <a:solidFill>
+                  <a:schemeClr val="tx1"/>
+                </a:solidFill>
+              </a:rPr>
+              <a:t>Log off</a:t>
+            </a:r>
+          </a:p>
+          <a:p>
+            <a:pPr algn="ctr"/>
+            <a:r>
+              <a:rPr lang="es-ES" b="1" dirty="0">
+                <a:solidFill>
+                  <a:schemeClr val="tx1"/>
+                </a:solidFill>
+              </a:rPr>
+              <a:t>…</a:t>
+            </a:r>
+          </a:p>
+          <a:p>
+            <a:pPr algn="ctr"/>
+            <a:r>
+              <a:rPr lang="es-ES" b="1" dirty="0">
+                <a:solidFill>
+                  <a:schemeClr val="tx1"/>
+                </a:solidFill>
+              </a:rPr>
+              <a:t>Etc.</a:t>
+            </a:r>
+          </a:p>
+        </p:txBody>
+      </p:sp>
+      <p:cxnSp>
+        <p:nvCxnSpPr>
+          <p:cNvPr id="7" name="Conector recto de flecha 6">
+            <a:extLst>
+              <a:ext uri="{FF2B5EF4-FFF2-40B4-BE49-F238E27FC236}">
+                <a16:creationId xmlns:a16="http://schemas.microsoft.com/office/drawing/2014/main" id="{9F72CC6D-8034-4ECD-8F3B-6AD015DBA221}"/>
+              </a:ext>
+            </a:extLst>
+          </p:cNvPr>
+          <p:cNvCxnSpPr>
+            <a:cxnSpLocks/>
+            <a:endCxn id="4" idx="3"/>
+          </p:cNvCxnSpPr>
+          <p:nvPr/>
+        </p:nvCxnSpPr>
+        <p:spPr>
+          <a:xfrm flipH="1" flipV="1">
+            <a:off x="7210771" y="2024467"/>
+            <a:ext cx="1030706" cy="1404534"/>
+          </a:xfrm>
+          <a:prstGeom prst="straightConnector1">
+            <a:avLst/>
+          </a:prstGeom>
+          <a:ln w="76200">
+            <a:solidFill>
+              <a:schemeClr val="tx1"/>
+            </a:solidFill>
+            <a:tailEnd type="triangle"/>
+          </a:ln>
+        </p:spPr>
+        <p:style>
+          <a:lnRef idx="1">
+            <a:schemeClr val="accent1"/>
+          </a:lnRef>
+          <a:fillRef idx="0">
+            <a:schemeClr val="accent1"/>
+          </a:fillRef>
+          <a:effectRef idx="0">
+            <a:schemeClr val="accent1"/>
+          </a:effectRef>
+          <a:fontRef idx="minor">
+            <a:schemeClr val="tx1"/>
+          </a:fontRef>
+        </p:style>
+      </p:cxnSp>
+      <p:sp>
+        <p:nvSpPr>
+          <p:cNvPr id="10" name="CuadroTexto 9">
+            <a:extLst>
+              <a:ext uri="{FF2B5EF4-FFF2-40B4-BE49-F238E27FC236}">
+                <a16:creationId xmlns:a16="http://schemas.microsoft.com/office/drawing/2014/main" id="{07AC1524-D615-47D7-BE6A-10875B2010A7}"/>
+              </a:ext>
+            </a:extLst>
+          </p:cNvPr>
+          <p:cNvSpPr txBox="1"/>
+          <p:nvPr/>
+        </p:nvSpPr>
+        <p:spPr>
+          <a:xfrm>
+            <a:off x="7695232" y="2326965"/>
+            <a:ext cx="1757661" cy="369332"/>
+          </a:xfrm>
+          <a:prstGeom prst="rect">
+            <a:avLst/>
+          </a:prstGeom>
+          <a:noFill/>
+        </p:spPr>
+        <p:txBody>
+          <a:bodyPr wrap="none" rtlCol="0">
+            <a:spAutoFit/>
+          </a:bodyPr>
+          <a:lstStyle/>
+          <a:p>
+            <a:r>
+              <a:rPr lang="es-ES" b="1" dirty="0"/>
+              <a:t>publish(servicio)</a:t>
+            </a:r>
+          </a:p>
+        </p:txBody>
+      </p:sp>
+      <p:cxnSp>
+        <p:nvCxnSpPr>
+          <p:cNvPr id="14" name="Conector recto de flecha 13">
+            <a:extLst>
+              <a:ext uri="{FF2B5EF4-FFF2-40B4-BE49-F238E27FC236}">
+                <a16:creationId xmlns:a16="http://schemas.microsoft.com/office/drawing/2014/main" id="{D972AB23-E531-47BE-AAE0-1AD13FC27A98}"/>
+              </a:ext>
+            </a:extLst>
+          </p:cNvPr>
+          <p:cNvCxnSpPr>
+            <a:cxnSpLocks/>
+            <a:stCxn id="1026" idx="0"/>
+            <a:endCxn id="4" idx="1"/>
+          </p:cNvCxnSpPr>
+          <p:nvPr/>
+        </p:nvCxnSpPr>
+        <p:spPr>
+          <a:xfrm flipV="1">
+            <a:off x="3843226" y="2024467"/>
+            <a:ext cx="1399261" cy="1346411"/>
+          </a:xfrm>
+          <a:prstGeom prst="straightConnector1">
+            <a:avLst/>
+          </a:prstGeom>
+          <a:ln w="76200">
+            <a:solidFill>
+              <a:schemeClr val="tx1"/>
+            </a:solidFill>
+            <a:tailEnd type="triangle"/>
+          </a:ln>
+        </p:spPr>
+        <p:style>
+          <a:lnRef idx="1">
+            <a:schemeClr val="accent1"/>
+          </a:lnRef>
+          <a:fillRef idx="0">
+            <a:schemeClr val="accent1"/>
+          </a:fillRef>
+          <a:effectRef idx="0">
+            <a:schemeClr val="accent1"/>
+          </a:effectRef>
+          <a:fontRef idx="minor">
+            <a:schemeClr val="tx1"/>
+          </a:fontRef>
+        </p:style>
+      </p:cxnSp>
+      <p:sp>
+        <p:nvSpPr>
+          <p:cNvPr id="20" name="CuadroTexto 19">
+            <a:extLst>
+              <a:ext uri="{FF2B5EF4-FFF2-40B4-BE49-F238E27FC236}">
+                <a16:creationId xmlns:a16="http://schemas.microsoft.com/office/drawing/2014/main" id="{566B868D-BCDF-4FA7-8A90-751E77E3BA70}"/>
+              </a:ext>
+            </a:extLst>
+          </p:cNvPr>
+          <p:cNvSpPr txBox="1"/>
+          <p:nvPr/>
+        </p:nvSpPr>
+        <p:spPr>
+          <a:xfrm>
+            <a:off x="3115901" y="2142299"/>
+            <a:ext cx="1607171" cy="369332"/>
+          </a:xfrm>
+          <a:prstGeom prst="rect">
+            <a:avLst/>
+          </a:prstGeom>
+          <a:noFill/>
+        </p:spPr>
+        <p:txBody>
+          <a:bodyPr wrap="none" rtlCol="0">
+            <a:spAutoFit/>
+          </a:bodyPr>
+          <a:lstStyle/>
+          <a:p>
+            <a:r>
+              <a:rPr lang="es-ES" b="1" dirty="0"/>
+              <a:t>suscribe(myID)</a:t>
+            </a:r>
+          </a:p>
+        </p:txBody>
+      </p:sp>
+      <p:sp>
+        <p:nvSpPr>
+          <p:cNvPr id="22" name="Flecha: a la derecha 21">
+            <a:extLst>
+              <a:ext uri="{FF2B5EF4-FFF2-40B4-BE49-F238E27FC236}">
+                <a16:creationId xmlns:a16="http://schemas.microsoft.com/office/drawing/2014/main" id="{768E0206-2A42-4FE3-8CCF-AFF819F4F7DD}"/>
+              </a:ext>
+            </a:extLst>
+          </p:cNvPr>
+          <p:cNvSpPr/>
+          <p:nvPr/>
+        </p:nvSpPr>
+        <p:spPr>
+          <a:xfrm>
+            <a:off x="4973675" y="3771319"/>
+            <a:ext cx="2244650" cy="709626"/>
+          </a:xfrm>
+          <a:prstGeom prst="rightArrow">
+            <a:avLst/>
+          </a:prstGeom>
+        </p:spPr>
+        <p:style>
+          <a:lnRef idx="0">
+            <a:schemeClr val="accent2"/>
+          </a:lnRef>
+          <a:fillRef idx="3">
+            <a:schemeClr val="accent2"/>
+          </a:fillRef>
+          <a:effectRef idx="3">
+            <a:schemeClr val="accent2"/>
+          </a:effectRef>
+          <a:fontRef idx="minor">
+            <a:schemeClr val="lt1"/>
+          </a:fontRef>
+        </p:style>
+        <p:txBody>
+          <a:bodyPr rtlCol="0" anchor="ctr"/>
+          <a:lstStyle/>
+          <a:p>
+            <a:pPr algn="ctr"/>
+            <a:endParaRPr lang="es-ES" dirty="0"/>
+          </a:p>
+        </p:txBody>
+      </p:sp>
+      <p:sp>
+        <p:nvSpPr>
+          <p:cNvPr id="29" name="Flecha: a la derecha 28">
+            <a:extLst>
+              <a:ext uri="{FF2B5EF4-FFF2-40B4-BE49-F238E27FC236}">
+                <a16:creationId xmlns:a16="http://schemas.microsoft.com/office/drawing/2014/main" id="{0CDB3B1B-35D2-4B3C-A472-0707D8F5C590}"/>
+              </a:ext>
+            </a:extLst>
+          </p:cNvPr>
+          <p:cNvSpPr/>
+          <p:nvPr/>
+        </p:nvSpPr>
+        <p:spPr>
+          <a:xfrm rot="10800000">
+            <a:off x="4908959" y="4612679"/>
+            <a:ext cx="2244650" cy="709626"/>
+          </a:xfrm>
+          <a:prstGeom prst="rightArrow">
+            <a:avLst/>
+          </a:prstGeom>
+        </p:spPr>
+        <p:style>
+          <a:lnRef idx="0">
+            <a:schemeClr val="accent6"/>
+          </a:lnRef>
+          <a:fillRef idx="3">
+            <a:schemeClr val="accent6"/>
+          </a:fillRef>
+          <a:effectRef idx="3">
+            <a:schemeClr val="accent6"/>
+          </a:effectRef>
+          <a:fontRef idx="minor">
+            <a:schemeClr val="lt1"/>
+          </a:fontRef>
+        </p:style>
+        <p:txBody>
+          <a:bodyPr rtlCol="0" anchor="ctr"/>
+          <a:lstStyle/>
+          <a:p>
+            <a:pPr algn="ctr"/>
+            <a:endParaRPr lang="es-ES" dirty="0"/>
+          </a:p>
+        </p:txBody>
+      </p:sp>
+      <p:sp>
+        <p:nvSpPr>
+          <p:cNvPr id="30" name="CuadroTexto 29">
+            <a:extLst>
+              <a:ext uri="{FF2B5EF4-FFF2-40B4-BE49-F238E27FC236}">
+                <a16:creationId xmlns:a16="http://schemas.microsoft.com/office/drawing/2014/main" id="{C73DDE18-200C-4DF8-8148-0F0AE9FF625A}"/>
+              </a:ext>
+            </a:extLst>
+          </p:cNvPr>
+          <p:cNvSpPr txBox="1"/>
+          <p:nvPr/>
+        </p:nvSpPr>
+        <p:spPr>
+          <a:xfrm>
+            <a:off x="5339799" y="3520786"/>
+            <a:ext cx="1512402" cy="369332"/>
+          </a:xfrm>
+          <a:prstGeom prst="rect">
+            <a:avLst/>
+          </a:prstGeom>
+          <a:noFill/>
+        </p:spPr>
+        <p:txBody>
+          <a:bodyPr wrap="none" rtlCol="0">
+            <a:spAutoFit/>
+          </a:bodyPr>
+          <a:lstStyle/>
+          <a:p>
+            <a:r>
+              <a:rPr lang="es-ES" b="1" dirty="0"/>
+              <a:t>Peticion (alta)</a:t>
+            </a:r>
+          </a:p>
+        </p:txBody>
+      </p:sp>
+      <p:sp>
+        <p:nvSpPr>
+          <p:cNvPr id="31" name="CuadroTexto 30">
+            <a:extLst>
+              <a:ext uri="{FF2B5EF4-FFF2-40B4-BE49-F238E27FC236}">
+                <a16:creationId xmlns:a16="http://schemas.microsoft.com/office/drawing/2014/main" id="{2790C641-7A5F-4C44-8F18-16D2E84ECB43}"/>
+              </a:ext>
+            </a:extLst>
+          </p:cNvPr>
+          <p:cNvSpPr txBox="1"/>
+          <p:nvPr/>
+        </p:nvSpPr>
+        <p:spPr>
+          <a:xfrm>
+            <a:off x="5471886" y="4439655"/>
+            <a:ext cx="1248227" cy="369332"/>
+          </a:xfrm>
+          <a:prstGeom prst="rect">
+            <a:avLst/>
+          </a:prstGeom>
+          <a:noFill/>
+        </p:spPr>
+        <p:txBody>
+          <a:bodyPr wrap="none" rtlCol="0">
+            <a:spAutoFit/>
+          </a:bodyPr>
+          <a:lstStyle/>
+          <a:p>
+            <a:r>
+              <a:rPr lang="es-ES" b="1" dirty="0"/>
+              <a:t>Return alta</a:t>
+            </a:r>
+          </a:p>
+        </p:txBody>
+      </p:sp>
+    </p:spTree>
+    <p:extLst>
+      <p:ext uri="{BB962C8B-B14F-4D97-AF65-F5344CB8AC3E}">
+        <p14:creationId xmlns:p14="http://schemas.microsoft.com/office/powerpoint/2010/main" val="3259858961"/>
+      </p:ext>
+    </p:extLst>
+  </p:cSld>
+  <p:clrMapOvr>
+    <a:masterClrMapping/>
+  </p:clrMapOvr>
+</p:sld>
+</file>
+
 <file path=ppt/theme/theme1.xml><?xml version="1.0" encoding="utf-8"?>
 <a:theme xmlns:a="http://schemas.openxmlformats.org/drawingml/2006/main" name="Tema de Office">
   <a:themeElements>

</xml_diff>

<commit_message>
Estado del arte casi completado_metodologias hecho
</commit_message>
<xml_diff>
--- a/docs/Diagrama de arquitectura.pptx
+++ b/docs/Diagrama de arquitectura.pptx
@@ -10,6 +10,8 @@
     <p:sldId id="258" r:id="rId4"/>
     <p:sldId id="259" r:id="rId5"/>
     <p:sldId id="260" r:id="rId6"/>
+    <p:sldId id="261" r:id="rId7"/>
+    <p:sldId id="262" r:id="rId8"/>
   </p:sldIdLst>
   <p:sldSz cx="12192000" cy="6858000"/>
   <p:notesSz cx="6858000" cy="9144000"/>
@@ -263,7 +265,7 @@
           <a:p>
             <a:fld id="{4DAFCE15-DBFD-4C2D-8258-132D751D944C}" type="datetimeFigureOut">
               <a:rPr lang="es-ES" smtClean="0"/>
-              <a:t>15/03/2018</a:t>
+              <a:t>19/03/2018</a:t>
             </a:fld>
             <a:endParaRPr lang="es-ES"/>
           </a:p>
@@ -461,7 +463,7 @@
           <a:p>
             <a:fld id="{4DAFCE15-DBFD-4C2D-8258-132D751D944C}" type="datetimeFigureOut">
               <a:rPr lang="es-ES" smtClean="0"/>
-              <a:t>15/03/2018</a:t>
+              <a:t>19/03/2018</a:t>
             </a:fld>
             <a:endParaRPr lang="es-ES"/>
           </a:p>
@@ -669,7 +671,7 @@
           <a:p>
             <a:fld id="{4DAFCE15-DBFD-4C2D-8258-132D751D944C}" type="datetimeFigureOut">
               <a:rPr lang="es-ES" smtClean="0"/>
-              <a:t>15/03/2018</a:t>
+              <a:t>19/03/2018</a:t>
             </a:fld>
             <a:endParaRPr lang="es-ES"/>
           </a:p>
@@ -867,7 +869,7 @@
           <a:p>
             <a:fld id="{4DAFCE15-DBFD-4C2D-8258-132D751D944C}" type="datetimeFigureOut">
               <a:rPr lang="es-ES" smtClean="0"/>
-              <a:t>15/03/2018</a:t>
+              <a:t>19/03/2018</a:t>
             </a:fld>
             <a:endParaRPr lang="es-ES"/>
           </a:p>
@@ -1142,7 +1144,7 @@
           <a:p>
             <a:fld id="{4DAFCE15-DBFD-4C2D-8258-132D751D944C}" type="datetimeFigureOut">
               <a:rPr lang="es-ES" smtClean="0"/>
-              <a:t>15/03/2018</a:t>
+              <a:t>19/03/2018</a:t>
             </a:fld>
             <a:endParaRPr lang="es-ES"/>
           </a:p>
@@ -1407,7 +1409,7 @@
           <a:p>
             <a:fld id="{4DAFCE15-DBFD-4C2D-8258-132D751D944C}" type="datetimeFigureOut">
               <a:rPr lang="es-ES" smtClean="0"/>
-              <a:t>15/03/2018</a:t>
+              <a:t>19/03/2018</a:t>
             </a:fld>
             <a:endParaRPr lang="es-ES"/>
           </a:p>
@@ -1819,7 +1821,7 @@
           <a:p>
             <a:fld id="{4DAFCE15-DBFD-4C2D-8258-132D751D944C}" type="datetimeFigureOut">
               <a:rPr lang="es-ES" smtClean="0"/>
-              <a:t>15/03/2018</a:t>
+              <a:t>19/03/2018</a:t>
             </a:fld>
             <a:endParaRPr lang="es-ES"/>
           </a:p>
@@ -1960,7 +1962,7 @@
           <a:p>
             <a:fld id="{4DAFCE15-DBFD-4C2D-8258-132D751D944C}" type="datetimeFigureOut">
               <a:rPr lang="es-ES" smtClean="0"/>
-              <a:t>15/03/2018</a:t>
+              <a:t>19/03/2018</a:t>
             </a:fld>
             <a:endParaRPr lang="es-ES"/>
           </a:p>
@@ -2073,7 +2075,7 @@
           <a:p>
             <a:fld id="{4DAFCE15-DBFD-4C2D-8258-132D751D944C}" type="datetimeFigureOut">
               <a:rPr lang="es-ES" smtClean="0"/>
-              <a:t>15/03/2018</a:t>
+              <a:t>19/03/2018</a:t>
             </a:fld>
             <a:endParaRPr lang="es-ES"/>
           </a:p>
@@ -2384,7 +2386,7 @@
           <a:p>
             <a:fld id="{4DAFCE15-DBFD-4C2D-8258-132D751D944C}" type="datetimeFigureOut">
               <a:rPr lang="es-ES" smtClean="0"/>
-              <a:t>15/03/2018</a:t>
+              <a:t>19/03/2018</a:t>
             </a:fld>
             <a:endParaRPr lang="es-ES"/>
           </a:p>
@@ -2672,7 +2674,7 @@
           <a:p>
             <a:fld id="{4DAFCE15-DBFD-4C2D-8258-132D751D944C}" type="datetimeFigureOut">
               <a:rPr lang="es-ES" smtClean="0"/>
-              <a:t>15/03/2018</a:t>
+              <a:t>19/03/2018</a:t>
             </a:fld>
             <a:endParaRPr lang="es-ES"/>
           </a:p>
@@ -2913,7 +2915,7 @@
           <a:p>
             <a:fld id="{4DAFCE15-DBFD-4C2D-8258-132D751D944C}" type="datetimeFigureOut">
               <a:rPr lang="es-ES" smtClean="0"/>
-              <a:t>15/03/2018</a:t>
+              <a:t>19/03/2018</a:t>
             </a:fld>
             <a:endParaRPr lang="es-ES"/>
           </a:p>
@@ -9155,6 +9157,2553 @@
 </p:sld>
 </file>
 
+<file path=ppt/slides/slide6.xml><?xml version="1.0" encoding="utf-8"?>
+<p:sld xmlns:a="http://schemas.openxmlformats.org/drawingml/2006/main" xmlns:r="http://schemas.openxmlformats.org/officeDocument/2006/relationships" xmlns:p="http://schemas.openxmlformats.org/presentationml/2006/main">
+  <p:cSld>
+    <p:spTree>
+      <p:nvGrpSpPr>
+        <p:cNvPr id="1" name=""/>
+        <p:cNvGrpSpPr/>
+        <p:nvPr/>
+      </p:nvGrpSpPr>
+      <p:grpSpPr>
+        <a:xfrm>
+          <a:off x="0" y="0"/>
+          <a:ext cx="0" cy="0"/>
+          <a:chOff x="0" y="0"/>
+          <a:chExt cx="0" cy="0"/>
+        </a:xfrm>
+      </p:grpSpPr>
+      <p:pic>
+        <p:nvPicPr>
+          <p:cNvPr id="1026" name="Picture 2" descr="Resultado de imagen de aerogenerador png">
+            <a:extLst>
+              <a:ext uri="{FF2B5EF4-FFF2-40B4-BE49-F238E27FC236}">
+                <a16:creationId xmlns:a16="http://schemas.microsoft.com/office/drawing/2014/main" id="{9DC6F4E1-8C06-4308-A2B1-D5BEC8B3230A}"/>
+              </a:ext>
+            </a:extLst>
+          </p:cNvPr>
+          <p:cNvPicPr>
+            <a:picLocks noChangeAspect="1" noChangeArrowheads="1"/>
+          </p:cNvPicPr>
+          <p:nvPr/>
+        </p:nvPicPr>
+        <p:blipFill>
+          <a:blip r:embed="rId2">
+            <a:extLst>
+              <a:ext uri="{28A0092B-C50C-407E-A947-70E740481C1C}">
+                <a14:useLocalDpi xmlns:a14="http://schemas.microsoft.com/office/drawing/2010/main" val="0"/>
+              </a:ext>
+            </a:extLst>
+          </a:blip>
+          <a:srcRect/>
+          <a:stretch>
+            <a:fillRect/>
+          </a:stretch>
+        </p:blipFill>
+        <p:spPr bwMode="auto">
+          <a:xfrm>
+            <a:off x="650966" y="1590623"/>
+            <a:ext cx="960860" cy="1299448"/>
+          </a:xfrm>
+          <a:prstGeom prst="rect">
+            <a:avLst/>
+          </a:prstGeom>
+          <a:noFill/>
+          <a:extLst>
+            <a:ext uri="{909E8E84-426E-40DD-AFC4-6F175D3DCCD1}">
+              <a14:hiddenFill xmlns:a14="http://schemas.microsoft.com/office/drawing/2010/main">
+                <a:solidFill>
+                  <a:srgbClr val="FFFFFF"/>
+                </a:solidFill>
+              </a14:hiddenFill>
+            </a:ext>
+          </a:extLst>
+        </p:spPr>
+      </p:pic>
+      <p:pic>
+        <p:nvPicPr>
+          <p:cNvPr id="1028" name="Picture 4" descr="Resultado de imagen de casa png">
+            <a:extLst>
+              <a:ext uri="{FF2B5EF4-FFF2-40B4-BE49-F238E27FC236}">
+                <a16:creationId xmlns:a16="http://schemas.microsoft.com/office/drawing/2014/main" id="{373FF36F-B1B9-4286-94FD-9F4BEC779202}"/>
+              </a:ext>
+            </a:extLst>
+          </p:cNvPr>
+          <p:cNvPicPr>
+            <a:picLocks noChangeAspect="1" noChangeArrowheads="1"/>
+          </p:cNvPicPr>
+          <p:nvPr/>
+        </p:nvPicPr>
+        <p:blipFill>
+          <a:blip r:embed="rId3">
+            <a:extLst>
+              <a:ext uri="{28A0092B-C50C-407E-A947-70E740481C1C}">
+                <a14:useLocalDpi xmlns:a14="http://schemas.microsoft.com/office/drawing/2010/main" val="0"/>
+              </a:ext>
+            </a:extLst>
+          </a:blip>
+          <a:srcRect/>
+          <a:stretch>
+            <a:fillRect/>
+          </a:stretch>
+        </p:blipFill>
+        <p:spPr bwMode="auto">
+          <a:xfrm>
+            <a:off x="258454" y="3761590"/>
+            <a:ext cx="1745884" cy="1299448"/>
+          </a:xfrm>
+          <a:prstGeom prst="rect">
+            <a:avLst/>
+          </a:prstGeom>
+          <a:noFill/>
+          <a:extLst>
+            <a:ext uri="{909E8E84-426E-40DD-AFC4-6F175D3DCCD1}">
+              <a14:hiddenFill xmlns:a14="http://schemas.microsoft.com/office/drawing/2010/main">
+                <a:solidFill>
+                  <a:srgbClr val="FFFFFF"/>
+                </a:solidFill>
+              </a14:hiddenFill>
+            </a:ext>
+          </a:extLst>
+        </p:spPr>
+      </p:pic>
+      <p:pic>
+        <p:nvPicPr>
+          <p:cNvPr id="1030" name="Picture 6" descr="Resultado de imagen de termómetro png">
+            <a:extLst>
+              <a:ext uri="{FF2B5EF4-FFF2-40B4-BE49-F238E27FC236}">
+                <a16:creationId xmlns:a16="http://schemas.microsoft.com/office/drawing/2014/main" id="{B59D7228-34C9-4F4F-80C0-FC9CE4951ABC}"/>
+              </a:ext>
+            </a:extLst>
+          </p:cNvPr>
+          <p:cNvPicPr>
+            <a:picLocks noChangeAspect="1" noChangeArrowheads="1"/>
+          </p:cNvPicPr>
+          <p:nvPr/>
+        </p:nvPicPr>
+        <p:blipFill>
+          <a:blip r:embed="rId4">
+            <a:extLst>
+              <a:ext uri="{28A0092B-C50C-407E-A947-70E740481C1C}">
+                <a14:useLocalDpi xmlns:a14="http://schemas.microsoft.com/office/drawing/2010/main" val="0"/>
+              </a:ext>
+            </a:extLst>
+          </a:blip>
+          <a:srcRect/>
+          <a:stretch>
+            <a:fillRect/>
+          </a:stretch>
+        </p:blipFill>
+        <p:spPr bwMode="auto">
+          <a:xfrm>
+            <a:off x="2004338" y="3959740"/>
+            <a:ext cx="825285" cy="825285"/>
+          </a:xfrm>
+          <a:prstGeom prst="rect">
+            <a:avLst/>
+          </a:prstGeom>
+          <a:noFill/>
+          <a:extLst>
+            <a:ext uri="{909E8E84-426E-40DD-AFC4-6F175D3DCCD1}">
+              <a14:hiddenFill xmlns:a14="http://schemas.microsoft.com/office/drawing/2010/main">
+                <a:solidFill>
+                  <a:srgbClr val="FFFFFF"/>
+                </a:solidFill>
+              </a14:hiddenFill>
+            </a:ext>
+          </a:extLst>
+        </p:spPr>
+      </p:pic>
+      <p:pic>
+        <p:nvPicPr>
+          <p:cNvPr id="1032" name="Picture 8" descr="Resultado de imagen de anemómetro png">
+            <a:extLst>
+              <a:ext uri="{FF2B5EF4-FFF2-40B4-BE49-F238E27FC236}">
+                <a16:creationId xmlns:a16="http://schemas.microsoft.com/office/drawing/2014/main" id="{3F8DB1D8-04BD-4602-9004-258E39F678F1}"/>
+              </a:ext>
+            </a:extLst>
+          </p:cNvPr>
+          <p:cNvPicPr>
+            <a:picLocks noChangeAspect="1" noChangeArrowheads="1"/>
+          </p:cNvPicPr>
+          <p:nvPr/>
+        </p:nvPicPr>
+        <p:blipFill>
+          <a:blip r:embed="rId5">
+            <a:extLst>
+              <a:ext uri="{28A0092B-C50C-407E-A947-70E740481C1C}">
+                <a14:useLocalDpi xmlns:a14="http://schemas.microsoft.com/office/drawing/2010/main" val="0"/>
+              </a:ext>
+            </a:extLst>
+          </a:blip>
+          <a:srcRect/>
+          <a:stretch>
+            <a:fillRect/>
+          </a:stretch>
+        </p:blipFill>
+        <p:spPr bwMode="auto">
+          <a:xfrm>
+            <a:off x="1611826" y="1802717"/>
+            <a:ext cx="1522370" cy="1015409"/>
+          </a:xfrm>
+          <a:prstGeom prst="rect">
+            <a:avLst/>
+          </a:prstGeom>
+          <a:noFill/>
+          <a:extLst>
+            <a:ext uri="{909E8E84-426E-40DD-AFC4-6F175D3DCCD1}">
+              <a14:hiddenFill xmlns:a14="http://schemas.microsoft.com/office/drawing/2010/main">
+                <a:solidFill>
+                  <a:srgbClr val="FFFFFF"/>
+                </a:solidFill>
+              </a14:hiddenFill>
+            </a:ext>
+          </a:extLst>
+        </p:spPr>
+      </p:pic>
+      <p:sp>
+        <p:nvSpPr>
+          <p:cNvPr id="4" name="CuadroTexto 3">
+            <a:extLst>
+              <a:ext uri="{FF2B5EF4-FFF2-40B4-BE49-F238E27FC236}">
+                <a16:creationId xmlns:a16="http://schemas.microsoft.com/office/drawing/2014/main" id="{30D45A30-B900-494F-AF53-A6EF334B0AE9}"/>
+              </a:ext>
+            </a:extLst>
+          </p:cNvPr>
+          <p:cNvSpPr txBox="1"/>
+          <p:nvPr/>
+        </p:nvSpPr>
+        <p:spPr>
+          <a:xfrm>
+            <a:off x="650966" y="3157427"/>
+            <a:ext cx="1621791" cy="369332"/>
+          </a:xfrm>
+          <a:prstGeom prst="rect">
+            <a:avLst/>
+          </a:prstGeom>
+          <a:noFill/>
+        </p:spPr>
+        <p:txBody>
+          <a:bodyPr wrap="none" rtlCol="0">
+            <a:spAutoFit/>
+          </a:bodyPr>
+          <a:lstStyle/>
+          <a:p>
+            <a:r>
+              <a:rPr lang="es-ES" b="1" dirty="0"/>
+              <a:t>Aerogenerador</a:t>
+            </a:r>
+          </a:p>
+        </p:txBody>
+      </p:sp>
+      <p:sp>
+        <p:nvSpPr>
+          <p:cNvPr id="9" name="CuadroTexto 8">
+            <a:extLst>
+              <a:ext uri="{FF2B5EF4-FFF2-40B4-BE49-F238E27FC236}">
+                <a16:creationId xmlns:a16="http://schemas.microsoft.com/office/drawing/2014/main" id="{8018A35B-C9B1-453C-A69B-B98C55169525}"/>
+              </a:ext>
+            </a:extLst>
+          </p:cNvPr>
+          <p:cNvSpPr txBox="1"/>
+          <p:nvPr/>
+        </p:nvSpPr>
+        <p:spPr>
+          <a:xfrm>
+            <a:off x="1294270" y="4937733"/>
+            <a:ext cx="1109856" cy="369332"/>
+          </a:xfrm>
+          <a:prstGeom prst="rect">
+            <a:avLst/>
+          </a:prstGeom>
+          <a:noFill/>
+        </p:spPr>
+        <p:txBody>
+          <a:bodyPr wrap="none" rtlCol="0">
+            <a:spAutoFit/>
+          </a:bodyPr>
+          <a:lstStyle/>
+          <a:p>
+            <a:r>
+              <a:rPr lang="es-ES" b="1" dirty="0"/>
+              <a:t>Domótica</a:t>
+            </a:r>
+          </a:p>
+        </p:txBody>
+      </p:sp>
+      <p:sp>
+        <p:nvSpPr>
+          <p:cNvPr id="5" name="Rectángulo 4">
+            <a:extLst>
+              <a:ext uri="{FF2B5EF4-FFF2-40B4-BE49-F238E27FC236}">
+                <a16:creationId xmlns:a16="http://schemas.microsoft.com/office/drawing/2014/main" id="{832323E1-E260-4626-82E6-46AE1EE8A73A}"/>
+              </a:ext>
+            </a:extLst>
+          </p:cNvPr>
+          <p:cNvSpPr/>
+          <p:nvPr/>
+        </p:nvSpPr>
+        <p:spPr>
+          <a:xfrm>
+            <a:off x="4407552" y="3105560"/>
+            <a:ext cx="3500251" cy="1384382"/>
+          </a:xfrm>
+          <a:prstGeom prst="rect">
+            <a:avLst/>
+          </a:prstGeom>
+          <a:solidFill>
+            <a:schemeClr val="accent6"/>
+          </a:solidFill>
+          <a:ln>
+            <a:noFill/>
+          </a:ln>
+        </p:spPr>
+        <p:style>
+          <a:lnRef idx="0">
+            <a:scrgbClr r="0" g="0" b="0"/>
+          </a:lnRef>
+          <a:fillRef idx="0">
+            <a:scrgbClr r="0" g="0" b="0"/>
+          </a:fillRef>
+          <a:effectRef idx="0">
+            <a:scrgbClr r="0" g="0" b="0"/>
+          </a:effectRef>
+          <a:fontRef idx="minor">
+            <a:schemeClr val="lt1"/>
+          </a:fontRef>
+        </p:style>
+        <p:txBody>
+          <a:bodyPr rtlCol="0" anchor="ctr"/>
+          <a:lstStyle/>
+          <a:p>
+            <a:pPr algn="ctr"/>
+            <a:r>
+              <a:rPr lang="es-ES" sz="3600" b="1" dirty="0"/>
+              <a:t>Enterprise Service Bus</a:t>
+            </a:r>
+          </a:p>
+        </p:txBody>
+      </p:sp>
+      <p:pic>
+        <p:nvPicPr>
+          <p:cNvPr id="11" name="Picture 2" descr="Resultado de imagen de tuerca png">
+            <a:extLst>
+              <a:ext uri="{FF2B5EF4-FFF2-40B4-BE49-F238E27FC236}">
+                <a16:creationId xmlns:a16="http://schemas.microsoft.com/office/drawing/2014/main" id="{A5737B78-6695-4006-B310-D48A81B36E59}"/>
+              </a:ext>
+            </a:extLst>
+          </p:cNvPr>
+          <p:cNvPicPr>
+            <a:picLocks noChangeAspect="1" noChangeArrowheads="1"/>
+          </p:cNvPicPr>
+          <p:nvPr/>
+        </p:nvPicPr>
+        <p:blipFill>
+          <a:blip r:embed="rId6">
+            <a:extLst>
+              <a:ext uri="{28A0092B-C50C-407E-A947-70E740481C1C}">
+                <a14:useLocalDpi xmlns:a14="http://schemas.microsoft.com/office/drawing/2010/main" val="0"/>
+              </a:ext>
+            </a:extLst>
+          </a:blip>
+          <a:srcRect/>
+          <a:stretch>
+            <a:fillRect/>
+          </a:stretch>
+        </p:blipFill>
+        <p:spPr bwMode="auto">
+          <a:xfrm>
+            <a:off x="8492538" y="-69370"/>
+            <a:ext cx="2987476" cy="2987476"/>
+          </a:xfrm>
+          <a:prstGeom prst="rect">
+            <a:avLst/>
+          </a:prstGeom>
+          <a:noFill/>
+          <a:extLst>
+            <a:ext uri="{909E8E84-426E-40DD-AFC4-6F175D3DCCD1}">
+              <a14:hiddenFill xmlns:a14="http://schemas.microsoft.com/office/drawing/2010/main">
+                <a:solidFill>
+                  <a:srgbClr val="FFFFFF"/>
+                </a:solidFill>
+              </a14:hiddenFill>
+            </a:ext>
+          </a:extLst>
+        </p:spPr>
+      </p:pic>
+      <p:sp>
+        <p:nvSpPr>
+          <p:cNvPr id="6" name="CuadroTexto 5">
+            <a:extLst>
+              <a:ext uri="{FF2B5EF4-FFF2-40B4-BE49-F238E27FC236}">
+                <a16:creationId xmlns:a16="http://schemas.microsoft.com/office/drawing/2014/main" id="{66F2D674-673E-4137-A649-9A9C0104D6AD}"/>
+              </a:ext>
+            </a:extLst>
+          </p:cNvPr>
+          <p:cNvSpPr txBox="1"/>
+          <p:nvPr/>
+        </p:nvSpPr>
+        <p:spPr>
+          <a:xfrm>
+            <a:off x="9214173" y="1193535"/>
+            <a:ext cx="1544205" cy="461665"/>
+          </a:xfrm>
+          <a:prstGeom prst="rect">
+            <a:avLst/>
+          </a:prstGeom>
+          <a:gradFill flip="none" rotWithShape="1">
+            <a:gsLst>
+              <a:gs pos="0">
+                <a:srgbClr val="FFFF00">
+                  <a:tint val="66000"/>
+                  <a:satMod val="160000"/>
+                </a:srgbClr>
+              </a:gs>
+              <a:gs pos="50000">
+                <a:srgbClr val="FFFF00">
+                  <a:tint val="44500"/>
+                  <a:satMod val="160000"/>
+                </a:srgbClr>
+              </a:gs>
+              <a:gs pos="100000">
+                <a:srgbClr val="FFFF00">
+                  <a:tint val="23500"/>
+                  <a:satMod val="160000"/>
+                </a:srgbClr>
+              </a:gs>
+            </a:gsLst>
+            <a:path path="circle">
+              <a:fillToRect l="100000" t="100000"/>
+            </a:path>
+            <a:tileRect r="-100000" b="-100000"/>
+          </a:gradFill>
+        </p:spPr>
+        <p:txBody>
+          <a:bodyPr wrap="none" rtlCol="0">
+            <a:spAutoFit/>
+          </a:bodyPr>
+          <a:lstStyle/>
+          <a:p>
+            <a:r>
+              <a:rPr lang="es-ES" sz="2400" b="1" dirty="0"/>
+              <a:t>Motor CEP</a:t>
+            </a:r>
+          </a:p>
+        </p:txBody>
+      </p:sp>
+      <p:sp>
+        <p:nvSpPr>
+          <p:cNvPr id="7" name="Rectángulo 6">
+            <a:extLst>
+              <a:ext uri="{FF2B5EF4-FFF2-40B4-BE49-F238E27FC236}">
+                <a16:creationId xmlns:a16="http://schemas.microsoft.com/office/drawing/2014/main" id="{441C7425-2BCE-4109-8781-23487C4DDE01}"/>
+              </a:ext>
+            </a:extLst>
+          </p:cNvPr>
+          <p:cNvSpPr/>
+          <p:nvPr/>
+        </p:nvSpPr>
+        <p:spPr>
+          <a:xfrm>
+            <a:off x="140466" y="1359790"/>
+            <a:ext cx="2993730" cy="4496064"/>
+          </a:xfrm>
+          <a:prstGeom prst="rect">
+            <a:avLst/>
+          </a:prstGeom>
+          <a:noFill/>
+          <a:ln w="57150"/>
+        </p:spPr>
+        <p:style>
+          <a:lnRef idx="2">
+            <a:schemeClr val="accent1">
+              <a:shade val="50000"/>
+            </a:schemeClr>
+          </a:lnRef>
+          <a:fillRef idx="1">
+            <a:schemeClr val="accent1"/>
+          </a:fillRef>
+          <a:effectRef idx="0">
+            <a:schemeClr val="accent1"/>
+          </a:effectRef>
+          <a:fontRef idx="minor">
+            <a:schemeClr val="lt1"/>
+          </a:fontRef>
+        </p:style>
+        <p:txBody>
+          <a:bodyPr rtlCol="0" anchor="ctr"/>
+          <a:lstStyle/>
+          <a:p>
+            <a:pPr algn="ctr"/>
+            <a:endParaRPr lang="es-ES"/>
+          </a:p>
+        </p:txBody>
+      </p:sp>
+      <p:cxnSp>
+        <p:nvCxnSpPr>
+          <p:cNvPr id="10" name="Conector recto de flecha 9">
+            <a:extLst>
+              <a:ext uri="{FF2B5EF4-FFF2-40B4-BE49-F238E27FC236}">
+                <a16:creationId xmlns:a16="http://schemas.microsoft.com/office/drawing/2014/main" id="{94DE352F-F5C3-4896-89A3-DBF6E00F2C92}"/>
+              </a:ext>
+            </a:extLst>
+          </p:cNvPr>
+          <p:cNvCxnSpPr>
+            <a:cxnSpLocks/>
+          </p:cNvCxnSpPr>
+          <p:nvPr/>
+        </p:nvCxnSpPr>
+        <p:spPr>
+          <a:xfrm>
+            <a:off x="3134196" y="2285340"/>
+            <a:ext cx="1255490" cy="1564278"/>
+          </a:xfrm>
+          <a:prstGeom prst="straightConnector1">
+            <a:avLst/>
+          </a:prstGeom>
+          <a:ln w="76200">
+            <a:solidFill>
+              <a:schemeClr val="tx1"/>
+            </a:solidFill>
+            <a:tailEnd type="triangle"/>
+          </a:ln>
+        </p:spPr>
+        <p:style>
+          <a:lnRef idx="1">
+            <a:schemeClr val="accent1"/>
+          </a:lnRef>
+          <a:fillRef idx="0">
+            <a:schemeClr val="accent1"/>
+          </a:fillRef>
+          <a:effectRef idx="0">
+            <a:schemeClr val="accent1"/>
+          </a:effectRef>
+          <a:fontRef idx="minor">
+            <a:schemeClr val="tx1"/>
+          </a:fontRef>
+        </p:style>
+      </p:cxnSp>
+      <p:cxnSp>
+        <p:nvCxnSpPr>
+          <p:cNvPr id="16" name="Conector recto de flecha 15">
+            <a:extLst>
+              <a:ext uri="{FF2B5EF4-FFF2-40B4-BE49-F238E27FC236}">
+                <a16:creationId xmlns:a16="http://schemas.microsoft.com/office/drawing/2014/main" id="{B1EBAEB7-37F8-4B4F-90FD-79B4694CA557}"/>
+              </a:ext>
+            </a:extLst>
+          </p:cNvPr>
+          <p:cNvCxnSpPr>
+            <a:cxnSpLocks/>
+          </p:cNvCxnSpPr>
+          <p:nvPr/>
+        </p:nvCxnSpPr>
+        <p:spPr>
+          <a:xfrm flipV="1">
+            <a:off x="3134196" y="3849618"/>
+            <a:ext cx="1255490" cy="640324"/>
+          </a:xfrm>
+          <a:prstGeom prst="straightConnector1">
+            <a:avLst/>
+          </a:prstGeom>
+          <a:ln w="76200">
+            <a:solidFill>
+              <a:schemeClr val="tx1"/>
+            </a:solidFill>
+            <a:tailEnd type="triangle"/>
+          </a:ln>
+        </p:spPr>
+        <p:style>
+          <a:lnRef idx="1">
+            <a:schemeClr val="accent1"/>
+          </a:lnRef>
+          <a:fillRef idx="0">
+            <a:schemeClr val="accent1"/>
+          </a:fillRef>
+          <a:effectRef idx="0">
+            <a:schemeClr val="accent1"/>
+          </a:effectRef>
+          <a:fontRef idx="minor">
+            <a:schemeClr val="tx1"/>
+          </a:fontRef>
+        </p:style>
+      </p:cxnSp>
+      <p:sp>
+        <p:nvSpPr>
+          <p:cNvPr id="19" name="CuadroTexto 18">
+            <a:extLst>
+              <a:ext uri="{FF2B5EF4-FFF2-40B4-BE49-F238E27FC236}">
+                <a16:creationId xmlns:a16="http://schemas.microsoft.com/office/drawing/2014/main" id="{CBDD9170-04FE-4369-A195-FA57AE3F23A8}"/>
+              </a:ext>
+            </a:extLst>
+          </p:cNvPr>
+          <p:cNvSpPr txBox="1"/>
+          <p:nvPr/>
+        </p:nvSpPr>
+        <p:spPr>
+          <a:xfrm>
+            <a:off x="3528046" y="2377673"/>
+            <a:ext cx="622286" cy="369332"/>
+          </a:xfrm>
+          <a:prstGeom prst="rect">
+            <a:avLst/>
+          </a:prstGeom>
+          <a:noFill/>
+        </p:spPr>
+        <p:txBody>
+          <a:bodyPr wrap="none" rtlCol="0">
+            <a:spAutoFit/>
+          </a:bodyPr>
+          <a:lstStyle/>
+          <a:p>
+            <a:r>
+              <a:rPr lang="es-ES" b="1" dirty="0"/>
+              <a:t>CH 1</a:t>
+            </a:r>
+          </a:p>
+        </p:txBody>
+      </p:sp>
+      <p:sp>
+        <p:nvSpPr>
+          <p:cNvPr id="20" name="CuadroTexto 19">
+            <a:extLst>
+              <a:ext uri="{FF2B5EF4-FFF2-40B4-BE49-F238E27FC236}">
+                <a16:creationId xmlns:a16="http://schemas.microsoft.com/office/drawing/2014/main" id="{14AAA015-0269-4628-8FD0-8676552D4429}"/>
+              </a:ext>
+            </a:extLst>
+          </p:cNvPr>
+          <p:cNvSpPr txBox="1"/>
+          <p:nvPr/>
+        </p:nvSpPr>
+        <p:spPr>
+          <a:xfrm>
+            <a:off x="3528046" y="4431435"/>
+            <a:ext cx="622286" cy="369332"/>
+          </a:xfrm>
+          <a:prstGeom prst="rect">
+            <a:avLst/>
+          </a:prstGeom>
+          <a:noFill/>
+        </p:spPr>
+        <p:txBody>
+          <a:bodyPr wrap="none" rtlCol="0">
+            <a:spAutoFit/>
+          </a:bodyPr>
+          <a:lstStyle/>
+          <a:p>
+            <a:r>
+              <a:rPr lang="es-ES" b="1" dirty="0"/>
+              <a:t>CH 2</a:t>
+            </a:r>
+          </a:p>
+        </p:txBody>
+      </p:sp>
+      <p:sp>
+        <p:nvSpPr>
+          <p:cNvPr id="14" name="Elipse 13">
+            <a:extLst>
+              <a:ext uri="{FF2B5EF4-FFF2-40B4-BE49-F238E27FC236}">
+                <a16:creationId xmlns:a16="http://schemas.microsoft.com/office/drawing/2014/main" id="{C62C83BD-7D9B-4781-BACD-95DA209D16BF}"/>
+              </a:ext>
+            </a:extLst>
+          </p:cNvPr>
+          <p:cNvSpPr/>
+          <p:nvPr/>
+        </p:nvSpPr>
+        <p:spPr>
+          <a:xfrm>
+            <a:off x="4669606" y="786543"/>
+            <a:ext cx="1780007" cy="756711"/>
+          </a:xfrm>
+          <a:prstGeom prst="ellipse">
+            <a:avLst/>
+          </a:prstGeom>
+        </p:spPr>
+        <p:style>
+          <a:lnRef idx="0">
+            <a:schemeClr val="accent2"/>
+          </a:lnRef>
+          <a:fillRef idx="3">
+            <a:schemeClr val="accent2"/>
+          </a:fillRef>
+          <a:effectRef idx="3">
+            <a:schemeClr val="accent2"/>
+          </a:effectRef>
+          <a:fontRef idx="minor">
+            <a:schemeClr val="lt1"/>
+          </a:fontRef>
+        </p:style>
+        <p:txBody>
+          <a:bodyPr rtlCol="0" anchor="ctr"/>
+          <a:lstStyle/>
+          <a:p>
+            <a:pPr algn="ctr"/>
+            <a:r>
+              <a:rPr lang="es-ES" b="1" dirty="0"/>
+              <a:t>WindEventSimple</a:t>
+            </a:r>
+          </a:p>
+        </p:txBody>
+      </p:sp>
+      <p:sp>
+        <p:nvSpPr>
+          <p:cNvPr id="23" name="Elipse 22">
+            <a:extLst>
+              <a:ext uri="{FF2B5EF4-FFF2-40B4-BE49-F238E27FC236}">
+                <a16:creationId xmlns:a16="http://schemas.microsoft.com/office/drawing/2014/main" id="{76160B29-C0BB-48F1-9FAF-9D794690E1A0}"/>
+              </a:ext>
+            </a:extLst>
+          </p:cNvPr>
+          <p:cNvSpPr/>
+          <p:nvPr/>
+        </p:nvSpPr>
+        <p:spPr>
+          <a:xfrm>
+            <a:off x="5571613" y="1673080"/>
+            <a:ext cx="1811803" cy="756711"/>
+          </a:xfrm>
+          <a:prstGeom prst="ellipse">
+            <a:avLst/>
+          </a:prstGeom>
+        </p:spPr>
+        <p:style>
+          <a:lnRef idx="0">
+            <a:schemeClr val="accent5"/>
+          </a:lnRef>
+          <a:fillRef idx="3">
+            <a:schemeClr val="accent5"/>
+          </a:fillRef>
+          <a:effectRef idx="3">
+            <a:schemeClr val="accent5"/>
+          </a:effectRef>
+          <a:fontRef idx="minor">
+            <a:schemeClr val="lt1"/>
+          </a:fontRef>
+        </p:style>
+        <p:txBody>
+          <a:bodyPr rtlCol="0" anchor="ctr"/>
+          <a:lstStyle/>
+          <a:p>
+            <a:pPr algn="ctr"/>
+            <a:r>
+              <a:rPr lang="es-ES" b="1" dirty="0"/>
+              <a:t>HomeEvent Simple</a:t>
+            </a:r>
+          </a:p>
+        </p:txBody>
+      </p:sp>
+      <p:cxnSp>
+        <p:nvCxnSpPr>
+          <p:cNvPr id="21" name="Conector recto de flecha 20">
+            <a:extLst>
+              <a:ext uri="{FF2B5EF4-FFF2-40B4-BE49-F238E27FC236}">
+                <a16:creationId xmlns:a16="http://schemas.microsoft.com/office/drawing/2014/main" id="{4B816C98-4B67-41C4-AAB6-10A1874FF508}"/>
+              </a:ext>
+            </a:extLst>
+          </p:cNvPr>
+          <p:cNvCxnSpPr>
+            <a:cxnSpLocks/>
+          </p:cNvCxnSpPr>
+          <p:nvPr/>
+        </p:nvCxnSpPr>
+        <p:spPr>
+          <a:xfrm flipV="1">
+            <a:off x="6733735" y="1164898"/>
+            <a:ext cx="1758803" cy="1"/>
+          </a:xfrm>
+          <a:prstGeom prst="straightConnector1">
+            <a:avLst/>
+          </a:prstGeom>
+          <a:ln w="76200">
+            <a:solidFill>
+              <a:srgbClr val="F87910"/>
+            </a:solidFill>
+            <a:tailEnd type="triangle"/>
+          </a:ln>
+        </p:spPr>
+        <p:style>
+          <a:lnRef idx="1">
+            <a:schemeClr val="accent1"/>
+          </a:lnRef>
+          <a:fillRef idx="0">
+            <a:schemeClr val="accent1"/>
+          </a:fillRef>
+          <a:effectRef idx="0">
+            <a:schemeClr val="accent1"/>
+          </a:effectRef>
+          <a:fontRef idx="minor">
+            <a:schemeClr val="tx1"/>
+          </a:fontRef>
+        </p:style>
+      </p:cxnSp>
+      <p:cxnSp>
+        <p:nvCxnSpPr>
+          <p:cNvPr id="31" name="Conector recto de flecha 30">
+            <a:extLst>
+              <a:ext uri="{FF2B5EF4-FFF2-40B4-BE49-F238E27FC236}">
+                <a16:creationId xmlns:a16="http://schemas.microsoft.com/office/drawing/2014/main" id="{1B4FDD39-CB15-491B-8904-2912B2D23874}"/>
+              </a:ext>
+            </a:extLst>
+          </p:cNvPr>
+          <p:cNvCxnSpPr>
+            <a:cxnSpLocks/>
+          </p:cNvCxnSpPr>
+          <p:nvPr/>
+        </p:nvCxnSpPr>
+        <p:spPr>
+          <a:xfrm flipV="1">
+            <a:off x="5118265" y="1552952"/>
+            <a:ext cx="0" cy="1514938"/>
+          </a:xfrm>
+          <a:prstGeom prst="straightConnector1">
+            <a:avLst/>
+          </a:prstGeom>
+          <a:ln w="76200">
+            <a:solidFill>
+              <a:srgbClr val="F87910"/>
+            </a:solidFill>
+            <a:tailEnd type="triangle"/>
+          </a:ln>
+        </p:spPr>
+        <p:style>
+          <a:lnRef idx="1">
+            <a:schemeClr val="accent1"/>
+          </a:lnRef>
+          <a:fillRef idx="0">
+            <a:schemeClr val="accent1"/>
+          </a:fillRef>
+          <a:effectRef idx="0">
+            <a:schemeClr val="accent1"/>
+          </a:effectRef>
+          <a:fontRef idx="minor">
+            <a:schemeClr val="tx1"/>
+          </a:fontRef>
+        </p:style>
+      </p:cxnSp>
+      <p:cxnSp>
+        <p:nvCxnSpPr>
+          <p:cNvPr id="34" name="Conector recto de flecha 33">
+            <a:extLst>
+              <a:ext uri="{FF2B5EF4-FFF2-40B4-BE49-F238E27FC236}">
+                <a16:creationId xmlns:a16="http://schemas.microsoft.com/office/drawing/2014/main" id="{C46AD5A4-F2B7-4739-9C9A-C7290680B3D7}"/>
+              </a:ext>
+            </a:extLst>
+          </p:cNvPr>
+          <p:cNvCxnSpPr>
+            <a:cxnSpLocks/>
+          </p:cNvCxnSpPr>
+          <p:nvPr/>
+        </p:nvCxnSpPr>
+        <p:spPr>
+          <a:xfrm flipV="1">
+            <a:off x="7456164" y="2051435"/>
+            <a:ext cx="1036374" cy="5161"/>
+          </a:xfrm>
+          <a:prstGeom prst="straightConnector1">
+            <a:avLst/>
+          </a:prstGeom>
+          <a:ln w="76200">
+            <a:tailEnd type="triangle"/>
+          </a:ln>
+        </p:spPr>
+        <p:style>
+          <a:lnRef idx="1">
+            <a:schemeClr val="accent1"/>
+          </a:lnRef>
+          <a:fillRef idx="0">
+            <a:schemeClr val="accent1"/>
+          </a:fillRef>
+          <a:effectRef idx="0">
+            <a:schemeClr val="accent1"/>
+          </a:effectRef>
+          <a:fontRef idx="minor">
+            <a:schemeClr val="tx1"/>
+          </a:fontRef>
+        </p:style>
+      </p:cxnSp>
+      <p:cxnSp>
+        <p:nvCxnSpPr>
+          <p:cNvPr id="35" name="Conector recto de flecha 34">
+            <a:extLst>
+              <a:ext uri="{FF2B5EF4-FFF2-40B4-BE49-F238E27FC236}">
+                <a16:creationId xmlns:a16="http://schemas.microsoft.com/office/drawing/2014/main" id="{124090BF-F392-4F9C-A0F3-ACF64AB69007}"/>
+              </a:ext>
+            </a:extLst>
+          </p:cNvPr>
+          <p:cNvCxnSpPr>
+            <a:cxnSpLocks/>
+          </p:cNvCxnSpPr>
+          <p:nvPr/>
+        </p:nvCxnSpPr>
+        <p:spPr>
+          <a:xfrm flipV="1">
+            <a:off x="6508468" y="2522451"/>
+            <a:ext cx="0" cy="545029"/>
+          </a:xfrm>
+          <a:prstGeom prst="straightConnector1">
+            <a:avLst/>
+          </a:prstGeom>
+          <a:ln w="76200">
+            <a:tailEnd type="triangle"/>
+          </a:ln>
+        </p:spPr>
+        <p:style>
+          <a:lnRef idx="1">
+            <a:schemeClr val="accent1"/>
+          </a:lnRef>
+          <a:fillRef idx="0">
+            <a:schemeClr val="accent1"/>
+          </a:fillRef>
+          <a:effectRef idx="0">
+            <a:schemeClr val="accent1"/>
+          </a:effectRef>
+          <a:fontRef idx="minor">
+            <a:schemeClr val="tx1"/>
+          </a:fontRef>
+        </p:style>
+      </p:cxnSp>
+      <p:sp>
+        <p:nvSpPr>
+          <p:cNvPr id="41" name="Elipse 40">
+            <a:extLst>
+              <a:ext uri="{FF2B5EF4-FFF2-40B4-BE49-F238E27FC236}">
+                <a16:creationId xmlns:a16="http://schemas.microsoft.com/office/drawing/2014/main" id="{BE96B2F9-EB4B-44C2-9264-1C792F8AAD73}"/>
+              </a:ext>
+            </a:extLst>
+          </p:cNvPr>
+          <p:cNvSpPr/>
+          <p:nvPr/>
+        </p:nvSpPr>
+        <p:spPr>
+          <a:xfrm>
+            <a:off x="8324169" y="3047931"/>
+            <a:ext cx="1780007" cy="756711"/>
+          </a:xfrm>
+          <a:prstGeom prst="ellipse">
+            <a:avLst/>
+          </a:prstGeom>
+        </p:spPr>
+        <p:style>
+          <a:lnRef idx="0">
+            <a:schemeClr val="accent2"/>
+          </a:lnRef>
+          <a:fillRef idx="3">
+            <a:schemeClr val="accent2"/>
+          </a:fillRef>
+          <a:effectRef idx="3">
+            <a:schemeClr val="accent2"/>
+          </a:effectRef>
+          <a:fontRef idx="minor">
+            <a:schemeClr val="lt1"/>
+          </a:fontRef>
+        </p:style>
+        <p:txBody>
+          <a:bodyPr rtlCol="0" anchor="ctr"/>
+          <a:lstStyle/>
+          <a:p>
+            <a:pPr algn="ctr"/>
+            <a:r>
+              <a:rPr lang="es-ES" b="1" dirty="0"/>
+              <a:t>WindEvent Complex</a:t>
+            </a:r>
+          </a:p>
+        </p:txBody>
+      </p:sp>
+      <p:sp>
+        <p:nvSpPr>
+          <p:cNvPr id="42" name="Elipse 41">
+            <a:extLst>
+              <a:ext uri="{FF2B5EF4-FFF2-40B4-BE49-F238E27FC236}">
+                <a16:creationId xmlns:a16="http://schemas.microsoft.com/office/drawing/2014/main" id="{372B43FA-C8BB-499E-AE12-594FEADF21D4}"/>
+              </a:ext>
+            </a:extLst>
+          </p:cNvPr>
+          <p:cNvSpPr/>
+          <p:nvPr/>
+        </p:nvSpPr>
+        <p:spPr>
+          <a:xfrm>
+            <a:off x="9226176" y="3934468"/>
+            <a:ext cx="1811803" cy="756711"/>
+          </a:xfrm>
+          <a:prstGeom prst="ellipse">
+            <a:avLst/>
+          </a:prstGeom>
+        </p:spPr>
+        <p:style>
+          <a:lnRef idx="0">
+            <a:schemeClr val="accent5"/>
+          </a:lnRef>
+          <a:fillRef idx="3">
+            <a:schemeClr val="accent5"/>
+          </a:fillRef>
+          <a:effectRef idx="3">
+            <a:schemeClr val="accent5"/>
+          </a:effectRef>
+          <a:fontRef idx="minor">
+            <a:schemeClr val="lt1"/>
+          </a:fontRef>
+        </p:style>
+        <p:txBody>
+          <a:bodyPr rtlCol="0" anchor="ctr"/>
+          <a:lstStyle/>
+          <a:p>
+            <a:pPr algn="ctr"/>
+            <a:r>
+              <a:rPr lang="es-ES" b="1" dirty="0"/>
+              <a:t>HomeEvent Complex</a:t>
+            </a:r>
+          </a:p>
+        </p:txBody>
+      </p:sp>
+      <p:cxnSp>
+        <p:nvCxnSpPr>
+          <p:cNvPr id="43" name="Conector recto de flecha 42">
+            <a:extLst>
+              <a:ext uri="{FF2B5EF4-FFF2-40B4-BE49-F238E27FC236}">
+                <a16:creationId xmlns:a16="http://schemas.microsoft.com/office/drawing/2014/main" id="{D6CE1406-9237-4138-A601-BF4127715FDA}"/>
+              </a:ext>
+            </a:extLst>
+          </p:cNvPr>
+          <p:cNvCxnSpPr>
+            <a:cxnSpLocks/>
+            <a:endCxn id="41" idx="0"/>
+          </p:cNvCxnSpPr>
+          <p:nvPr/>
+        </p:nvCxnSpPr>
+        <p:spPr>
+          <a:xfrm flipH="1">
+            <a:off x="9214173" y="2429791"/>
+            <a:ext cx="179210" cy="618140"/>
+          </a:xfrm>
+          <a:prstGeom prst="straightConnector1">
+            <a:avLst/>
+          </a:prstGeom>
+          <a:ln w="76200">
+            <a:solidFill>
+              <a:srgbClr val="F87910"/>
+            </a:solidFill>
+            <a:tailEnd type="triangle"/>
+          </a:ln>
+        </p:spPr>
+        <p:style>
+          <a:lnRef idx="1">
+            <a:schemeClr val="accent1"/>
+          </a:lnRef>
+          <a:fillRef idx="0">
+            <a:schemeClr val="accent1"/>
+          </a:fillRef>
+          <a:effectRef idx="0">
+            <a:schemeClr val="accent1"/>
+          </a:effectRef>
+          <a:fontRef idx="minor">
+            <a:schemeClr val="tx1"/>
+          </a:fontRef>
+        </p:style>
+      </p:cxnSp>
+      <p:cxnSp>
+        <p:nvCxnSpPr>
+          <p:cNvPr id="46" name="Conector recto de flecha 45">
+            <a:extLst>
+              <a:ext uri="{FF2B5EF4-FFF2-40B4-BE49-F238E27FC236}">
+                <a16:creationId xmlns:a16="http://schemas.microsoft.com/office/drawing/2014/main" id="{4200DA75-1CB7-4056-996A-ABD0F7EA9C16}"/>
+              </a:ext>
+            </a:extLst>
+          </p:cNvPr>
+          <p:cNvCxnSpPr>
+            <a:cxnSpLocks/>
+            <a:stCxn id="41" idx="2"/>
+          </p:cNvCxnSpPr>
+          <p:nvPr/>
+        </p:nvCxnSpPr>
+        <p:spPr>
+          <a:xfrm flipH="1">
+            <a:off x="7925669" y="3426287"/>
+            <a:ext cx="398500" cy="100472"/>
+          </a:xfrm>
+          <a:prstGeom prst="straightConnector1">
+            <a:avLst/>
+          </a:prstGeom>
+          <a:ln w="76200">
+            <a:solidFill>
+              <a:srgbClr val="F87910"/>
+            </a:solidFill>
+            <a:tailEnd type="triangle"/>
+          </a:ln>
+        </p:spPr>
+        <p:style>
+          <a:lnRef idx="1">
+            <a:schemeClr val="accent1"/>
+          </a:lnRef>
+          <a:fillRef idx="0">
+            <a:schemeClr val="accent1"/>
+          </a:fillRef>
+          <a:effectRef idx="0">
+            <a:schemeClr val="accent1"/>
+          </a:effectRef>
+          <a:fontRef idx="minor">
+            <a:schemeClr val="tx1"/>
+          </a:fontRef>
+        </p:style>
+      </p:cxnSp>
+      <p:cxnSp>
+        <p:nvCxnSpPr>
+          <p:cNvPr id="49" name="Conector recto de flecha 48">
+            <a:extLst>
+              <a:ext uri="{FF2B5EF4-FFF2-40B4-BE49-F238E27FC236}">
+                <a16:creationId xmlns:a16="http://schemas.microsoft.com/office/drawing/2014/main" id="{397349CE-3502-4E6D-9761-C4476AE4DAAC}"/>
+              </a:ext>
+            </a:extLst>
+          </p:cNvPr>
+          <p:cNvCxnSpPr>
+            <a:cxnSpLocks/>
+            <a:endCxn id="42" idx="0"/>
+          </p:cNvCxnSpPr>
+          <p:nvPr/>
+        </p:nvCxnSpPr>
+        <p:spPr>
+          <a:xfrm flipH="1">
+            <a:off x="10132078" y="2418134"/>
+            <a:ext cx="448096" cy="1516334"/>
+          </a:xfrm>
+          <a:prstGeom prst="straightConnector1">
+            <a:avLst/>
+          </a:prstGeom>
+          <a:ln w="76200">
+            <a:tailEnd type="triangle"/>
+          </a:ln>
+        </p:spPr>
+        <p:style>
+          <a:lnRef idx="1">
+            <a:schemeClr val="accent1"/>
+          </a:lnRef>
+          <a:fillRef idx="0">
+            <a:schemeClr val="accent1"/>
+          </a:fillRef>
+          <a:effectRef idx="0">
+            <a:schemeClr val="accent1"/>
+          </a:effectRef>
+          <a:fontRef idx="minor">
+            <a:schemeClr val="tx1"/>
+          </a:fontRef>
+        </p:style>
+      </p:cxnSp>
+      <p:cxnSp>
+        <p:nvCxnSpPr>
+          <p:cNvPr id="52" name="Conector recto de flecha 51">
+            <a:extLst>
+              <a:ext uri="{FF2B5EF4-FFF2-40B4-BE49-F238E27FC236}">
+                <a16:creationId xmlns:a16="http://schemas.microsoft.com/office/drawing/2014/main" id="{DEB5C780-141F-47FD-828D-E1C141CE33A4}"/>
+              </a:ext>
+            </a:extLst>
+          </p:cNvPr>
+          <p:cNvCxnSpPr>
+            <a:cxnSpLocks/>
+            <a:stCxn id="42" idx="2"/>
+          </p:cNvCxnSpPr>
+          <p:nvPr/>
+        </p:nvCxnSpPr>
+        <p:spPr>
+          <a:xfrm flipH="1" flipV="1">
+            <a:off x="7935706" y="4181012"/>
+            <a:ext cx="1290470" cy="131812"/>
+          </a:xfrm>
+          <a:prstGeom prst="straightConnector1">
+            <a:avLst/>
+          </a:prstGeom>
+          <a:ln w="76200">
+            <a:tailEnd type="triangle"/>
+          </a:ln>
+        </p:spPr>
+        <p:style>
+          <a:lnRef idx="1">
+            <a:schemeClr val="accent1"/>
+          </a:lnRef>
+          <a:fillRef idx="0">
+            <a:schemeClr val="accent1"/>
+          </a:fillRef>
+          <a:effectRef idx="0">
+            <a:schemeClr val="accent1"/>
+          </a:effectRef>
+          <a:fontRef idx="minor">
+            <a:schemeClr val="tx1"/>
+          </a:fontRef>
+        </p:style>
+      </p:cxnSp>
+      <p:pic>
+        <p:nvPicPr>
+          <p:cNvPr id="55" name="Picture 4" descr="Resultado de imagen de usuario">
+            <a:extLst>
+              <a:ext uri="{FF2B5EF4-FFF2-40B4-BE49-F238E27FC236}">
+                <a16:creationId xmlns:a16="http://schemas.microsoft.com/office/drawing/2014/main" id="{EB008434-7DF4-459C-B62F-15B27E290AF4}"/>
+              </a:ext>
+            </a:extLst>
+          </p:cNvPr>
+          <p:cNvPicPr>
+            <a:picLocks noChangeAspect="1" noChangeArrowheads="1"/>
+          </p:cNvPicPr>
+          <p:nvPr/>
+        </p:nvPicPr>
+        <p:blipFill>
+          <a:blip r:embed="rId7">
+            <a:extLst>
+              <a:ext uri="{BEBA8EAE-BF5A-486C-A8C5-ECC9F3942E4B}">
+                <a14:imgProps xmlns:a14="http://schemas.microsoft.com/office/drawing/2010/main">
+                  <a14:imgLayer r:embed="rId8">
+                    <a14:imgEffect>
+                      <a14:sharpenSoften amount="-50000"/>
+                    </a14:imgEffect>
+                    <a14:imgEffect>
+                      <a14:saturation sat="33000"/>
+                    </a14:imgEffect>
+                    <a14:imgEffect>
+                      <a14:brightnessContrast bright="20000" contrast="20000"/>
+                    </a14:imgEffect>
+                  </a14:imgLayer>
+                </a14:imgProps>
+              </a:ext>
+              <a:ext uri="{28A0092B-C50C-407E-A947-70E740481C1C}">
+                <a14:useLocalDpi xmlns:a14="http://schemas.microsoft.com/office/drawing/2010/main" val="0"/>
+              </a:ext>
+            </a:extLst>
+          </a:blip>
+          <a:srcRect/>
+          <a:stretch>
+            <a:fillRect/>
+          </a:stretch>
+        </p:blipFill>
+        <p:spPr bwMode="auto">
+          <a:xfrm>
+            <a:off x="5384768" y="4904368"/>
+            <a:ext cx="1545818" cy="1545818"/>
+          </a:xfrm>
+          <a:prstGeom prst="rect">
+            <a:avLst/>
+          </a:prstGeom>
+          <a:noFill/>
+          <a:extLst>
+            <a:ext uri="{909E8E84-426E-40DD-AFC4-6F175D3DCCD1}">
+              <a14:hiddenFill xmlns:a14="http://schemas.microsoft.com/office/drawing/2010/main">
+                <a:solidFill>
+                  <a:srgbClr val="FFFFFF"/>
+                </a:solidFill>
+              </a14:hiddenFill>
+            </a:ext>
+          </a:extLst>
+        </p:spPr>
+      </p:pic>
+      <p:sp>
+        <p:nvSpPr>
+          <p:cNvPr id="56" name="CuadroTexto 55">
+            <a:extLst>
+              <a:ext uri="{FF2B5EF4-FFF2-40B4-BE49-F238E27FC236}">
+                <a16:creationId xmlns:a16="http://schemas.microsoft.com/office/drawing/2014/main" id="{5ACF946F-470B-4D88-B77F-85F15A151473}"/>
+              </a:ext>
+            </a:extLst>
+          </p:cNvPr>
+          <p:cNvSpPr txBox="1"/>
+          <p:nvPr/>
+        </p:nvSpPr>
+        <p:spPr>
+          <a:xfrm>
+            <a:off x="4973246" y="6443051"/>
+            <a:ext cx="2639890" cy="369332"/>
+          </a:xfrm>
+          <a:prstGeom prst="rect">
+            <a:avLst/>
+          </a:prstGeom>
+          <a:noFill/>
+        </p:spPr>
+        <p:txBody>
+          <a:bodyPr wrap="none" rtlCol="0">
+            <a:spAutoFit/>
+          </a:bodyPr>
+          <a:lstStyle/>
+          <a:p>
+            <a:r>
+              <a:rPr lang="es-ES" b="1" dirty="0"/>
+              <a:t>Consumidores de eventos</a:t>
+            </a:r>
+          </a:p>
+        </p:txBody>
+      </p:sp>
+      <p:cxnSp>
+        <p:nvCxnSpPr>
+          <p:cNvPr id="57" name="Conector recto de flecha 56">
+            <a:extLst>
+              <a:ext uri="{FF2B5EF4-FFF2-40B4-BE49-F238E27FC236}">
+                <a16:creationId xmlns:a16="http://schemas.microsoft.com/office/drawing/2014/main" id="{373AB273-03E7-48FA-B8EA-55610DD8C0E0}"/>
+              </a:ext>
+            </a:extLst>
+          </p:cNvPr>
+          <p:cNvCxnSpPr>
+            <a:cxnSpLocks/>
+            <a:stCxn id="5" idx="2"/>
+            <a:endCxn id="55" idx="0"/>
+          </p:cNvCxnSpPr>
+          <p:nvPr/>
+        </p:nvCxnSpPr>
+        <p:spPr>
+          <a:xfrm flipH="1">
+            <a:off x="6157677" y="4489942"/>
+            <a:ext cx="1" cy="414426"/>
+          </a:xfrm>
+          <a:prstGeom prst="straightConnector1">
+            <a:avLst/>
+          </a:prstGeom>
+          <a:ln w="76200">
+            <a:solidFill>
+              <a:schemeClr val="tx1"/>
+            </a:solidFill>
+            <a:tailEnd type="triangle"/>
+          </a:ln>
+        </p:spPr>
+        <p:style>
+          <a:lnRef idx="1">
+            <a:schemeClr val="accent1"/>
+          </a:lnRef>
+          <a:fillRef idx="0">
+            <a:schemeClr val="accent1"/>
+          </a:fillRef>
+          <a:effectRef idx="0">
+            <a:schemeClr val="accent1"/>
+          </a:effectRef>
+          <a:fontRef idx="minor">
+            <a:schemeClr val="tx1"/>
+          </a:fontRef>
+        </p:style>
+      </p:cxnSp>
+      <p:sp>
+        <p:nvSpPr>
+          <p:cNvPr id="60" name="CuadroTexto 59">
+            <a:extLst>
+              <a:ext uri="{FF2B5EF4-FFF2-40B4-BE49-F238E27FC236}">
+                <a16:creationId xmlns:a16="http://schemas.microsoft.com/office/drawing/2014/main" id="{231FA9CD-C3A8-4922-9E09-1C02B8C64FD5}"/>
+              </a:ext>
+            </a:extLst>
+          </p:cNvPr>
+          <p:cNvSpPr txBox="1"/>
+          <p:nvPr/>
+        </p:nvSpPr>
+        <p:spPr>
+          <a:xfrm>
+            <a:off x="400488" y="706206"/>
+            <a:ext cx="2436051" cy="646331"/>
+          </a:xfrm>
+          <a:prstGeom prst="rect">
+            <a:avLst/>
+          </a:prstGeom>
+          <a:noFill/>
+        </p:spPr>
+        <p:txBody>
+          <a:bodyPr wrap="none" rtlCol="0">
+            <a:spAutoFit/>
+          </a:bodyPr>
+          <a:lstStyle/>
+          <a:p>
+            <a:pPr algn="ctr"/>
+            <a:r>
+              <a:rPr lang="es-ES" b="1" dirty="0"/>
+              <a:t>Productores de eventos</a:t>
+            </a:r>
+          </a:p>
+          <a:p>
+            <a:pPr algn="ctr"/>
+            <a:r>
+              <a:rPr lang="es-ES" b="1" u="sng" dirty="0">
+                <a:highlight>
+                  <a:srgbClr val="FFFF00"/>
+                </a:highlight>
+              </a:rPr>
+              <a:t>Sensores IoT</a:t>
+            </a:r>
+          </a:p>
+        </p:txBody>
+      </p:sp>
+    </p:spTree>
+    <p:extLst>
+      <p:ext uri="{BB962C8B-B14F-4D97-AF65-F5344CB8AC3E}">
+        <p14:creationId xmlns:p14="http://schemas.microsoft.com/office/powerpoint/2010/main" val="4091319668"/>
+      </p:ext>
+    </p:extLst>
+  </p:cSld>
+  <p:clrMapOvr>
+    <a:masterClrMapping/>
+  </p:clrMapOvr>
+</p:sld>
+</file>
+
+<file path=ppt/slides/slide7.xml><?xml version="1.0" encoding="utf-8"?>
+<p:sld xmlns:a="http://schemas.openxmlformats.org/drawingml/2006/main" xmlns:r="http://schemas.openxmlformats.org/officeDocument/2006/relationships" xmlns:p="http://schemas.openxmlformats.org/presentationml/2006/main">
+  <p:cSld>
+    <p:spTree>
+      <p:nvGrpSpPr>
+        <p:cNvPr id="1" name=""/>
+        <p:cNvGrpSpPr/>
+        <p:nvPr/>
+      </p:nvGrpSpPr>
+      <p:grpSpPr>
+        <a:xfrm>
+          <a:off x="0" y="0"/>
+          <a:ext cx="0" cy="0"/>
+          <a:chOff x="0" y="0"/>
+          <a:chExt cx="0" cy="0"/>
+        </a:xfrm>
+      </p:grpSpPr>
+      <p:pic>
+        <p:nvPicPr>
+          <p:cNvPr id="4" name="Picture 8" descr="Resultado de imagen de ajustes">
+            <a:extLst>
+              <a:ext uri="{FF2B5EF4-FFF2-40B4-BE49-F238E27FC236}">
+                <a16:creationId xmlns:a16="http://schemas.microsoft.com/office/drawing/2014/main" id="{CA47E868-F659-492A-9BE6-AE7EB03F46D3}"/>
+              </a:ext>
+            </a:extLst>
+          </p:cNvPr>
+          <p:cNvPicPr>
+            <a:picLocks noChangeAspect="1" noChangeArrowheads="1"/>
+          </p:cNvPicPr>
+          <p:nvPr/>
+        </p:nvPicPr>
+        <p:blipFill>
+          <a:blip r:embed="rId2">
+            <a:extLst>
+              <a:ext uri="{28A0092B-C50C-407E-A947-70E740481C1C}">
+                <a14:useLocalDpi xmlns:a14="http://schemas.microsoft.com/office/drawing/2010/main" val="0"/>
+              </a:ext>
+            </a:extLst>
+          </a:blip>
+          <a:srcRect/>
+          <a:stretch>
+            <a:fillRect/>
+          </a:stretch>
+        </p:blipFill>
+        <p:spPr bwMode="auto">
+          <a:xfrm>
+            <a:off x="4892633" y="1499249"/>
+            <a:ext cx="1801920" cy="1801920"/>
+          </a:xfrm>
+          <a:prstGeom prst="rect">
+            <a:avLst/>
+          </a:prstGeom>
+          <a:noFill/>
+          <a:extLst>
+            <a:ext uri="{909E8E84-426E-40DD-AFC4-6F175D3DCCD1}">
+              <a14:hiddenFill xmlns:a14="http://schemas.microsoft.com/office/drawing/2010/main">
+                <a:solidFill>
+                  <a:srgbClr val="FFFFFF"/>
+                </a:solidFill>
+              </a14:hiddenFill>
+            </a:ext>
+          </a:extLst>
+        </p:spPr>
+      </p:pic>
+      <p:sp>
+        <p:nvSpPr>
+          <p:cNvPr id="5" name="Rectángulo: esquinas redondeadas 4">
+            <a:extLst>
+              <a:ext uri="{FF2B5EF4-FFF2-40B4-BE49-F238E27FC236}">
+                <a16:creationId xmlns:a16="http://schemas.microsoft.com/office/drawing/2014/main" id="{46E129DE-3BB0-4F4A-87E5-30961AD9A723}"/>
+              </a:ext>
+            </a:extLst>
+          </p:cNvPr>
+          <p:cNvSpPr/>
+          <p:nvPr/>
+        </p:nvSpPr>
+        <p:spPr>
+          <a:xfrm>
+            <a:off x="3305632" y="3284371"/>
+            <a:ext cx="5067785" cy="1626920"/>
+          </a:xfrm>
+          <a:prstGeom prst="roundRect">
+            <a:avLst/>
+          </a:prstGeom>
+        </p:spPr>
+        <p:style>
+          <a:lnRef idx="0">
+            <a:schemeClr val="accent4"/>
+          </a:lnRef>
+          <a:fillRef idx="3">
+            <a:schemeClr val="accent4"/>
+          </a:fillRef>
+          <a:effectRef idx="3">
+            <a:schemeClr val="accent4"/>
+          </a:effectRef>
+          <a:fontRef idx="minor">
+            <a:schemeClr val="lt1"/>
+          </a:fontRef>
+        </p:style>
+        <p:txBody>
+          <a:bodyPr rtlCol="0" anchor="ctr"/>
+          <a:lstStyle/>
+          <a:p>
+            <a:pPr algn="ctr"/>
+            <a:r>
+              <a:rPr lang="es-ES" b="1" dirty="0">
+                <a:solidFill>
+                  <a:schemeClr val="tx1"/>
+                </a:solidFill>
+              </a:rPr>
+              <a:t>Patrones desplegados</a:t>
+            </a:r>
+          </a:p>
+          <a:p>
+            <a:pPr algn="ctr"/>
+            <a:endParaRPr lang="es-ES" b="1" dirty="0"/>
+          </a:p>
+          <a:p>
+            <a:pPr algn="ctr"/>
+            <a:endParaRPr lang="es-ES" b="1" dirty="0"/>
+          </a:p>
+          <a:p>
+            <a:pPr algn="ctr"/>
+            <a:endParaRPr lang="es-ES" b="1" dirty="0"/>
+          </a:p>
+        </p:txBody>
+      </p:sp>
+      <p:sp>
+        <p:nvSpPr>
+          <p:cNvPr id="10" name="Triángulo isósceles 9">
+            <a:extLst>
+              <a:ext uri="{FF2B5EF4-FFF2-40B4-BE49-F238E27FC236}">
+                <a16:creationId xmlns:a16="http://schemas.microsoft.com/office/drawing/2014/main" id="{11103CCB-054D-42B7-836C-381A2C2FD37D}"/>
+              </a:ext>
+            </a:extLst>
+          </p:cNvPr>
+          <p:cNvSpPr/>
+          <p:nvPr/>
+        </p:nvSpPr>
+        <p:spPr>
+          <a:xfrm>
+            <a:off x="7582722" y="3973139"/>
+            <a:ext cx="425532" cy="330529"/>
+          </a:xfrm>
+          <a:prstGeom prst="triangle">
+            <a:avLst/>
+          </a:prstGeom>
+        </p:spPr>
+        <p:style>
+          <a:lnRef idx="0">
+            <a:schemeClr val="accent5"/>
+          </a:lnRef>
+          <a:fillRef idx="3">
+            <a:schemeClr val="accent5"/>
+          </a:fillRef>
+          <a:effectRef idx="3">
+            <a:schemeClr val="accent5"/>
+          </a:effectRef>
+          <a:fontRef idx="minor">
+            <a:schemeClr val="lt1"/>
+          </a:fontRef>
+        </p:style>
+        <p:txBody>
+          <a:bodyPr rot="0" spcFirstLastPara="0" vertOverflow="overflow" horzOverflow="overflow" vert="horz" wrap="square" lIns="91440" tIns="45720" rIns="91440" bIns="45720" numCol="1" spcCol="0" rtlCol="0" fromWordArt="0" anchor="ctr" anchorCtr="0" forceAA="0" compatLnSpc="1">
+            <a:prstTxWarp prst="textNoShape">
+              <a:avLst/>
+            </a:prstTxWarp>
+            <a:noAutofit/>
+          </a:bodyPr>
+          <a:lstStyle/>
+          <a:p>
+            <a:pPr algn="ctr"/>
+            <a:endParaRPr lang="es-ES"/>
+          </a:p>
+        </p:txBody>
+      </p:sp>
+      <p:sp>
+        <p:nvSpPr>
+          <p:cNvPr id="11" name="Elipse 10">
+            <a:extLst>
+              <a:ext uri="{FF2B5EF4-FFF2-40B4-BE49-F238E27FC236}">
+                <a16:creationId xmlns:a16="http://schemas.microsoft.com/office/drawing/2014/main" id="{6D26E260-A070-4D56-BB21-E3EEDA805D27}"/>
+              </a:ext>
+            </a:extLst>
+          </p:cNvPr>
+          <p:cNvSpPr/>
+          <p:nvPr/>
+        </p:nvSpPr>
+        <p:spPr>
+          <a:xfrm>
+            <a:off x="7036458" y="3999778"/>
+            <a:ext cx="425532" cy="330529"/>
+          </a:xfrm>
+          <a:prstGeom prst="ellipse">
+            <a:avLst/>
+          </a:prstGeom>
+        </p:spPr>
+        <p:style>
+          <a:lnRef idx="0">
+            <a:schemeClr val="accent6"/>
+          </a:lnRef>
+          <a:fillRef idx="3">
+            <a:schemeClr val="accent6"/>
+          </a:fillRef>
+          <a:effectRef idx="3">
+            <a:schemeClr val="accent6"/>
+          </a:effectRef>
+          <a:fontRef idx="minor">
+            <a:schemeClr val="lt1"/>
+          </a:fontRef>
+        </p:style>
+        <p:txBody>
+          <a:bodyPr rot="0" spcFirstLastPara="0" vertOverflow="overflow" horzOverflow="overflow" vert="horz" wrap="square" lIns="91440" tIns="45720" rIns="91440" bIns="45720" numCol="1" spcCol="0" rtlCol="0" fromWordArt="0" anchor="ctr" anchorCtr="0" forceAA="0" compatLnSpc="1">
+            <a:prstTxWarp prst="textNoShape">
+              <a:avLst/>
+            </a:prstTxWarp>
+            <a:noAutofit/>
+          </a:bodyPr>
+          <a:lstStyle/>
+          <a:p>
+            <a:pPr algn="ctr"/>
+            <a:endParaRPr lang="es-ES"/>
+          </a:p>
+        </p:txBody>
+      </p:sp>
+      <p:sp>
+        <p:nvSpPr>
+          <p:cNvPr id="12" name="Explosión: 8 puntos 11">
+            <a:extLst>
+              <a:ext uri="{FF2B5EF4-FFF2-40B4-BE49-F238E27FC236}">
+                <a16:creationId xmlns:a16="http://schemas.microsoft.com/office/drawing/2014/main" id="{74998C3C-66F7-4BE4-8A83-6A2B87E31D91}"/>
+              </a:ext>
+            </a:extLst>
+          </p:cNvPr>
+          <p:cNvSpPr/>
+          <p:nvPr/>
+        </p:nvSpPr>
+        <p:spPr>
+          <a:xfrm>
+            <a:off x="6431806" y="3999777"/>
+            <a:ext cx="425532" cy="330529"/>
+          </a:xfrm>
+          <a:prstGeom prst="irregularSeal1">
+            <a:avLst/>
+          </a:prstGeom>
+          <a:ln/>
+        </p:spPr>
+        <p:style>
+          <a:lnRef idx="0">
+            <a:schemeClr val="accent2"/>
+          </a:lnRef>
+          <a:fillRef idx="3">
+            <a:schemeClr val="accent2"/>
+          </a:fillRef>
+          <a:effectRef idx="3">
+            <a:schemeClr val="accent2"/>
+          </a:effectRef>
+          <a:fontRef idx="minor">
+            <a:schemeClr val="lt1"/>
+          </a:fontRef>
+        </p:style>
+        <p:txBody>
+          <a:bodyPr rot="0" spcFirstLastPara="0" vertOverflow="overflow" horzOverflow="overflow" vert="horz" wrap="square" lIns="91440" tIns="45720" rIns="91440" bIns="45720" numCol="1" spcCol="0" rtlCol="0" fromWordArt="0" anchor="ctr" anchorCtr="0" forceAA="0" compatLnSpc="1">
+            <a:prstTxWarp prst="textNoShape">
+              <a:avLst/>
+            </a:prstTxWarp>
+            <a:noAutofit/>
+          </a:bodyPr>
+          <a:lstStyle/>
+          <a:p>
+            <a:pPr algn="ctr"/>
+            <a:endParaRPr lang="es-ES"/>
+          </a:p>
+        </p:txBody>
+      </p:sp>
+      <p:sp>
+        <p:nvSpPr>
+          <p:cNvPr id="13" name="Triángulo isósceles 12">
+            <a:extLst>
+              <a:ext uri="{FF2B5EF4-FFF2-40B4-BE49-F238E27FC236}">
+                <a16:creationId xmlns:a16="http://schemas.microsoft.com/office/drawing/2014/main" id="{8D11ECCD-1D8E-4687-834C-AE0EEB535A35}"/>
+              </a:ext>
+            </a:extLst>
+          </p:cNvPr>
+          <p:cNvSpPr/>
+          <p:nvPr/>
+        </p:nvSpPr>
+        <p:spPr>
+          <a:xfrm>
+            <a:off x="4830612" y="3973139"/>
+            <a:ext cx="425532" cy="330529"/>
+          </a:xfrm>
+          <a:prstGeom prst="triangle">
+            <a:avLst/>
+          </a:prstGeom>
+        </p:spPr>
+        <p:style>
+          <a:lnRef idx="0">
+            <a:schemeClr val="accent6"/>
+          </a:lnRef>
+          <a:fillRef idx="3">
+            <a:schemeClr val="accent6"/>
+          </a:fillRef>
+          <a:effectRef idx="3">
+            <a:schemeClr val="accent6"/>
+          </a:effectRef>
+          <a:fontRef idx="minor">
+            <a:schemeClr val="lt1"/>
+          </a:fontRef>
+        </p:style>
+        <p:txBody>
+          <a:bodyPr rtlCol="0" anchor="ctr"/>
+          <a:lstStyle/>
+          <a:p>
+            <a:pPr algn="ctr"/>
+            <a:endParaRPr lang="es-ES"/>
+          </a:p>
+        </p:txBody>
+      </p:sp>
+      <p:sp>
+        <p:nvSpPr>
+          <p:cNvPr id="14" name="Elipse 13">
+            <a:extLst>
+              <a:ext uri="{FF2B5EF4-FFF2-40B4-BE49-F238E27FC236}">
+                <a16:creationId xmlns:a16="http://schemas.microsoft.com/office/drawing/2014/main" id="{133CDE95-0BA4-45FE-8D8A-72C068D6D383}"/>
+              </a:ext>
+            </a:extLst>
+          </p:cNvPr>
+          <p:cNvSpPr/>
+          <p:nvPr/>
+        </p:nvSpPr>
+        <p:spPr>
+          <a:xfrm>
+            <a:off x="3679696" y="3973139"/>
+            <a:ext cx="425532" cy="330529"/>
+          </a:xfrm>
+          <a:prstGeom prst="ellipse">
+            <a:avLst/>
+          </a:prstGeom>
+          <a:ln/>
+        </p:spPr>
+        <p:style>
+          <a:lnRef idx="0">
+            <a:schemeClr val="accent2"/>
+          </a:lnRef>
+          <a:fillRef idx="3">
+            <a:schemeClr val="accent2"/>
+          </a:fillRef>
+          <a:effectRef idx="3">
+            <a:schemeClr val="accent2"/>
+          </a:effectRef>
+          <a:fontRef idx="minor">
+            <a:schemeClr val="lt1"/>
+          </a:fontRef>
+        </p:style>
+        <p:txBody>
+          <a:bodyPr rtlCol="0" anchor="ctr"/>
+          <a:lstStyle/>
+          <a:p>
+            <a:pPr algn="ctr"/>
+            <a:endParaRPr lang="es-ES"/>
+          </a:p>
+        </p:txBody>
+      </p:sp>
+      <p:sp>
+        <p:nvSpPr>
+          <p:cNvPr id="15" name="Explosión: 8 puntos 14">
+            <a:extLst>
+              <a:ext uri="{FF2B5EF4-FFF2-40B4-BE49-F238E27FC236}">
+                <a16:creationId xmlns:a16="http://schemas.microsoft.com/office/drawing/2014/main" id="{8298FFEB-A195-433A-B431-538702557DFF}"/>
+              </a:ext>
+            </a:extLst>
+          </p:cNvPr>
+          <p:cNvSpPr/>
+          <p:nvPr/>
+        </p:nvSpPr>
+        <p:spPr>
+          <a:xfrm>
+            <a:off x="4252682" y="3973139"/>
+            <a:ext cx="425532" cy="330529"/>
+          </a:xfrm>
+          <a:prstGeom prst="irregularSeal1">
+            <a:avLst/>
+          </a:prstGeom>
+        </p:spPr>
+        <p:style>
+          <a:lnRef idx="0">
+            <a:schemeClr val="accent5"/>
+          </a:lnRef>
+          <a:fillRef idx="3">
+            <a:schemeClr val="accent5"/>
+          </a:fillRef>
+          <a:effectRef idx="3">
+            <a:schemeClr val="accent5"/>
+          </a:effectRef>
+          <a:fontRef idx="minor">
+            <a:schemeClr val="lt1"/>
+          </a:fontRef>
+        </p:style>
+        <p:txBody>
+          <a:bodyPr rtlCol="0" anchor="ctr"/>
+          <a:lstStyle/>
+          <a:p>
+            <a:pPr algn="ctr"/>
+            <a:endParaRPr lang="es-ES" dirty="0"/>
+          </a:p>
+        </p:txBody>
+      </p:sp>
+      <p:sp>
+        <p:nvSpPr>
+          <p:cNvPr id="16" name="Triángulo isósceles 15">
+            <a:extLst>
+              <a:ext uri="{FF2B5EF4-FFF2-40B4-BE49-F238E27FC236}">
+                <a16:creationId xmlns:a16="http://schemas.microsoft.com/office/drawing/2014/main" id="{AAFAA58C-3749-4BEA-A311-A72CE08354B3}"/>
+              </a:ext>
+            </a:extLst>
+          </p:cNvPr>
+          <p:cNvSpPr/>
+          <p:nvPr/>
+        </p:nvSpPr>
+        <p:spPr>
+          <a:xfrm>
+            <a:off x="1789719" y="2273131"/>
+            <a:ext cx="425532" cy="330529"/>
+          </a:xfrm>
+          <a:prstGeom prst="triangle">
+            <a:avLst/>
+          </a:prstGeom>
+        </p:spPr>
+        <p:style>
+          <a:lnRef idx="0">
+            <a:schemeClr val="accent4"/>
+          </a:lnRef>
+          <a:fillRef idx="3">
+            <a:schemeClr val="accent4"/>
+          </a:fillRef>
+          <a:effectRef idx="3">
+            <a:schemeClr val="accent4"/>
+          </a:effectRef>
+          <a:fontRef idx="minor">
+            <a:schemeClr val="lt1"/>
+          </a:fontRef>
+        </p:style>
+        <p:txBody>
+          <a:bodyPr rtlCol="0" anchor="ctr"/>
+          <a:lstStyle/>
+          <a:p>
+            <a:pPr algn="ctr"/>
+            <a:endParaRPr lang="es-ES"/>
+          </a:p>
+        </p:txBody>
+      </p:sp>
+      <p:sp>
+        <p:nvSpPr>
+          <p:cNvPr id="17" name="Elipse 16">
+            <a:extLst>
+              <a:ext uri="{FF2B5EF4-FFF2-40B4-BE49-F238E27FC236}">
+                <a16:creationId xmlns:a16="http://schemas.microsoft.com/office/drawing/2014/main" id="{93FA5822-6EE4-47EF-BB1E-C81851128561}"/>
+              </a:ext>
+            </a:extLst>
+          </p:cNvPr>
+          <p:cNvSpPr/>
+          <p:nvPr/>
+        </p:nvSpPr>
+        <p:spPr>
+          <a:xfrm>
+            <a:off x="1116794" y="2317660"/>
+            <a:ext cx="425532" cy="330529"/>
+          </a:xfrm>
+          <a:prstGeom prst="ellipse">
+            <a:avLst/>
+          </a:prstGeom>
+          <a:ln/>
+        </p:spPr>
+        <p:style>
+          <a:lnRef idx="0">
+            <a:schemeClr val="accent1"/>
+          </a:lnRef>
+          <a:fillRef idx="3">
+            <a:schemeClr val="accent1"/>
+          </a:fillRef>
+          <a:effectRef idx="3">
+            <a:schemeClr val="accent1"/>
+          </a:effectRef>
+          <a:fontRef idx="minor">
+            <a:schemeClr val="lt1"/>
+          </a:fontRef>
+        </p:style>
+        <p:txBody>
+          <a:bodyPr rtlCol="0" anchor="ctr"/>
+          <a:lstStyle/>
+          <a:p>
+            <a:pPr algn="ctr"/>
+            <a:endParaRPr lang="es-ES"/>
+          </a:p>
+        </p:txBody>
+      </p:sp>
+      <p:sp>
+        <p:nvSpPr>
+          <p:cNvPr id="18" name="Explosión: 8 puntos 17">
+            <a:extLst>
+              <a:ext uri="{FF2B5EF4-FFF2-40B4-BE49-F238E27FC236}">
+                <a16:creationId xmlns:a16="http://schemas.microsoft.com/office/drawing/2014/main" id="{1074CFB1-4A2A-479D-938C-A76DAB9D30B0}"/>
+              </a:ext>
+            </a:extLst>
+          </p:cNvPr>
+          <p:cNvSpPr/>
+          <p:nvPr/>
+        </p:nvSpPr>
+        <p:spPr>
+          <a:xfrm>
+            <a:off x="4201390" y="2301831"/>
+            <a:ext cx="425532" cy="330529"/>
+          </a:xfrm>
+          <a:prstGeom prst="irregularSeal1">
+            <a:avLst/>
+          </a:prstGeom>
+        </p:spPr>
+        <p:style>
+          <a:lnRef idx="0">
+            <a:schemeClr val="accent2"/>
+          </a:lnRef>
+          <a:fillRef idx="3">
+            <a:schemeClr val="accent2"/>
+          </a:fillRef>
+          <a:effectRef idx="3">
+            <a:schemeClr val="accent2"/>
+          </a:effectRef>
+          <a:fontRef idx="minor">
+            <a:schemeClr val="lt1"/>
+          </a:fontRef>
+        </p:style>
+        <p:txBody>
+          <a:bodyPr rtlCol="0" anchor="ctr"/>
+          <a:lstStyle/>
+          <a:p>
+            <a:pPr algn="ctr"/>
+            <a:endParaRPr lang="es-ES" dirty="0"/>
+          </a:p>
+        </p:txBody>
+      </p:sp>
+      <p:sp>
+        <p:nvSpPr>
+          <p:cNvPr id="19" name="Triángulo isósceles 18">
+            <a:extLst>
+              <a:ext uri="{FF2B5EF4-FFF2-40B4-BE49-F238E27FC236}">
+                <a16:creationId xmlns:a16="http://schemas.microsoft.com/office/drawing/2014/main" id="{E08B573B-1CFD-486A-B3D3-C4755CD175B6}"/>
+              </a:ext>
+            </a:extLst>
+          </p:cNvPr>
+          <p:cNvSpPr/>
+          <p:nvPr/>
+        </p:nvSpPr>
+        <p:spPr>
+          <a:xfrm>
+            <a:off x="3619996" y="2273132"/>
+            <a:ext cx="425532" cy="330529"/>
+          </a:xfrm>
+          <a:prstGeom prst="triangle">
+            <a:avLst/>
+          </a:prstGeom>
+        </p:spPr>
+        <p:style>
+          <a:lnRef idx="0">
+            <a:schemeClr val="accent6"/>
+          </a:lnRef>
+          <a:fillRef idx="3">
+            <a:schemeClr val="accent6"/>
+          </a:fillRef>
+          <a:effectRef idx="3">
+            <a:schemeClr val="accent6"/>
+          </a:effectRef>
+          <a:fontRef idx="minor">
+            <a:schemeClr val="lt1"/>
+          </a:fontRef>
+        </p:style>
+        <p:txBody>
+          <a:bodyPr rtlCol="0" anchor="ctr"/>
+          <a:lstStyle/>
+          <a:p>
+            <a:pPr algn="ctr"/>
+            <a:endParaRPr lang="es-ES"/>
+          </a:p>
+        </p:txBody>
+      </p:sp>
+      <p:sp>
+        <p:nvSpPr>
+          <p:cNvPr id="20" name="Elipse 19">
+            <a:extLst>
+              <a:ext uri="{FF2B5EF4-FFF2-40B4-BE49-F238E27FC236}">
+                <a16:creationId xmlns:a16="http://schemas.microsoft.com/office/drawing/2014/main" id="{9A01A3E7-8826-4E86-8867-C5E70B910518}"/>
+              </a:ext>
+            </a:extLst>
+          </p:cNvPr>
+          <p:cNvSpPr/>
+          <p:nvPr/>
+        </p:nvSpPr>
+        <p:spPr>
+          <a:xfrm>
+            <a:off x="2424555" y="2301831"/>
+            <a:ext cx="425532" cy="330529"/>
+          </a:xfrm>
+          <a:prstGeom prst="ellipse">
+            <a:avLst/>
+          </a:prstGeom>
+          <a:ln/>
+        </p:spPr>
+        <p:style>
+          <a:lnRef idx="0">
+            <a:schemeClr val="accent2"/>
+          </a:lnRef>
+          <a:fillRef idx="3">
+            <a:schemeClr val="accent2"/>
+          </a:fillRef>
+          <a:effectRef idx="3">
+            <a:schemeClr val="accent2"/>
+          </a:effectRef>
+          <a:fontRef idx="minor">
+            <a:schemeClr val="lt1"/>
+          </a:fontRef>
+        </p:style>
+        <p:txBody>
+          <a:bodyPr rtlCol="0" anchor="ctr"/>
+          <a:lstStyle/>
+          <a:p>
+            <a:pPr algn="ctr"/>
+            <a:endParaRPr lang="es-ES"/>
+          </a:p>
+        </p:txBody>
+      </p:sp>
+      <p:sp>
+        <p:nvSpPr>
+          <p:cNvPr id="21" name="Explosión: 8 puntos 20">
+            <a:extLst>
+              <a:ext uri="{FF2B5EF4-FFF2-40B4-BE49-F238E27FC236}">
+                <a16:creationId xmlns:a16="http://schemas.microsoft.com/office/drawing/2014/main" id="{E5455963-EA24-4614-919B-6972CB2ED5AE}"/>
+              </a:ext>
+            </a:extLst>
+          </p:cNvPr>
+          <p:cNvSpPr/>
+          <p:nvPr/>
+        </p:nvSpPr>
+        <p:spPr>
+          <a:xfrm>
+            <a:off x="3033167" y="2320633"/>
+            <a:ext cx="425532" cy="330529"/>
+          </a:xfrm>
+          <a:prstGeom prst="irregularSeal1">
+            <a:avLst/>
+          </a:prstGeom>
+        </p:spPr>
+        <p:style>
+          <a:lnRef idx="0">
+            <a:schemeClr val="accent5"/>
+          </a:lnRef>
+          <a:fillRef idx="3">
+            <a:schemeClr val="accent5"/>
+          </a:fillRef>
+          <a:effectRef idx="3">
+            <a:schemeClr val="accent5"/>
+          </a:effectRef>
+          <a:fontRef idx="minor">
+            <a:schemeClr val="lt1"/>
+          </a:fontRef>
+        </p:style>
+        <p:txBody>
+          <a:bodyPr rtlCol="0" anchor="ctr"/>
+          <a:lstStyle/>
+          <a:p>
+            <a:pPr algn="ctr"/>
+            <a:endParaRPr lang="es-ES" dirty="0"/>
+          </a:p>
+        </p:txBody>
+      </p:sp>
+      <p:sp>
+        <p:nvSpPr>
+          <p:cNvPr id="22" name="CuadroTexto 21">
+            <a:extLst>
+              <a:ext uri="{FF2B5EF4-FFF2-40B4-BE49-F238E27FC236}">
+                <a16:creationId xmlns:a16="http://schemas.microsoft.com/office/drawing/2014/main" id="{7B424475-6B6C-4CF3-B215-952D67A2E1C6}"/>
+              </a:ext>
+            </a:extLst>
+          </p:cNvPr>
+          <p:cNvSpPr txBox="1"/>
+          <p:nvPr/>
+        </p:nvSpPr>
+        <p:spPr>
+          <a:xfrm>
+            <a:off x="3967675" y="4330306"/>
+            <a:ext cx="1012361" cy="369332"/>
+          </a:xfrm>
+          <a:prstGeom prst="rect">
+            <a:avLst/>
+          </a:prstGeom>
+          <a:noFill/>
+        </p:spPr>
+        <p:txBody>
+          <a:bodyPr wrap="square" rtlCol="0">
+            <a:spAutoFit/>
+          </a:bodyPr>
+          <a:lstStyle/>
+          <a:p>
+            <a:pPr algn="ctr"/>
+            <a:r>
+              <a:rPr lang="es-ES" b="1" u="sng" dirty="0"/>
+              <a:t>Alerta 1</a:t>
+            </a:r>
+          </a:p>
+        </p:txBody>
+      </p:sp>
+      <p:sp>
+        <p:nvSpPr>
+          <p:cNvPr id="23" name="CuadroTexto 22">
+            <a:extLst>
+              <a:ext uri="{FF2B5EF4-FFF2-40B4-BE49-F238E27FC236}">
+                <a16:creationId xmlns:a16="http://schemas.microsoft.com/office/drawing/2014/main" id="{7FB11281-0049-4B82-B340-00F5A893B995}"/>
+              </a:ext>
+            </a:extLst>
+          </p:cNvPr>
+          <p:cNvSpPr txBox="1"/>
+          <p:nvPr/>
+        </p:nvSpPr>
+        <p:spPr>
+          <a:xfrm>
+            <a:off x="6743043" y="4330306"/>
+            <a:ext cx="1012361" cy="369332"/>
+          </a:xfrm>
+          <a:prstGeom prst="rect">
+            <a:avLst/>
+          </a:prstGeom>
+          <a:noFill/>
+        </p:spPr>
+        <p:txBody>
+          <a:bodyPr wrap="square" rtlCol="0">
+            <a:spAutoFit/>
+          </a:bodyPr>
+          <a:lstStyle/>
+          <a:p>
+            <a:pPr algn="ctr"/>
+            <a:r>
+              <a:rPr lang="es-ES" b="1" u="sng" dirty="0"/>
+              <a:t>Alerta 2</a:t>
+            </a:r>
+          </a:p>
+        </p:txBody>
+      </p:sp>
+      <p:sp>
+        <p:nvSpPr>
+          <p:cNvPr id="24" name="Flecha: a la derecha 23">
+            <a:extLst>
+              <a:ext uri="{FF2B5EF4-FFF2-40B4-BE49-F238E27FC236}">
+                <a16:creationId xmlns:a16="http://schemas.microsoft.com/office/drawing/2014/main" id="{65BE37CD-8908-4B30-8966-284873E1E479}"/>
+              </a:ext>
+            </a:extLst>
+          </p:cNvPr>
+          <p:cNvSpPr/>
+          <p:nvPr/>
+        </p:nvSpPr>
+        <p:spPr>
+          <a:xfrm>
+            <a:off x="6949192" y="2161309"/>
+            <a:ext cx="1041236" cy="558875"/>
+          </a:xfrm>
+          <a:prstGeom prst="rightArrow">
+            <a:avLst/>
+          </a:prstGeom>
+        </p:spPr>
+        <p:style>
+          <a:lnRef idx="2">
+            <a:schemeClr val="accent1">
+              <a:shade val="50000"/>
+            </a:schemeClr>
+          </a:lnRef>
+          <a:fillRef idx="1">
+            <a:schemeClr val="accent1"/>
+          </a:fillRef>
+          <a:effectRef idx="0">
+            <a:schemeClr val="accent1"/>
+          </a:effectRef>
+          <a:fontRef idx="minor">
+            <a:schemeClr val="lt1"/>
+          </a:fontRef>
+        </p:style>
+        <p:txBody>
+          <a:bodyPr rtlCol="0" anchor="ctr"/>
+          <a:lstStyle/>
+          <a:p>
+            <a:pPr algn="ctr"/>
+            <a:endParaRPr lang="es-ES"/>
+          </a:p>
+        </p:txBody>
+      </p:sp>
+      <p:sp>
+        <p:nvSpPr>
+          <p:cNvPr id="25" name="Triángulo isósceles 24">
+            <a:extLst>
+              <a:ext uri="{FF2B5EF4-FFF2-40B4-BE49-F238E27FC236}">
+                <a16:creationId xmlns:a16="http://schemas.microsoft.com/office/drawing/2014/main" id="{F619276E-0886-4FB2-900F-033878F1D0EF}"/>
+              </a:ext>
+            </a:extLst>
+          </p:cNvPr>
+          <p:cNvSpPr/>
+          <p:nvPr/>
+        </p:nvSpPr>
+        <p:spPr>
+          <a:xfrm>
+            <a:off x="9524333" y="2171031"/>
+            <a:ext cx="425532" cy="330529"/>
+          </a:xfrm>
+          <a:prstGeom prst="triangle">
+            <a:avLst/>
+          </a:prstGeom>
+        </p:spPr>
+        <p:style>
+          <a:lnRef idx="0">
+            <a:schemeClr val="accent6"/>
+          </a:lnRef>
+          <a:fillRef idx="3">
+            <a:schemeClr val="accent6"/>
+          </a:fillRef>
+          <a:effectRef idx="3">
+            <a:schemeClr val="accent6"/>
+          </a:effectRef>
+          <a:fontRef idx="minor">
+            <a:schemeClr val="lt1"/>
+          </a:fontRef>
+        </p:style>
+        <p:txBody>
+          <a:bodyPr rtlCol="0" anchor="ctr"/>
+          <a:lstStyle/>
+          <a:p>
+            <a:pPr algn="ctr"/>
+            <a:endParaRPr lang="es-ES"/>
+          </a:p>
+        </p:txBody>
+      </p:sp>
+      <p:sp>
+        <p:nvSpPr>
+          <p:cNvPr id="26" name="Elipse 25">
+            <a:extLst>
+              <a:ext uri="{FF2B5EF4-FFF2-40B4-BE49-F238E27FC236}">
+                <a16:creationId xmlns:a16="http://schemas.microsoft.com/office/drawing/2014/main" id="{6D9BEDC7-BFE7-4CB9-913D-AF8617BF39F1}"/>
+              </a:ext>
+            </a:extLst>
+          </p:cNvPr>
+          <p:cNvSpPr/>
+          <p:nvPr/>
+        </p:nvSpPr>
+        <p:spPr>
+          <a:xfrm>
+            <a:off x="8373417" y="2171031"/>
+            <a:ext cx="425532" cy="330529"/>
+          </a:xfrm>
+          <a:prstGeom prst="ellipse">
+            <a:avLst/>
+          </a:prstGeom>
+          <a:ln/>
+        </p:spPr>
+        <p:style>
+          <a:lnRef idx="0">
+            <a:schemeClr val="accent2"/>
+          </a:lnRef>
+          <a:fillRef idx="3">
+            <a:schemeClr val="accent2"/>
+          </a:fillRef>
+          <a:effectRef idx="3">
+            <a:schemeClr val="accent2"/>
+          </a:effectRef>
+          <a:fontRef idx="minor">
+            <a:schemeClr val="lt1"/>
+          </a:fontRef>
+        </p:style>
+        <p:txBody>
+          <a:bodyPr rtlCol="0" anchor="ctr"/>
+          <a:lstStyle/>
+          <a:p>
+            <a:pPr algn="ctr"/>
+            <a:endParaRPr lang="es-ES"/>
+          </a:p>
+        </p:txBody>
+      </p:sp>
+      <p:sp>
+        <p:nvSpPr>
+          <p:cNvPr id="27" name="Explosión: 8 puntos 26">
+            <a:extLst>
+              <a:ext uri="{FF2B5EF4-FFF2-40B4-BE49-F238E27FC236}">
+                <a16:creationId xmlns:a16="http://schemas.microsoft.com/office/drawing/2014/main" id="{C681F45A-F450-4771-9D87-5ED66DC4D4F9}"/>
+              </a:ext>
+            </a:extLst>
+          </p:cNvPr>
+          <p:cNvSpPr/>
+          <p:nvPr/>
+        </p:nvSpPr>
+        <p:spPr>
+          <a:xfrm>
+            <a:off x="8946403" y="2171031"/>
+            <a:ext cx="425532" cy="330529"/>
+          </a:xfrm>
+          <a:prstGeom prst="irregularSeal1">
+            <a:avLst/>
+          </a:prstGeom>
+        </p:spPr>
+        <p:style>
+          <a:lnRef idx="0">
+            <a:schemeClr val="accent5"/>
+          </a:lnRef>
+          <a:fillRef idx="3">
+            <a:schemeClr val="accent5"/>
+          </a:fillRef>
+          <a:effectRef idx="3">
+            <a:schemeClr val="accent5"/>
+          </a:effectRef>
+          <a:fontRef idx="minor">
+            <a:schemeClr val="lt1"/>
+          </a:fontRef>
+        </p:style>
+        <p:txBody>
+          <a:bodyPr rtlCol="0" anchor="ctr"/>
+          <a:lstStyle/>
+          <a:p>
+            <a:pPr algn="ctr"/>
+            <a:endParaRPr lang="es-ES" dirty="0"/>
+          </a:p>
+        </p:txBody>
+      </p:sp>
+      <p:sp>
+        <p:nvSpPr>
+          <p:cNvPr id="28" name="CuadroTexto 27">
+            <a:extLst>
+              <a:ext uri="{FF2B5EF4-FFF2-40B4-BE49-F238E27FC236}">
+                <a16:creationId xmlns:a16="http://schemas.microsoft.com/office/drawing/2014/main" id="{7EADA44F-5DAE-4E41-A1DA-0C4A4B7B9B8A}"/>
+              </a:ext>
+            </a:extLst>
+          </p:cNvPr>
+          <p:cNvSpPr txBox="1"/>
+          <p:nvPr/>
+        </p:nvSpPr>
+        <p:spPr>
+          <a:xfrm>
+            <a:off x="8502067" y="2623449"/>
+            <a:ext cx="1383464" cy="646331"/>
+          </a:xfrm>
+          <a:prstGeom prst="rect">
+            <a:avLst/>
+          </a:prstGeom>
+          <a:noFill/>
+        </p:spPr>
+        <p:txBody>
+          <a:bodyPr wrap="square" rtlCol="0">
+            <a:spAutoFit/>
+          </a:bodyPr>
+          <a:lstStyle/>
+          <a:p>
+            <a:pPr algn="ctr"/>
+            <a:r>
+              <a:rPr lang="es-ES" b="1" u="sng" dirty="0"/>
+              <a:t>Alerta 1 DETECTADA</a:t>
+            </a:r>
+          </a:p>
+        </p:txBody>
+      </p:sp>
+      <p:sp>
+        <p:nvSpPr>
+          <p:cNvPr id="29" name="Rectángulo: esquinas redondeadas 28">
+            <a:extLst>
+              <a:ext uri="{FF2B5EF4-FFF2-40B4-BE49-F238E27FC236}">
+                <a16:creationId xmlns:a16="http://schemas.microsoft.com/office/drawing/2014/main" id="{21FFECA2-07B9-409D-95DD-70B9CCAA358C}"/>
+              </a:ext>
+            </a:extLst>
+          </p:cNvPr>
+          <p:cNvSpPr/>
+          <p:nvPr/>
+        </p:nvSpPr>
+        <p:spPr>
+          <a:xfrm>
+            <a:off x="2329231" y="2246494"/>
+            <a:ext cx="1724705" cy="473690"/>
+          </a:xfrm>
+          <a:prstGeom prst="roundRect">
+            <a:avLst/>
+          </a:prstGeom>
+          <a:noFill/>
+          <a:ln w="38100">
+            <a:solidFill>
+              <a:srgbClr val="FF0000"/>
+            </a:solidFill>
+            <a:prstDash val="sysDash"/>
+          </a:ln>
+        </p:spPr>
+        <p:style>
+          <a:lnRef idx="2">
+            <a:schemeClr val="accent1">
+              <a:shade val="50000"/>
+            </a:schemeClr>
+          </a:lnRef>
+          <a:fillRef idx="1">
+            <a:schemeClr val="accent1"/>
+          </a:fillRef>
+          <a:effectRef idx="0">
+            <a:schemeClr val="accent1"/>
+          </a:effectRef>
+          <a:fontRef idx="minor">
+            <a:schemeClr val="lt1"/>
+          </a:fontRef>
+        </p:style>
+        <p:txBody>
+          <a:bodyPr rtlCol="0" anchor="ctr"/>
+          <a:lstStyle/>
+          <a:p>
+            <a:pPr algn="ctr"/>
+            <a:endParaRPr lang="es-ES"/>
+          </a:p>
+        </p:txBody>
+      </p:sp>
+      <p:sp>
+        <p:nvSpPr>
+          <p:cNvPr id="31" name="CuadroTexto 30">
+            <a:extLst>
+              <a:ext uri="{FF2B5EF4-FFF2-40B4-BE49-F238E27FC236}">
+                <a16:creationId xmlns:a16="http://schemas.microsoft.com/office/drawing/2014/main" id="{72DD4E8F-8829-4614-A8E2-EBCFCCA2451A}"/>
+              </a:ext>
+            </a:extLst>
+          </p:cNvPr>
+          <p:cNvSpPr txBox="1"/>
+          <p:nvPr/>
+        </p:nvSpPr>
+        <p:spPr>
+          <a:xfrm>
+            <a:off x="1691769" y="1675913"/>
+            <a:ext cx="2566525" cy="369332"/>
+          </a:xfrm>
+          <a:prstGeom prst="rect">
+            <a:avLst/>
+          </a:prstGeom>
+        </p:spPr>
+        <p:style>
+          <a:lnRef idx="0">
+            <a:schemeClr val="accent5"/>
+          </a:lnRef>
+          <a:fillRef idx="3">
+            <a:schemeClr val="accent5"/>
+          </a:fillRef>
+          <a:effectRef idx="3">
+            <a:schemeClr val="accent5"/>
+          </a:effectRef>
+          <a:fontRef idx="minor">
+            <a:schemeClr val="lt1"/>
+          </a:fontRef>
+        </p:style>
+        <p:txBody>
+          <a:bodyPr wrap="square" rtlCol="0">
+            <a:spAutoFit/>
+          </a:bodyPr>
+          <a:lstStyle/>
+          <a:p>
+            <a:r>
+              <a:rPr lang="es-ES" b="1" dirty="0"/>
+              <a:t>Flujo normal de eventos</a:t>
+            </a:r>
+          </a:p>
+        </p:txBody>
+      </p:sp>
+      <p:sp>
+        <p:nvSpPr>
+          <p:cNvPr id="32" name="CuadroTexto 31">
+            <a:extLst>
+              <a:ext uri="{FF2B5EF4-FFF2-40B4-BE49-F238E27FC236}">
+                <a16:creationId xmlns:a16="http://schemas.microsoft.com/office/drawing/2014/main" id="{FAD2D5ED-B75B-4D13-823C-C28AD2FB6515}"/>
+              </a:ext>
+            </a:extLst>
+          </p:cNvPr>
+          <p:cNvSpPr txBox="1"/>
+          <p:nvPr/>
+        </p:nvSpPr>
+        <p:spPr>
+          <a:xfrm>
+            <a:off x="8565727" y="1675913"/>
+            <a:ext cx="1256219" cy="369332"/>
+          </a:xfrm>
+          <a:prstGeom prst="rect">
+            <a:avLst/>
+          </a:prstGeom>
+        </p:spPr>
+        <p:style>
+          <a:lnRef idx="0">
+            <a:schemeClr val="accent5"/>
+          </a:lnRef>
+          <a:fillRef idx="3">
+            <a:schemeClr val="accent5"/>
+          </a:fillRef>
+          <a:effectRef idx="3">
+            <a:schemeClr val="accent5"/>
+          </a:effectRef>
+          <a:fontRef idx="minor">
+            <a:schemeClr val="lt1"/>
+          </a:fontRef>
+        </p:style>
+        <p:txBody>
+          <a:bodyPr wrap="square" rtlCol="0">
+            <a:spAutoFit/>
+          </a:bodyPr>
+          <a:lstStyle/>
+          <a:p>
+            <a:r>
+              <a:rPr lang="es-ES" b="1" dirty="0"/>
+              <a:t>Resultados</a:t>
+            </a:r>
+          </a:p>
+        </p:txBody>
+      </p:sp>
+      <p:sp>
+        <p:nvSpPr>
+          <p:cNvPr id="33" name="CuadroTexto 32">
+            <a:extLst>
+              <a:ext uri="{FF2B5EF4-FFF2-40B4-BE49-F238E27FC236}">
+                <a16:creationId xmlns:a16="http://schemas.microsoft.com/office/drawing/2014/main" id="{E319B849-B120-458A-BA7C-DB46AA86A39C}"/>
+              </a:ext>
+            </a:extLst>
+          </p:cNvPr>
+          <p:cNvSpPr txBox="1"/>
+          <p:nvPr/>
+        </p:nvSpPr>
+        <p:spPr>
+          <a:xfrm>
+            <a:off x="5099379" y="1024091"/>
+            <a:ext cx="1388428" cy="369332"/>
+          </a:xfrm>
+          <a:prstGeom prst="rect">
+            <a:avLst/>
+          </a:prstGeom>
+        </p:spPr>
+        <p:style>
+          <a:lnRef idx="0">
+            <a:schemeClr val="accent6"/>
+          </a:lnRef>
+          <a:fillRef idx="3">
+            <a:schemeClr val="accent6"/>
+          </a:fillRef>
+          <a:effectRef idx="3">
+            <a:schemeClr val="accent6"/>
+          </a:effectRef>
+          <a:fontRef idx="minor">
+            <a:schemeClr val="lt1"/>
+          </a:fontRef>
+        </p:style>
+        <p:txBody>
+          <a:bodyPr wrap="square" rtlCol="0">
+            <a:spAutoFit/>
+          </a:bodyPr>
+          <a:lstStyle/>
+          <a:p>
+            <a:r>
+              <a:rPr lang="es-ES" b="1" dirty="0"/>
+              <a:t>MOTOR CEP</a:t>
+            </a:r>
+          </a:p>
+        </p:txBody>
+      </p:sp>
+    </p:spTree>
+    <p:extLst>
+      <p:ext uri="{BB962C8B-B14F-4D97-AF65-F5344CB8AC3E}">
+        <p14:creationId xmlns:p14="http://schemas.microsoft.com/office/powerpoint/2010/main" val="4265406930"/>
+      </p:ext>
+    </p:extLst>
+  </p:cSld>
+  <p:clrMapOvr>
+    <a:masterClrMapping/>
+  </p:clrMapOvr>
+</p:sld>
+</file>
+
 <file path=ppt/theme/theme1.xml><?xml version="1.0" encoding="utf-8"?>
 <a:theme xmlns:a="http://schemas.openxmlformats.org/drawingml/2006/main" name="Tema de Office">
   <a:themeElements>

</xml_diff>

<commit_message>
Desarrollo del sprint 0,1,2 y comienzo del 3_Refinado interfaz
</commit_message>
<xml_diff>
--- a/docs/Diagrama de arquitectura.pptx
+++ b/docs/Diagrama de arquitectura.pptx
@@ -15,6 +15,7 @@
     <p:sldId id="262" r:id="rId9"/>
     <p:sldId id="264" r:id="rId10"/>
     <p:sldId id="265" r:id="rId11"/>
+    <p:sldId id="266" r:id="rId12"/>
   </p:sldIdLst>
   <p:sldSz cx="12192000" cy="6858000"/>
   <p:notesSz cx="6858000" cy="9144000"/>
@@ -268,7 +269,7 @@
           <a:p>
             <a:fld id="{4DAFCE15-DBFD-4C2D-8258-132D751D944C}" type="datetimeFigureOut">
               <a:rPr lang="es-ES" smtClean="0"/>
-              <a:t>12/04/2018</a:t>
+              <a:t>27/05/2018</a:t>
             </a:fld>
             <a:endParaRPr lang="es-ES"/>
           </a:p>
@@ -466,7 +467,7 @@
           <a:p>
             <a:fld id="{4DAFCE15-DBFD-4C2D-8258-132D751D944C}" type="datetimeFigureOut">
               <a:rPr lang="es-ES" smtClean="0"/>
-              <a:t>12/04/2018</a:t>
+              <a:t>27/05/2018</a:t>
             </a:fld>
             <a:endParaRPr lang="es-ES"/>
           </a:p>
@@ -674,7 +675,7 @@
           <a:p>
             <a:fld id="{4DAFCE15-DBFD-4C2D-8258-132D751D944C}" type="datetimeFigureOut">
               <a:rPr lang="es-ES" smtClean="0"/>
-              <a:t>12/04/2018</a:t>
+              <a:t>27/05/2018</a:t>
             </a:fld>
             <a:endParaRPr lang="es-ES"/>
           </a:p>
@@ -872,7 +873,7 @@
           <a:p>
             <a:fld id="{4DAFCE15-DBFD-4C2D-8258-132D751D944C}" type="datetimeFigureOut">
               <a:rPr lang="es-ES" smtClean="0"/>
-              <a:t>12/04/2018</a:t>
+              <a:t>27/05/2018</a:t>
             </a:fld>
             <a:endParaRPr lang="es-ES"/>
           </a:p>
@@ -1147,7 +1148,7 @@
           <a:p>
             <a:fld id="{4DAFCE15-DBFD-4C2D-8258-132D751D944C}" type="datetimeFigureOut">
               <a:rPr lang="es-ES" smtClean="0"/>
-              <a:t>12/04/2018</a:t>
+              <a:t>27/05/2018</a:t>
             </a:fld>
             <a:endParaRPr lang="es-ES"/>
           </a:p>
@@ -1412,7 +1413,7 @@
           <a:p>
             <a:fld id="{4DAFCE15-DBFD-4C2D-8258-132D751D944C}" type="datetimeFigureOut">
               <a:rPr lang="es-ES" smtClean="0"/>
-              <a:t>12/04/2018</a:t>
+              <a:t>27/05/2018</a:t>
             </a:fld>
             <a:endParaRPr lang="es-ES"/>
           </a:p>
@@ -1824,7 +1825,7 @@
           <a:p>
             <a:fld id="{4DAFCE15-DBFD-4C2D-8258-132D751D944C}" type="datetimeFigureOut">
               <a:rPr lang="es-ES" smtClean="0"/>
-              <a:t>12/04/2018</a:t>
+              <a:t>27/05/2018</a:t>
             </a:fld>
             <a:endParaRPr lang="es-ES"/>
           </a:p>
@@ -1965,7 +1966,7 @@
           <a:p>
             <a:fld id="{4DAFCE15-DBFD-4C2D-8258-132D751D944C}" type="datetimeFigureOut">
               <a:rPr lang="es-ES" smtClean="0"/>
-              <a:t>12/04/2018</a:t>
+              <a:t>27/05/2018</a:t>
             </a:fld>
             <a:endParaRPr lang="es-ES"/>
           </a:p>
@@ -2078,7 +2079,7 @@
           <a:p>
             <a:fld id="{4DAFCE15-DBFD-4C2D-8258-132D751D944C}" type="datetimeFigureOut">
               <a:rPr lang="es-ES" smtClean="0"/>
-              <a:t>12/04/2018</a:t>
+              <a:t>27/05/2018</a:t>
             </a:fld>
             <a:endParaRPr lang="es-ES"/>
           </a:p>
@@ -2389,7 +2390,7 @@
           <a:p>
             <a:fld id="{4DAFCE15-DBFD-4C2D-8258-132D751D944C}" type="datetimeFigureOut">
               <a:rPr lang="es-ES" smtClean="0"/>
-              <a:t>12/04/2018</a:t>
+              <a:t>27/05/2018</a:t>
             </a:fld>
             <a:endParaRPr lang="es-ES"/>
           </a:p>
@@ -2677,7 +2678,7 @@
           <a:p>
             <a:fld id="{4DAFCE15-DBFD-4C2D-8258-132D751D944C}" type="datetimeFigureOut">
               <a:rPr lang="es-ES" smtClean="0"/>
-              <a:t>12/04/2018</a:t>
+              <a:t>27/05/2018</a:t>
             </a:fld>
             <a:endParaRPr lang="es-ES"/>
           </a:p>
@@ -2918,7 +2919,7 @@
           <a:p>
             <a:fld id="{4DAFCE15-DBFD-4C2D-8258-132D751D944C}" type="datetimeFigureOut">
               <a:rPr lang="es-ES" smtClean="0"/>
-              <a:t>12/04/2018</a:t>
+              <a:t>27/05/2018</a:t>
             </a:fld>
             <a:endParaRPr lang="es-ES"/>
           </a:p>
@@ -6345,6 +6346,1012 @@
 </p:sld>
 </file>
 
+<file path=ppt/slides/slide11.xml><?xml version="1.0" encoding="utf-8"?>
+<p:sld xmlns:a="http://schemas.openxmlformats.org/drawingml/2006/main" xmlns:r="http://schemas.openxmlformats.org/officeDocument/2006/relationships" xmlns:p="http://schemas.openxmlformats.org/presentationml/2006/main">
+  <p:cSld>
+    <p:spTree>
+      <p:nvGrpSpPr>
+        <p:cNvPr id="1" name=""/>
+        <p:cNvGrpSpPr/>
+        <p:nvPr/>
+      </p:nvGrpSpPr>
+      <p:grpSpPr>
+        <a:xfrm>
+          <a:off x="0" y="0"/>
+          <a:ext cx="0" cy="0"/>
+          <a:chOff x="0" y="0"/>
+          <a:chExt cx="0" cy="0"/>
+        </a:xfrm>
+      </p:grpSpPr>
+      <p:graphicFrame>
+        <p:nvGraphicFramePr>
+          <p:cNvPr id="4" name="Marcador de contenido 3">
+            <a:extLst>
+              <a:ext uri="{FF2B5EF4-FFF2-40B4-BE49-F238E27FC236}">
+                <a16:creationId xmlns:a16="http://schemas.microsoft.com/office/drawing/2014/main" id="{E0063F8F-EF2D-4046-ADA4-F4BE35C0F627}"/>
+              </a:ext>
+            </a:extLst>
+          </p:cNvPr>
+          <p:cNvGraphicFramePr>
+            <a:graphicFrameLocks noGrp="1"/>
+          </p:cNvGraphicFramePr>
+          <p:nvPr>
+            <p:ph idx="1"/>
+            <p:extLst>
+              <p:ext uri="{D42A27DB-BD31-4B8C-83A1-F6EECF244321}">
+                <p14:modId xmlns:p14="http://schemas.microsoft.com/office/powerpoint/2010/main" val="2241289028"/>
+              </p:ext>
+            </p:extLst>
+          </p:nvPr>
+        </p:nvGraphicFramePr>
+        <p:xfrm>
+          <a:off x="2775752" y="1945640"/>
+          <a:ext cx="5033639" cy="1483360"/>
+        </p:xfrm>
+        <a:graphic>
+          <a:graphicData uri="http://schemas.openxmlformats.org/drawingml/2006/table">
+            <a:tbl>
+              <a:tblPr firstRow="1" bandRow="1">
+                <a:tableStyleId>{5C22544A-7EE6-4342-B048-85BDC9FD1C3A}</a:tableStyleId>
+              </a:tblPr>
+              <a:tblGrid>
+                <a:gridCol w="798991">
+                  <a:extLst>
+                    <a:ext uri="{9D8B030D-6E8A-4147-A177-3AD203B41FA5}">
+                      <a16:colId xmlns:a16="http://schemas.microsoft.com/office/drawing/2014/main" val="857137367"/>
+                    </a:ext>
+                  </a:extLst>
+                </a:gridCol>
+                <a:gridCol w="719091">
+                  <a:extLst>
+                    <a:ext uri="{9D8B030D-6E8A-4147-A177-3AD203B41FA5}">
+                      <a16:colId xmlns:a16="http://schemas.microsoft.com/office/drawing/2014/main" val="1317219862"/>
+                    </a:ext>
+                  </a:extLst>
+                </a:gridCol>
+                <a:gridCol w="674703">
+                  <a:extLst>
+                    <a:ext uri="{9D8B030D-6E8A-4147-A177-3AD203B41FA5}">
+                      <a16:colId xmlns:a16="http://schemas.microsoft.com/office/drawing/2014/main" val="1495008130"/>
+                    </a:ext>
+                  </a:extLst>
+                </a:gridCol>
+                <a:gridCol w="710213">
+                  <a:extLst>
+                    <a:ext uri="{9D8B030D-6E8A-4147-A177-3AD203B41FA5}">
+                      <a16:colId xmlns:a16="http://schemas.microsoft.com/office/drawing/2014/main" val="3241095960"/>
+                    </a:ext>
+                  </a:extLst>
+                </a:gridCol>
+                <a:gridCol w="665826">
+                  <a:extLst>
+                    <a:ext uri="{9D8B030D-6E8A-4147-A177-3AD203B41FA5}">
+                      <a16:colId xmlns:a16="http://schemas.microsoft.com/office/drawing/2014/main" val="1606097846"/>
+                    </a:ext>
+                  </a:extLst>
+                </a:gridCol>
+                <a:gridCol w="695417">
+                  <a:extLst>
+                    <a:ext uri="{9D8B030D-6E8A-4147-A177-3AD203B41FA5}">
+                      <a16:colId xmlns:a16="http://schemas.microsoft.com/office/drawing/2014/main" val="940109695"/>
+                    </a:ext>
+                  </a:extLst>
+                </a:gridCol>
+                <a:gridCol w="769398">
+                  <a:extLst>
+                    <a:ext uri="{9D8B030D-6E8A-4147-A177-3AD203B41FA5}">
+                      <a16:colId xmlns:a16="http://schemas.microsoft.com/office/drawing/2014/main" val="3850325199"/>
+                    </a:ext>
+                  </a:extLst>
+                </a:gridCol>
+              </a:tblGrid>
+              <a:tr h="370840">
+                <a:tc>
+                  <a:txBody>
+                    <a:bodyPr/>
+                    <a:lstStyle/>
+                    <a:p>
+                      <a:pPr algn="ctr"/>
+                      <a:r>
+                        <a:rPr lang="es-ES" dirty="0"/>
+                        <a:t>Día 1</a:t>
+                      </a:r>
+                    </a:p>
+                  </a:txBody>
+                  <a:tcPr/>
+                </a:tc>
+                <a:tc>
+                  <a:txBody>
+                    <a:bodyPr/>
+                    <a:lstStyle/>
+                    <a:p>
+                      <a:pPr algn="ctr"/>
+                      <a:r>
+                        <a:rPr lang="es-ES" dirty="0"/>
+                        <a:t>Día 2</a:t>
+                      </a:r>
+                    </a:p>
+                  </a:txBody>
+                  <a:tcPr/>
+                </a:tc>
+                <a:tc>
+                  <a:txBody>
+                    <a:bodyPr/>
+                    <a:lstStyle/>
+                    <a:p>
+                      <a:pPr algn="ctr"/>
+                      <a:r>
+                        <a:rPr lang="es-ES" dirty="0"/>
+                        <a:t>Día 3</a:t>
+                      </a:r>
+                    </a:p>
+                  </a:txBody>
+                  <a:tcPr/>
+                </a:tc>
+                <a:tc>
+                  <a:txBody>
+                    <a:bodyPr/>
+                    <a:lstStyle/>
+                    <a:p>
+                      <a:pPr algn="ctr"/>
+                      <a:r>
+                        <a:rPr lang="es-ES" dirty="0"/>
+                        <a:t>Día 4</a:t>
+                      </a:r>
+                    </a:p>
+                  </a:txBody>
+                  <a:tcPr/>
+                </a:tc>
+                <a:tc>
+                  <a:txBody>
+                    <a:bodyPr/>
+                    <a:lstStyle/>
+                    <a:p>
+                      <a:pPr algn="ctr"/>
+                      <a:r>
+                        <a:rPr lang="es-ES" dirty="0"/>
+                        <a:t>Día 5</a:t>
+                      </a:r>
+                    </a:p>
+                  </a:txBody>
+                  <a:tcPr/>
+                </a:tc>
+                <a:tc>
+                  <a:txBody>
+                    <a:bodyPr/>
+                    <a:lstStyle/>
+                    <a:p>
+                      <a:pPr algn="ctr"/>
+                      <a:r>
+                        <a:rPr lang="es-ES" dirty="0"/>
+                        <a:t>Día 6</a:t>
+                      </a:r>
+                    </a:p>
+                  </a:txBody>
+                  <a:tcPr/>
+                </a:tc>
+                <a:tc>
+                  <a:txBody>
+                    <a:bodyPr/>
+                    <a:lstStyle/>
+                    <a:p>
+                      <a:pPr algn="ctr"/>
+                      <a:r>
+                        <a:rPr lang="es-ES" dirty="0"/>
+                        <a:t>Día 7</a:t>
+                      </a:r>
+                    </a:p>
+                  </a:txBody>
+                  <a:tcPr/>
+                </a:tc>
+                <a:extLst>
+                  <a:ext uri="{0D108BD9-81ED-4DB2-BD59-A6C34878D82A}">
+                    <a16:rowId xmlns:a16="http://schemas.microsoft.com/office/drawing/2014/main" val="2450596782"/>
+                  </a:ext>
+                </a:extLst>
+              </a:tr>
+              <a:tr h="370840">
+                <a:tc>
+                  <a:txBody>
+                    <a:bodyPr/>
+                    <a:lstStyle/>
+                    <a:p>
+                      <a:pPr algn="ctr"/>
+                      <a:r>
+                        <a:rPr lang="es-ES" dirty="0"/>
+                        <a:t>Id: 1</a:t>
+                      </a:r>
+                    </a:p>
+                  </a:txBody>
+                  <a:tcPr/>
+                </a:tc>
+                <a:tc>
+                  <a:txBody>
+                    <a:bodyPr/>
+                    <a:lstStyle/>
+                    <a:p>
+                      <a:pPr algn="ctr"/>
+                      <a:r>
+                        <a:rPr lang="es-ES" dirty="0"/>
+                        <a:t>Id: 2</a:t>
+                      </a:r>
+                    </a:p>
+                  </a:txBody>
+                  <a:tcPr/>
+                </a:tc>
+                <a:tc>
+                  <a:txBody>
+                    <a:bodyPr/>
+                    <a:lstStyle/>
+                    <a:p>
+                      <a:pPr algn="ctr"/>
+                      <a:r>
+                        <a:rPr lang="es-ES" dirty="0"/>
+                        <a:t>Id: 3</a:t>
+                      </a:r>
+                    </a:p>
+                  </a:txBody>
+                  <a:tcPr/>
+                </a:tc>
+                <a:tc>
+                  <a:txBody>
+                    <a:bodyPr/>
+                    <a:lstStyle/>
+                    <a:p>
+                      <a:pPr algn="ctr"/>
+                      <a:r>
+                        <a:rPr lang="es-ES" dirty="0"/>
+                        <a:t>Id: 1</a:t>
+                      </a:r>
+                    </a:p>
+                  </a:txBody>
+                  <a:tcPr/>
+                </a:tc>
+                <a:tc>
+                  <a:txBody>
+                    <a:bodyPr/>
+                    <a:lstStyle/>
+                    <a:p>
+                      <a:pPr algn="ctr"/>
+                      <a:r>
+                        <a:rPr lang="es-ES" dirty="0"/>
+                        <a:t>Id: 1</a:t>
+                      </a:r>
+                    </a:p>
+                  </a:txBody>
+                  <a:tcPr/>
+                </a:tc>
+                <a:tc>
+                  <a:txBody>
+                    <a:bodyPr/>
+                    <a:lstStyle/>
+                    <a:p>
+                      <a:pPr algn="ctr"/>
+                      <a:r>
+                        <a:rPr lang="es-ES" dirty="0"/>
+                        <a:t>Id: 3</a:t>
+                      </a:r>
+                    </a:p>
+                  </a:txBody>
+                  <a:tcPr/>
+                </a:tc>
+                <a:tc>
+                  <a:txBody>
+                    <a:bodyPr/>
+                    <a:lstStyle/>
+                    <a:p>
+                      <a:pPr algn="ctr"/>
+                      <a:r>
+                        <a:rPr lang="es-ES" dirty="0"/>
+                        <a:t>Id: 1</a:t>
+                      </a:r>
+                    </a:p>
+                  </a:txBody>
+                  <a:tcPr/>
+                </a:tc>
+                <a:extLst>
+                  <a:ext uri="{0D108BD9-81ED-4DB2-BD59-A6C34878D82A}">
+                    <a16:rowId xmlns:a16="http://schemas.microsoft.com/office/drawing/2014/main" val="1331580905"/>
+                  </a:ext>
+                </a:extLst>
+              </a:tr>
+              <a:tr h="370840">
+                <a:tc>
+                  <a:txBody>
+                    <a:bodyPr/>
+                    <a:lstStyle/>
+                    <a:p>
+                      <a:pPr algn="ctr"/>
+                      <a:r>
+                        <a:rPr lang="es-ES" dirty="0"/>
+                        <a:t>Id: 3</a:t>
+                      </a:r>
+                    </a:p>
+                  </a:txBody>
+                  <a:tcPr/>
+                </a:tc>
+                <a:tc>
+                  <a:txBody>
+                    <a:bodyPr/>
+                    <a:lstStyle/>
+                    <a:p>
+                      <a:pPr algn="ctr"/>
+                      <a:r>
+                        <a:rPr lang="es-ES" dirty="0"/>
+                        <a:t>Id: 3</a:t>
+                      </a:r>
+                    </a:p>
+                  </a:txBody>
+                  <a:tcPr/>
+                </a:tc>
+                <a:tc>
+                  <a:txBody>
+                    <a:bodyPr/>
+                    <a:lstStyle/>
+                    <a:p>
+                      <a:pPr algn="ctr"/>
+                      <a:r>
+                        <a:rPr lang="es-ES" dirty="0"/>
+                        <a:t>Id: 1</a:t>
+                      </a:r>
+                    </a:p>
+                  </a:txBody>
+                  <a:tcPr/>
+                </a:tc>
+                <a:tc>
+                  <a:txBody>
+                    <a:bodyPr/>
+                    <a:lstStyle/>
+                    <a:p>
+                      <a:pPr algn="ctr"/>
+                      <a:r>
+                        <a:rPr lang="es-ES" dirty="0"/>
+                        <a:t>Id: 3</a:t>
+                      </a:r>
+                    </a:p>
+                  </a:txBody>
+                  <a:tcPr/>
+                </a:tc>
+                <a:tc>
+                  <a:txBody>
+                    <a:bodyPr/>
+                    <a:lstStyle/>
+                    <a:p>
+                      <a:pPr algn="ctr"/>
+                      <a:r>
+                        <a:rPr lang="es-ES" dirty="0"/>
+                        <a:t>Id: 3</a:t>
+                      </a:r>
+                    </a:p>
+                  </a:txBody>
+                  <a:tcPr/>
+                </a:tc>
+                <a:tc>
+                  <a:txBody>
+                    <a:bodyPr/>
+                    <a:lstStyle/>
+                    <a:p>
+                      <a:pPr algn="ctr"/>
+                      <a:r>
+                        <a:rPr lang="es-ES" dirty="0"/>
+                        <a:t>Id: 2</a:t>
+                      </a:r>
+                    </a:p>
+                  </a:txBody>
+                  <a:tcPr/>
+                </a:tc>
+                <a:tc>
+                  <a:txBody>
+                    <a:bodyPr/>
+                    <a:lstStyle/>
+                    <a:p>
+                      <a:pPr algn="ctr"/>
+                      <a:r>
+                        <a:rPr lang="es-ES" dirty="0"/>
+                        <a:t>Id: 3</a:t>
+                      </a:r>
+                    </a:p>
+                  </a:txBody>
+                  <a:tcPr/>
+                </a:tc>
+                <a:extLst>
+                  <a:ext uri="{0D108BD9-81ED-4DB2-BD59-A6C34878D82A}">
+                    <a16:rowId xmlns:a16="http://schemas.microsoft.com/office/drawing/2014/main" val="2635614323"/>
+                  </a:ext>
+                </a:extLst>
+              </a:tr>
+              <a:tr h="370840">
+                <a:tc>
+                  <a:txBody>
+                    <a:bodyPr/>
+                    <a:lstStyle/>
+                    <a:p>
+                      <a:pPr algn="ctr"/>
+                      <a:r>
+                        <a:rPr lang="es-ES" dirty="0"/>
+                        <a:t>Id: 2</a:t>
+                      </a:r>
+                    </a:p>
+                  </a:txBody>
+                  <a:tcPr/>
+                </a:tc>
+                <a:tc>
+                  <a:txBody>
+                    <a:bodyPr/>
+                    <a:lstStyle/>
+                    <a:p>
+                      <a:pPr algn="ctr"/>
+                      <a:r>
+                        <a:rPr lang="es-ES" dirty="0"/>
+                        <a:t>Id: 1</a:t>
+                      </a:r>
+                    </a:p>
+                  </a:txBody>
+                  <a:tcPr/>
+                </a:tc>
+                <a:tc>
+                  <a:txBody>
+                    <a:bodyPr/>
+                    <a:lstStyle/>
+                    <a:p>
+                      <a:pPr algn="ctr"/>
+                      <a:r>
+                        <a:rPr lang="es-ES" dirty="0"/>
+                        <a:t>Id: 2</a:t>
+                      </a:r>
+                    </a:p>
+                  </a:txBody>
+                  <a:tcPr/>
+                </a:tc>
+                <a:tc>
+                  <a:txBody>
+                    <a:bodyPr/>
+                    <a:lstStyle/>
+                    <a:p>
+                      <a:pPr algn="ctr"/>
+                      <a:r>
+                        <a:rPr lang="es-ES" dirty="0"/>
+                        <a:t>Id: 2</a:t>
+                      </a:r>
+                    </a:p>
+                  </a:txBody>
+                  <a:tcPr/>
+                </a:tc>
+                <a:tc>
+                  <a:txBody>
+                    <a:bodyPr/>
+                    <a:lstStyle/>
+                    <a:p>
+                      <a:pPr algn="ctr"/>
+                      <a:r>
+                        <a:rPr lang="es-ES" dirty="0"/>
+                        <a:t>Id: 2</a:t>
+                      </a:r>
+                    </a:p>
+                  </a:txBody>
+                  <a:tcPr/>
+                </a:tc>
+                <a:tc>
+                  <a:txBody>
+                    <a:bodyPr/>
+                    <a:lstStyle/>
+                    <a:p>
+                      <a:pPr algn="ctr"/>
+                      <a:r>
+                        <a:rPr lang="es-ES" dirty="0"/>
+                        <a:t>Id: 1</a:t>
+                      </a:r>
+                    </a:p>
+                  </a:txBody>
+                  <a:tcPr/>
+                </a:tc>
+                <a:tc>
+                  <a:txBody>
+                    <a:bodyPr/>
+                    <a:lstStyle/>
+                    <a:p>
+                      <a:pPr algn="ctr"/>
+                      <a:r>
+                        <a:rPr lang="es-ES" dirty="0"/>
+                        <a:t>Id: 2</a:t>
+                      </a:r>
+                    </a:p>
+                  </a:txBody>
+                  <a:tcPr/>
+                </a:tc>
+                <a:extLst>
+                  <a:ext uri="{0D108BD9-81ED-4DB2-BD59-A6C34878D82A}">
+                    <a16:rowId xmlns:a16="http://schemas.microsoft.com/office/drawing/2014/main" val="482533761"/>
+                  </a:ext>
+                </a:extLst>
+              </a:tr>
+            </a:tbl>
+          </a:graphicData>
+        </a:graphic>
+      </p:graphicFrame>
+      <p:sp>
+        <p:nvSpPr>
+          <p:cNvPr id="5" name="Abrir llave 4">
+            <a:extLst>
+              <a:ext uri="{FF2B5EF4-FFF2-40B4-BE49-F238E27FC236}">
+                <a16:creationId xmlns:a16="http://schemas.microsoft.com/office/drawing/2014/main" id="{921C270F-2BEA-4386-842E-BEFBCAF9FB95}"/>
+              </a:ext>
+            </a:extLst>
+          </p:cNvPr>
+          <p:cNvSpPr/>
+          <p:nvPr/>
+        </p:nvSpPr>
+        <p:spPr>
+          <a:xfrm rot="16200000">
+            <a:off x="3390790" y="3237871"/>
+            <a:ext cx="243619" cy="763480"/>
+          </a:xfrm>
+          <a:prstGeom prst="leftBrace">
+            <a:avLst>
+              <a:gd name="adj1" fmla="val 8333"/>
+              <a:gd name="adj2" fmla="val 53574"/>
+            </a:avLst>
+          </a:prstGeom>
+          <a:ln w="38100"/>
+        </p:spPr>
+        <p:style>
+          <a:lnRef idx="1">
+            <a:schemeClr val="accent1"/>
+          </a:lnRef>
+          <a:fillRef idx="0">
+            <a:schemeClr val="accent1"/>
+          </a:fillRef>
+          <a:effectRef idx="0">
+            <a:schemeClr val="accent1"/>
+          </a:effectRef>
+          <a:fontRef idx="minor">
+            <a:schemeClr val="tx1"/>
+          </a:fontRef>
+        </p:style>
+        <p:txBody>
+          <a:bodyPr rtlCol="0" anchor="ctr"/>
+          <a:lstStyle/>
+          <a:p>
+            <a:pPr algn="ctr"/>
+            <a:endParaRPr lang="es-ES"/>
+          </a:p>
+        </p:txBody>
+      </p:sp>
+      <p:sp>
+        <p:nvSpPr>
+          <p:cNvPr id="10" name="Abrir llave 9">
+            <a:extLst>
+              <a:ext uri="{FF2B5EF4-FFF2-40B4-BE49-F238E27FC236}">
+                <a16:creationId xmlns:a16="http://schemas.microsoft.com/office/drawing/2014/main" id="{4C751ECC-A485-4839-A6AD-5F6FE4F27E62}"/>
+              </a:ext>
+            </a:extLst>
+          </p:cNvPr>
+          <p:cNvSpPr/>
+          <p:nvPr/>
+        </p:nvSpPr>
+        <p:spPr>
+          <a:xfrm rot="16200000">
+            <a:off x="4918272" y="3314071"/>
+            <a:ext cx="243619" cy="763480"/>
+          </a:xfrm>
+          <a:prstGeom prst="leftBrace">
+            <a:avLst>
+              <a:gd name="adj1" fmla="val 8333"/>
+              <a:gd name="adj2" fmla="val 53574"/>
+            </a:avLst>
+          </a:prstGeom>
+          <a:ln w="38100"/>
+        </p:spPr>
+        <p:style>
+          <a:lnRef idx="1">
+            <a:schemeClr val="accent1"/>
+          </a:lnRef>
+          <a:fillRef idx="0">
+            <a:schemeClr val="accent1"/>
+          </a:fillRef>
+          <a:effectRef idx="0">
+            <a:schemeClr val="accent1"/>
+          </a:effectRef>
+          <a:fontRef idx="minor">
+            <a:schemeClr val="tx1"/>
+          </a:fontRef>
+        </p:style>
+        <p:txBody>
+          <a:bodyPr rtlCol="0" anchor="ctr"/>
+          <a:lstStyle/>
+          <a:p>
+            <a:pPr algn="ctr"/>
+            <a:endParaRPr lang="es-ES"/>
+          </a:p>
+        </p:txBody>
+      </p:sp>
+      <p:sp>
+        <p:nvSpPr>
+          <p:cNvPr id="11" name="Abrir llave 10">
+            <a:extLst>
+              <a:ext uri="{FF2B5EF4-FFF2-40B4-BE49-F238E27FC236}">
+                <a16:creationId xmlns:a16="http://schemas.microsoft.com/office/drawing/2014/main" id="{34AF920B-E831-4430-9D63-51ED81454E7E}"/>
+              </a:ext>
+            </a:extLst>
+          </p:cNvPr>
+          <p:cNvSpPr/>
+          <p:nvPr/>
+        </p:nvSpPr>
+        <p:spPr>
+          <a:xfrm rot="16200000">
+            <a:off x="4154271" y="3588726"/>
+            <a:ext cx="243619" cy="763480"/>
+          </a:xfrm>
+          <a:prstGeom prst="leftBrace">
+            <a:avLst>
+              <a:gd name="adj1" fmla="val 8333"/>
+              <a:gd name="adj2" fmla="val 53574"/>
+            </a:avLst>
+          </a:prstGeom>
+          <a:ln w="38100">
+            <a:solidFill>
+              <a:srgbClr val="FF0000"/>
+            </a:solidFill>
+          </a:ln>
+        </p:spPr>
+        <p:style>
+          <a:lnRef idx="1">
+            <a:schemeClr val="accent1"/>
+          </a:lnRef>
+          <a:fillRef idx="0">
+            <a:schemeClr val="accent1"/>
+          </a:fillRef>
+          <a:effectRef idx="0">
+            <a:schemeClr val="accent1"/>
+          </a:effectRef>
+          <a:fontRef idx="minor">
+            <a:schemeClr val="tx1"/>
+          </a:fontRef>
+        </p:style>
+        <p:txBody>
+          <a:bodyPr rtlCol="0" anchor="ctr"/>
+          <a:lstStyle/>
+          <a:p>
+            <a:pPr algn="ctr"/>
+            <a:endParaRPr lang="es-ES"/>
+          </a:p>
+        </p:txBody>
+      </p:sp>
+      <p:sp>
+        <p:nvSpPr>
+          <p:cNvPr id="12" name="Abrir llave 11">
+            <a:extLst>
+              <a:ext uri="{FF2B5EF4-FFF2-40B4-BE49-F238E27FC236}">
+                <a16:creationId xmlns:a16="http://schemas.microsoft.com/office/drawing/2014/main" id="{329C5463-0E23-40DD-A9EF-37470CBB5D87}"/>
+              </a:ext>
+            </a:extLst>
+          </p:cNvPr>
+          <p:cNvSpPr/>
+          <p:nvPr/>
+        </p:nvSpPr>
+        <p:spPr>
+          <a:xfrm rot="16200000">
+            <a:off x="6202571" y="3314072"/>
+            <a:ext cx="243619" cy="763480"/>
+          </a:xfrm>
+          <a:prstGeom prst="leftBrace">
+            <a:avLst>
+              <a:gd name="adj1" fmla="val 8333"/>
+              <a:gd name="adj2" fmla="val 53574"/>
+            </a:avLst>
+          </a:prstGeom>
+          <a:ln w="38100"/>
+        </p:spPr>
+        <p:style>
+          <a:lnRef idx="1">
+            <a:schemeClr val="accent1"/>
+          </a:lnRef>
+          <a:fillRef idx="0">
+            <a:schemeClr val="accent1"/>
+          </a:fillRef>
+          <a:effectRef idx="0">
+            <a:schemeClr val="accent1"/>
+          </a:effectRef>
+          <a:fontRef idx="minor">
+            <a:schemeClr val="tx1"/>
+          </a:fontRef>
+        </p:style>
+        <p:txBody>
+          <a:bodyPr rtlCol="0" anchor="ctr"/>
+          <a:lstStyle/>
+          <a:p>
+            <a:pPr algn="ctr"/>
+            <a:endParaRPr lang="es-ES"/>
+          </a:p>
+        </p:txBody>
+      </p:sp>
+      <p:sp>
+        <p:nvSpPr>
+          <p:cNvPr id="13" name="Abrir llave 12">
+            <a:extLst>
+              <a:ext uri="{FF2B5EF4-FFF2-40B4-BE49-F238E27FC236}">
+                <a16:creationId xmlns:a16="http://schemas.microsoft.com/office/drawing/2014/main" id="{6DFBD50E-403A-4CFC-98B8-25FABD69F71C}"/>
+              </a:ext>
+            </a:extLst>
+          </p:cNvPr>
+          <p:cNvSpPr/>
+          <p:nvPr/>
+        </p:nvSpPr>
+        <p:spPr>
+          <a:xfrm rot="16200000">
+            <a:off x="5552502" y="3588725"/>
+            <a:ext cx="243619" cy="763480"/>
+          </a:xfrm>
+          <a:prstGeom prst="leftBrace">
+            <a:avLst>
+              <a:gd name="adj1" fmla="val 8333"/>
+              <a:gd name="adj2" fmla="val 53574"/>
+            </a:avLst>
+          </a:prstGeom>
+          <a:ln w="38100">
+            <a:solidFill>
+              <a:srgbClr val="FF0000"/>
+            </a:solidFill>
+          </a:ln>
+        </p:spPr>
+        <p:style>
+          <a:lnRef idx="1">
+            <a:schemeClr val="accent1"/>
+          </a:lnRef>
+          <a:fillRef idx="0">
+            <a:schemeClr val="accent1"/>
+          </a:fillRef>
+          <a:effectRef idx="0">
+            <a:schemeClr val="accent1"/>
+          </a:effectRef>
+          <a:fontRef idx="minor">
+            <a:schemeClr val="tx1"/>
+          </a:fontRef>
+        </p:style>
+        <p:txBody>
+          <a:bodyPr rtlCol="0" anchor="ctr"/>
+          <a:lstStyle/>
+          <a:p>
+            <a:pPr algn="ctr"/>
+            <a:endParaRPr lang="es-ES"/>
+          </a:p>
+        </p:txBody>
+      </p:sp>
+      <p:sp>
+        <p:nvSpPr>
+          <p:cNvPr id="14" name="Abrir llave 13">
+            <a:extLst>
+              <a:ext uri="{FF2B5EF4-FFF2-40B4-BE49-F238E27FC236}">
+                <a16:creationId xmlns:a16="http://schemas.microsoft.com/office/drawing/2014/main" id="{F075A381-B49F-4929-A079-0BD7E789298A}"/>
+              </a:ext>
+            </a:extLst>
+          </p:cNvPr>
+          <p:cNvSpPr/>
+          <p:nvPr/>
+        </p:nvSpPr>
+        <p:spPr>
+          <a:xfrm rot="16200000">
+            <a:off x="7030632" y="3588726"/>
+            <a:ext cx="243619" cy="763480"/>
+          </a:xfrm>
+          <a:prstGeom prst="leftBrace">
+            <a:avLst>
+              <a:gd name="adj1" fmla="val 8333"/>
+              <a:gd name="adj2" fmla="val 53574"/>
+            </a:avLst>
+          </a:prstGeom>
+          <a:ln w="38100">
+            <a:solidFill>
+              <a:srgbClr val="FF0000"/>
+            </a:solidFill>
+          </a:ln>
+        </p:spPr>
+        <p:style>
+          <a:lnRef idx="1">
+            <a:schemeClr val="accent1"/>
+          </a:lnRef>
+          <a:fillRef idx="0">
+            <a:schemeClr val="accent1"/>
+          </a:fillRef>
+          <a:effectRef idx="0">
+            <a:schemeClr val="accent1"/>
+          </a:effectRef>
+          <a:fontRef idx="minor">
+            <a:schemeClr val="tx1"/>
+          </a:fontRef>
+        </p:style>
+        <p:txBody>
+          <a:bodyPr rtlCol="0" anchor="ctr"/>
+          <a:lstStyle/>
+          <a:p>
+            <a:pPr algn="ctr"/>
+            <a:endParaRPr lang="es-ES"/>
+          </a:p>
+        </p:txBody>
+      </p:sp>
+      <p:sp>
+        <p:nvSpPr>
+          <p:cNvPr id="18" name="CuadroTexto 17">
+            <a:extLst>
+              <a:ext uri="{FF2B5EF4-FFF2-40B4-BE49-F238E27FC236}">
+                <a16:creationId xmlns:a16="http://schemas.microsoft.com/office/drawing/2014/main" id="{0750204F-4825-45D1-84D2-2403394ABE5A}"/>
+              </a:ext>
+            </a:extLst>
+          </p:cNvPr>
+          <p:cNvSpPr txBox="1"/>
+          <p:nvPr/>
+        </p:nvSpPr>
+        <p:spPr>
+          <a:xfrm>
+            <a:off x="8523760" y="2859008"/>
+            <a:ext cx="1717137" cy="369332"/>
+          </a:xfrm>
+          <a:prstGeom prst="rect">
+            <a:avLst/>
+          </a:prstGeom>
+          <a:noFill/>
+        </p:spPr>
+        <p:txBody>
+          <a:bodyPr wrap="none" rtlCol="0">
+            <a:spAutoFit/>
+          </a:bodyPr>
+          <a:lstStyle/>
+          <a:p>
+            <a:r>
+              <a:rPr lang="es-ES" dirty="0"/>
+              <a:t>CambioSegundo</a:t>
+            </a:r>
+          </a:p>
+        </p:txBody>
+      </p:sp>
+      <p:sp>
+        <p:nvSpPr>
+          <p:cNvPr id="19" name="CuadroTexto 18">
+            <a:extLst>
+              <a:ext uri="{FF2B5EF4-FFF2-40B4-BE49-F238E27FC236}">
+                <a16:creationId xmlns:a16="http://schemas.microsoft.com/office/drawing/2014/main" id="{EADD3FF8-8EE9-4856-B4C4-93574F08A183}"/>
+              </a:ext>
+            </a:extLst>
+          </p:cNvPr>
+          <p:cNvSpPr txBox="1"/>
+          <p:nvPr/>
+        </p:nvSpPr>
+        <p:spPr>
+          <a:xfrm>
+            <a:off x="8523760" y="2424668"/>
+            <a:ext cx="1404552" cy="369332"/>
+          </a:xfrm>
+          <a:prstGeom prst="rect">
+            <a:avLst/>
+          </a:prstGeom>
+          <a:noFill/>
+        </p:spPr>
+        <p:txBody>
+          <a:bodyPr wrap="none" rtlCol="0">
+            <a:spAutoFit/>
+          </a:bodyPr>
+          <a:lstStyle/>
+          <a:p>
+            <a:r>
+              <a:rPr lang="es-ES" dirty="0"/>
+              <a:t>CambioInicio</a:t>
+            </a:r>
+          </a:p>
+        </p:txBody>
+      </p:sp>
+      <p:sp>
+        <p:nvSpPr>
+          <p:cNvPr id="20" name="Rectángulo: esquinas redondeadas 19">
+            <a:extLst>
+              <a:ext uri="{FF2B5EF4-FFF2-40B4-BE49-F238E27FC236}">
+                <a16:creationId xmlns:a16="http://schemas.microsoft.com/office/drawing/2014/main" id="{D69A9EF1-5BFB-4755-880B-B6A6289E7833}"/>
+              </a:ext>
+            </a:extLst>
+          </p:cNvPr>
+          <p:cNvSpPr/>
+          <p:nvPr/>
+        </p:nvSpPr>
+        <p:spPr>
+          <a:xfrm>
+            <a:off x="8031480" y="2424668"/>
+            <a:ext cx="411480" cy="310912"/>
+          </a:xfrm>
+          <a:prstGeom prst="roundRect">
+            <a:avLst/>
+          </a:prstGeom>
+        </p:spPr>
+        <p:style>
+          <a:lnRef idx="2">
+            <a:schemeClr val="accent1">
+              <a:shade val="50000"/>
+            </a:schemeClr>
+          </a:lnRef>
+          <a:fillRef idx="1">
+            <a:schemeClr val="accent1"/>
+          </a:fillRef>
+          <a:effectRef idx="0">
+            <a:schemeClr val="accent1"/>
+          </a:effectRef>
+          <a:fontRef idx="minor">
+            <a:schemeClr val="lt1"/>
+          </a:fontRef>
+        </p:style>
+        <p:txBody>
+          <a:bodyPr rtlCol="0" anchor="ctr"/>
+          <a:lstStyle/>
+          <a:p>
+            <a:pPr algn="ctr"/>
+            <a:endParaRPr lang="es-ES"/>
+          </a:p>
+        </p:txBody>
+      </p:sp>
+      <p:sp>
+        <p:nvSpPr>
+          <p:cNvPr id="21" name="Rectángulo: esquinas redondeadas 20">
+            <a:extLst>
+              <a:ext uri="{FF2B5EF4-FFF2-40B4-BE49-F238E27FC236}">
+                <a16:creationId xmlns:a16="http://schemas.microsoft.com/office/drawing/2014/main" id="{F8AFA60F-B465-421B-8AED-CAB69A4FDD3D}"/>
+              </a:ext>
+            </a:extLst>
+          </p:cNvPr>
+          <p:cNvSpPr/>
+          <p:nvPr/>
+        </p:nvSpPr>
+        <p:spPr>
+          <a:xfrm>
+            <a:off x="8031480" y="2917428"/>
+            <a:ext cx="411480" cy="310912"/>
+          </a:xfrm>
+          <a:prstGeom prst="roundRect">
+            <a:avLst/>
+          </a:prstGeom>
+          <a:solidFill>
+            <a:srgbClr val="FF3737"/>
+          </a:solidFill>
+          <a:ln>
+            <a:solidFill>
+              <a:srgbClr val="FF0000"/>
+            </a:solidFill>
+          </a:ln>
+        </p:spPr>
+        <p:style>
+          <a:lnRef idx="2">
+            <a:schemeClr val="accent1">
+              <a:shade val="50000"/>
+            </a:schemeClr>
+          </a:lnRef>
+          <a:fillRef idx="1">
+            <a:schemeClr val="accent1"/>
+          </a:fillRef>
+          <a:effectRef idx="0">
+            <a:schemeClr val="accent1"/>
+          </a:effectRef>
+          <a:fontRef idx="minor">
+            <a:schemeClr val="lt1"/>
+          </a:fontRef>
+        </p:style>
+        <p:txBody>
+          <a:bodyPr rtlCol="0" anchor="ctr"/>
+          <a:lstStyle/>
+          <a:p>
+            <a:pPr algn="ctr"/>
+            <a:endParaRPr lang="es-ES"/>
+          </a:p>
+        </p:txBody>
+      </p:sp>
+    </p:spTree>
+    <p:extLst>
+      <p:ext uri="{BB962C8B-B14F-4D97-AF65-F5344CB8AC3E}">
+        <p14:creationId xmlns:p14="http://schemas.microsoft.com/office/powerpoint/2010/main" val="156003555"/>
+      </p:ext>
+    </p:extLst>
+  </p:cSld>
+  <p:clrMapOvr>
+    <a:masterClrMapping/>
+  </p:clrMapOvr>
+</p:sld>
+</file>
+
 <file path=ppt/slides/slide2.xml><?xml version="1.0" encoding="utf-8"?>
 <p:sld xmlns:a="http://schemas.openxmlformats.org/drawingml/2006/main" xmlns:r="http://schemas.openxmlformats.org/officeDocument/2006/relationships" xmlns:p="http://schemas.openxmlformats.org/presentationml/2006/main">
   <p:cSld>

</xml_diff>